<commit_message>
ver0.8.5: fix sd_starttime issue
</commit_message>
<xml_diff>
--- a/uob_website/analysis/utils/Voice_To_Text_Analysis_Web_UserGuide.pptx
+++ b/uob_website/analysis/utils/Voice_To_Text_Analysis_Web_UserGuide.pptx
@@ -7,6 +7,19 @@
   <p:sldIdLst>
     <p:sldId id="256" r:id="rId2"/>
     <p:sldId id="257" r:id="rId3"/>
+    <p:sldId id="258" r:id="rId4"/>
+    <p:sldId id="259" r:id="rId5"/>
+    <p:sldId id="260" r:id="rId6"/>
+    <p:sldId id="419" r:id="rId7"/>
+    <p:sldId id="392" r:id="rId8"/>
+    <p:sldId id="393" r:id="rId9"/>
+    <p:sldId id="396" r:id="rId10"/>
+    <p:sldId id="394" r:id="rId11"/>
+    <p:sldId id="421" r:id="rId12"/>
+    <p:sldId id="395" r:id="rId13"/>
+    <p:sldId id="444" r:id="rId14"/>
+    <p:sldId id="420" r:id="rId15"/>
+    <p:sldId id="430" r:id="rId16"/>
   </p:sldIdLst>
   <p:sldSz cx="12192000" cy="6858000"/>
   <p:notesSz cx="6858000" cy="9144000"/>
@@ -105,6 +118,11 @@
       </a:defRPr>
     </a:lvl9pPr>
   </p:defaultTextStyle>
+  <p:extLst>
+    <p:ext uri="{EFAFB233-063F-42B5-8137-9DF3F51BA10A}">
+      <p15:sldGuideLst xmlns:p15="http://schemas.microsoft.com/office/powerpoint/2012/main"/>
+    </p:ext>
+  </p:extLst>
 </p:presentation>
 </file>
 
@@ -255,7 +273,7 @@
           <a:p>
             <a:fld id="{B8DA96DE-0D36-4043-B197-B43A25F71520}" type="datetimeFigureOut">
               <a:rPr lang="en-US" smtClean="0"/>
-              <a:t>6/9/2022</a:t>
+              <a:t>6/14/2022</a:t>
             </a:fld>
             <a:endParaRPr lang="en-US"/>
           </a:p>
@@ -453,7 +471,7 @@
           <a:p>
             <a:fld id="{B8DA96DE-0D36-4043-B197-B43A25F71520}" type="datetimeFigureOut">
               <a:rPr lang="en-US" smtClean="0"/>
-              <a:t>6/9/2022</a:t>
+              <a:t>6/14/2022</a:t>
             </a:fld>
             <a:endParaRPr lang="en-US"/>
           </a:p>
@@ -661,7 +679,7 @@
           <a:p>
             <a:fld id="{B8DA96DE-0D36-4043-B197-B43A25F71520}" type="datetimeFigureOut">
               <a:rPr lang="en-US" smtClean="0"/>
-              <a:t>6/9/2022</a:t>
+              <a:t>6/14/2022</a:t>
             </a:fld>
             <a:endParaRPr lang="en-US"/>
           </a:p>
@@ -725,6 +743,146 @@
     <p:extLst>
       <p:ext uri="{BB962C8B-B14F-4D97-AF65-F5344CB8AC3E}">
         <p14:creationId xmlns:p14="http://schemas.microsoft.com/office/powerpoint/2010/main" val="2294163305"/>
+      </p:ext>
+    </p:extLst>
+  </p:cSld>
+  <p:clrMapOvr>
+    <a:masterClrMapping/>
+  </p:clrMapOvr>
+</p:sldLayout>
+</file>
+
+<file path=ppt/slideLayouts/slideLayout12.xml><?xml version="1.0" encoding="utf-8"?>
+<p:sldLayout xmlns:a="http://schemas.openxmlformats.org/drawingml/2006/main" xmlns:r="http://schemas.openxmlformats.org/officeDocument/2006/relationships" xmlns:p="http://schemas.openxmlformats.org/presentationml/2006/main" userDrawn="1">
+  <p:cSld name="Contents slide layout">
+    <p:spTree>
+      <p:nvGrpSpPr>
+        <p:cNvPr id="1" name=""/>
+        <p:cNvGrpSpPr/>
+        <p:nvPr/>
+      </p:nvGrpSpPr>
+      <p:grpSpPr>
+        <a:xfrm>
+          <a:off x="0" y="0"/>
+          <a:ext cx="0" cy="0"/>
+          <a:chOff x="0" y="0"/>
+          <a:chExt cx="0" cy="0"/>
+        </a:xfrm>
+      </p:grpSpPr>
+      <p:sp>
+        <p:nvSpPr>
+          <p:cNvPr id="2" name="Text Placeholder 9"/>
+          <p:cNvSpPr>
+            <a:spLocks noGrp="1"/>
+          </p:cNvSpPr>
+          <p:nvPr>
+            <p:ph type="body" sz="quarter" idx="10" hasCustomPrompt="1"/>
+          </p:nvPr>
+        </p:nvSpPr>
+        <p:spPr>
+          <a:xfrm>
+            <a:off x="323529" y="339509"/>
+            <a:ext cx="11573197" cy="724247"/>
+          </a:xfrm>
+          <a:prstGeom prst="rect">
+            <a:avLst/>
+          </a:prstGeom>
+        </p:spPr>
+        <p:txBody>
+          <a:bodyPr anchor="ctr"/>
+          <a:lstStyle>
+            <a:lvl1pPr marL="0" indent="0" algn="ctr">
+              <a:buNone/>
+              <a:defRPr sz="5400" b="0" baseline="0">
+                <a:solidFill>
+                  <a:schemeClr val="tx1">
+                    <a:lumMod val="85000"/>
+                    <a:lumOff val="15000"/>
+                  </a:schemeClr>
+                </a:solidFill>
+                <a:latin typeface="+mj-lt"/>
+                <a:cs typeface="Arial" panose="020B0604020202090204" pitchFamily="34" charset="0"/>
+              </a:defRPr>
+            </a:lvl1pPr>
+          </a:lstStyle>
+          <a:p>
+            <a:pPr lvl="0"/>
+            <a:r>
+              <a:rPr lang="en-US" altLang="ko-KR"/>
+              <a:t>BASIC LAYOUT</a:t>
+            </a:r>
+          </a:p>
+        </p:txBody>
+      </p:sp>
+      <p:sp>
+        <p:nvSpPr>
+          <p:cNvPr id="3" name="Date Placeholder 2"/>
+          <p:cNvSpPr>
+            <a:spLocks noGrp="1"/>
+          </p:cNvSpPr>
+          <p:nvPr>
+            <p:ph type="dt" sz="half" idx="11"/>
+          </p:nvPr>
+        </p:nvSpPr>
+        <p:spPr/>
+        <p:txBody>
+          <a:bodyPr/>
+          <a:lstStyle/>
+          <a:p>
+            <a:fld id="{83B2EA90-AADE-4FEC-AB5C-BA7E4B8504AC}" type="datetime1">
+              <a:rPr lang="en-SG" smtClean="0"/>
+              <a:t>14/6/2022</a:t>
+            </a:fld>
+            <a:endParaRPr lang="en-GB"/>
+          </a:p>
+        </p:txBody>
+      </p:sp>
+      <p:sp>
+        <p:nvSpPr>
+          <p:cNvPr id="4" name="Footer Placeholder 3"/>
+          <p:cNvSpPr>
+            <a:spLocks noGrp="1"/>
+          </p:cNvSpPr>
+          <p:nvPr>
+            <p:ph type="ftr" sz="quarter" idx="12"/>
+          </p:nvPr>
+        </p:nvSpPr>
+        <p:spPr/>
+        <p:txBody>
+          <a:bodyPr/>
+          <a:lstStyle/>
+          <a:p>
+            <a:endParaRPr lang="en-GB"/>
+          </a:p>
+        </p:txBody>
+      </p:sp>
+      <p:sp>
+        <p:nvSpPr>
+          <p:cNvPr id="5" name="Slide Number Placeholder 4"/>
+          <p:cNvSpPr>
+            <a:spLocks noGrp="1"/>
+          </p:cNvSpPr>
+          <p:nvPr>
+            <p:ph type="sldNum" sz="quarter" idx="13"/>
+          </p:nvPr>
+        </p:nvSpPr>
+        <p:spPr/>
+        <p:txBody>
+          <a:bodyPr/>
+          <a:lstStyle/>
+          <a:p>
+            <a:fld id="{330EA680-D336-4FF7-8B7A-9848BB0A1C32}" type="slidenum">
+              <a:rPr lang="en-GB" smtClean="0"/>
+              <a:t>‹#›</a:t>
+            </a:fld>
+            <a:endParaRPr lang="en-GB"/>
+          </a:p>
+        </p:txBody>
+      </p:sp>
+    </p:spTree>
+    <p:extLst>
+      <p:ext uri="{BB962C8B-B14F-4D97-AF65-F5344CB8AC3E}">
+        <p14:creationId xmlns:p14="http://schemas.microsoft.com/office/powerpoint/2010/main" val="3065329309"/>
       </p:ext>
     </p:extLst>
   </p:cSld>
@@ -859,7 +1017,7 @@
           <a:p>
             <a:fld id="{B8DA96DE-0D36-4043-B197-B43A25F71520}" type="datetimeFigureOut">
               <a:rPr lang="en-US" smtClean="0"/>
-              <a:t>6/9/2022</a:t>
+              <a:t>6/14/2022</a:t>
             </a:fld>
             <a:endParaRPr lang="en-US"/>
           </a:p>
@@ -1134,7 +1292,7 @@
           <a:p>
             <a:fld id="{B8DA96DE-0D36-4043-B197-B43A25F71520}" type="datetimeFigureOut">
               <a:rPr lang="en-US" smtClean="0"/>
-              <a:t>6/9/2022</a:t>
+              <a:t>6/14/2022</a:t>
             </a:fld>
             <a:endParaRPr lang="en-US"/>
           </a:p>
@@ -1399,7 +1557,7 @@
           <a:p>
             <a:fld id="{B8DA96DE-0D36-4043-B197-B43A25F71520}" type="datetimeFigureOut">
               <a:rPr lang="en-US" smtClean="0"/>
-              <a:t>6/9/2022</a:t>
+              <a:t>6/14/2022</a:t>
             </a:fld>
             <a:endParaRPr lang="en-US"/>
           </a:p>
@@ -1811,7 +1969,7 @@
           <a:p>
             <a:fld id="{B8DA96DE-0D36-4043-B197-B43A25F71520}" type="datetimeFigureOut">
               <a:rPr lang="en-US" smtClean="0"/>
-              <a:t>6/9/2022</a:t>
+              <a:t>6/14/2022</a:t>
             </a:fld>
             <a:endParaRPr lang="en-US"/>
           </a:p>
@@ -1952,7 +2110,7 @@
           <a:p>
             <a:fld id="{B8DA96DE-0D36-4043-B197-B43A25F71520}" type="datetimeFigureOut">
               <a:rPr lang="en-US" smtClean="0"/>
-              <a:t>6/9/2022</a:t>
+              <a:t>6/14/2022</a:t>
             </a:fld>
             <a:endParaRPr lang="en-US"/>
           </a:p>
@@ -2065,7 +2223,7 @@
           <a:p>
             <a:fld id="{B8DA96DE-0D36-4043-B197-B43A25F71520}" type="datetimeFigureOut">
               <a:rPr lang="en-US" smtClean="0"/>
-              <a:t>6/9/2022</a:t>
+              <a:t>6/14/2022</a:t>
             </a:fld>
             <a:endParaRPr lang="en-US"/>
           </a:p>
@@ -2376,7 +2534,7 @@
           <a:p>
             <a:fld id="{B8DA96DE-0D36-4043-B197-B43A25F71520}" type="datetimeFigureOut">
               <a:rPr lang="en-US" smtClean="0"/>
-              <a:t>6/9/2022</a:t>
+              <a:t>6/14/2022</a:t>
             </a:fld>
             <a:endParaRPr lang="en-US"/>
           </a:p>
@@ -2664,7 +2822,7 @@
           <a:p>
             <a:fld id="{B8DA96DE-0D36-4043-B197-B43A25F71520}" type="datetimeFigureOut">
               <a:rPr lang="en-US" smtClean="0"/>
-              <a:t>6/9/2022</a:t>
+              <a:t>6/14/2022</a:t>
             </a:fld>
             <a:endParaRPr lang="en-US"/>
           </a:p>
@@ -2905,7 +3063,7 @@
           <a:p>
             <a:fld id="{B8DA96DE-0D36-4043-B197-B43A25F71520}" type="datetimeFigureOut">
               <a:rPr lang="en-US" smtClean="0"/>
-              <a:t>6/9/2022</a:t>
+              <a:t>6/14/2022</a:t>
             </a:fld>
             <a:endParaRPr lang="en-US"/>
           </a:p>
@@ -3021,6 +3179,7 @@
     <p:sldLayoutId id="2147483657" r:id="rId9"/>
     <p:sldLayoutId id="2147483658" r:id="rId10"/>
     <p:sldLayoutId id="2147483659" r:id="rId11"/>
+    <p:sldLayoutId id="2147483660" r:id="rId12"/>
   </p:sldLayoutIdLst>
   <p:txStyles>
     <p:titleStyle>
@@ -3341,50 +3500,33 @@
         <p:spPr/>
         <p:txBody>
           <a:bodyPr>
-            <a:normAutofit fontScale="90000"/>
+            <a:normAutofit/>
           </a:bodyPr>
           <a:lstStyle/>
           <a:p>
             <a:r>
               <a:rPr lang="en-US" b="0" dirty="0">
-                <a:solidFill>
-                  <a:srgbClr val="CE9178"/>
-                </a:solidFill>
                 <a:effectLst/>
-                <a:latin typeface="Consolas" panose="020B0609020204030204" pitchFamily="49" charset="0"/>
+                <a:latin typeface="+mn-lt"/>
               </a:rPr>
               <a:t>Voice-To-Text</a:t>
             </a:r>
             <a:r>
               <a:rPr lang="en-US" dirty="0">
-                <a:solidFill>
-                  <a:srgbClr val="CE9178"/>
-                </a:solidFill>
-                <a:latin typeface="Consolas" panose="020B0609020204030204" pitchFamily="49" charset="0"/>
+                <a:latin typeface="+mn-lt"/>
               </a:rPr>
               <a:t> </a:t>
             </a:r>
             <a:r>
               <a:rPr lang="en-US" b="0" dirty="0">
-                <a:solidFill>
-                  <a:srgbClr val="CE9178"/>
-                </a:solidFill>
                 <a:effectLst/>
-                <a:latin typeface="Consolas" panose="020B0609020204030204" pitchFamily="49" charset="0"/>
+                <a:latin typeface="+mn-lt"/>
               </a:rPr>
-              <a:t>Analysis Web </a:t>
-            </a:r>
-            <a:r>
-              <a:rPr lang="en-US" b="0" dirty="0" err="1">
-                <a:solidFill>
-                  <a:srgbClr val="CE9178"/>
-                </a:solidFill>
-                <a:effectLst/>
-                <a:latin typeface="Consolas" panose="020B0609020204030204" pitchFamily="49" charset="0"/>
-              </a:rPr>
-              <a:t>UserGuide</a:t>
-            </a:r>
-            <a:endParaRPr lang="en-US" dirty="0"/>
+              <a:t>Analysis Web User Guide</a:t>
+            </a:r>
+            <a:endParaRPr lang="en-US" dirty="0">
+              <a:latin typeface="+mn-lt"/>
+            </a:endParaRPr>
           </a:p>
         </p:txBody>
       </p:sp>
@@ -3417,6 +3559,1134 @@
     <p:extLst>
       <p:ext uri="{BB962C8B-B14F-4D97-AF65-F5344CB8AC3E}">
         <p14:creationId xmlns:p14="http://schemas.microsoft.com/office/powerpoint/2010/main" val="1688098342"/>
+      </p:ext>
+    </p:extLst>
+  </p:cSld>
+  <p:clrMapOvr>
+    <a:masterClrMapping/>
+  </p:clrMapOvr>
+</p:sld>
+</file>
+
+<file path=ppt/slides/slide10.xml><?xml version="1.0" encoding="utf-8"?>
+<p:sld xmlns:a="http://schemas.openxmlformats.org/drawingml/2006/main" xmlns:r="http://schemas.openxmlformats.org/officeDocument/2006/relationships" xmlns:p="http://schemas.openxmlformats.org/presentationml/2006/main">
+  <p:cSld>
+    <p:spTree>
+      <p:nvGrpSpPr>
+        <p:cNvPr id="1" name=""/>
+        <p:cNvGrpSpPr/>
+        <p:nvPr/>
+      </p:nvGrpSpPr>
+      <p:grpSpPr>
+        <a:xfrm>
+          <a:off x="0" y="0"/>
+          <a:ext cx="0" cy="0"/>
+          <a:chOff x="0" y="0"/>
+          <a:chExt cx="0" cy="0"/>
+        </a:xfrm>
+      </p:grpSpPr>
+      <p:pic>
+        <p:nvPicPr>
+          <p:cNvPr id="4" name="Picture 5" descr="Graphical user interface, application&#10;&#10;Description automatically generated">
+            <a:extLst>
+              <a:ext uri="{FF2B5EF4-FFF2-40B4-BE49-F238E27FC236}">
+                <a16:creationId xmlns:a16="http://schemas.microsoft.com/office/drawing/2014/main" id="{A84C8EA0-B4B1-C9C5-A9DD-531E3AD4BE82}"/>
+              </a:ext>
+            </a:extLst>
+          </p:cNvPr>
+          <p:cNvPicPr>
+            <a:picLocks noChangeAspect="1"/>
+          </p:cNvPicPr>
+          <p:nvPr/>
+        </p:nvPicPr>
+        <p:blipFill>
+          <a:blip r:embed="rId2"/>
+          <a:stretch>
+            <a:fillRect/>
+          </a:stretch>
+        </p:blipFill>
+        <p:spPr>
+          <a:xfrm>
+            <a:off x="1388853" y="1059361"/>
+            <a:ext cx="9975011" cy="5084334"/>
+          </a:xfrm>
+          <a:prstGeom prst="rect">
+            <a:avLst/>
+          </a:prstGeom>
+        </p:spPr>
+      </p:pic>
+      <p:sp>
+        <p:nvSpPr>
+          <p:cNvPr id="2" name="文本占位符 1">
+            <a:extLst>
+              <a:ext uri="{FF2B5EF4-FFF2-40B4-BE49-F238E27FC236}">
+                <a16:creationId xmlns:a16="http://schemas.microsoft.com/office/drawing/2014/main" id="{213CA3C2-2ACE-D148-9DEB-98694BBF639A}"/>
+              </a:ext>
+            </a:extLst>
+          </p:cNvPr>
+          <p:cNvSpPr>
+            <a:spLocks noGrp="1"/>
+          </p:cNvSpPr>
+          <p:nvPr>
+            <p:ph type="body" sz="quarter" idx="10"/>
+          </p:nvPr>
+        </p:nvSpPr>
+        <p:spPr/>
+        <p:txBody>
+          <a:bodyPr>
+            <a:normAutofit/>
+          </a:bodyPr>
+          <a:lstStyle/>
+          <a:p>
+            <a:pPr algn="l"/>
+            <a:r>
+              <a:rPr lang="zh-CN" altLang="en-US" sz="3600" b="1">
+                <a:ea typeface="宋体"/>
+                <a:cs typeface="Arial"/>
+              </a:rPr>
+              <a:t>Web Portal</a:t>
+            </a:r>
+            <a:endParaRPr lang="zh-CN" altLang="en-US" sz="3600" b="1"/>
+          </a:p>
+        </p:txBody>
+      </p:sp>
+      <p:sp>
+        <p:nvSpPr>
+          <p:cNvPr id="3" name="灯片编号占位符 2">
+            <a:extLst>
+              <a:ext uri="{FF2B5EF4-FFF2-40B4-BE49-F238E27FC236}">
+                <a16:creationId xmlns:a16="http://schemas.microsoft.com/office/drawing/2014/main" id="{206E8B07-3FBB-34EF-DF9F-3EC1027A9B3C}"/>
+              </a:ext>
+            </a:extLst>
+          </p:cNvPr>
+          <p:cNvSpPr>
+            <a:spLocks noGrp="1"/>
+          </p:cNvSpPr>
+          <p:nvPr>
+            <p:ph type="sldNum" sz="quarter" idx="13"/>
+          </p:nvPr>
+        </p:nvSpPr>
+        <p:spPr/>
+        <p:txBody>
+          <a:bodyPr/>
+          <a:lstStyle/>
+          <a:p>
+            <a:fld id="{330EA680-D336-4FF7-8B7A-9848BB0A1C32}" type="slidenum">
+              <a:rPr lang="en-GB" smtClean="0"/>
+              <a:t>10</a:t>
+            </a:fld>
+            <a:endParaRPr lang="en-GB"/>
+          </a:p>
+        </p:txBody>
+      </p:sp>
+      <p:sp>
+        <p:nvSpPr>
+          <p:cNvPr id="7" name="Rectangle: Rounded Corners 6">
+            <a:extLst>
+              <a:ext uri="{FF2B5EF4-FFF2-40B4-BE49-F238E27FC236}">
+                <a16:creationId xmlns:a16="http://schemas.microsoft.com/office/drawing/2014/main" id="{61AC131B-EF05-7E8D-4243-B7C34C39DC47}"/>
+              </a:ext>
+            </a:extLst>
+          </p:cNvPr>
+          <p:cNvSpPr/>
+          <p:nvPr/>
+        </p:nvSpPr>
+        <p:spPr>
+          <a:xfrm>
+            <a:off x="9572706" y="3012056"/>
+            <a:ext cx="425309" cy="318133"/>
+          </a:xfrm>
+          <a:prstGeom prst="roundRect">
+            <a:avLst/>
+          </a:prstGeom>
+          <a:noFill/>
+          <a:ln w="28575">
+            <a:solidFill>
+              <a:srgbClr val="FF0000"/>
+            </a:solidFill>
+          </a:ln>
+        </p:spPr>
+        <p:style>
+          <a:lnRef idx="2">
+            <a:schemeClr val="accent1">
+              <a:shade val="50000"/>
+            </a:schemeClr>
+          </a:lnRef>
+          <a:fillRef idx="1">
+            <a:schemeClr val="accent1"/>
+          </a:fillRef>
+          <a:effectRef idx="0">
+            <a:schemeClr val="accent1"/>
+          </a:effectRef>
+          <a:fontRef idx="minor">
+            <a:schemeClr val="lt1"/>
+          </a:fontRef>
+        </p:style>
+        <p:txBody>
+          <a:bodyPr rtlCol="0" anchor="ctr"/>
+          <a:lstStyle/>
+          <a:p>
+            <a:pPr algn="ctr"/>
+            <a:endParaRPr lang="en-US"/>
+          </a:p>
+        </p:txBody>
+      </p:sp>
+    </p:spTree>
+    <p:extLst>
+      <p:ext uri="{BB962C8B-B14F-4D97-AF65-F5344CB8AC3E}">
+        <p14:creationId xmlns:p14="http://schemas.microsoft.com/office/powerpoint/2010/main" val="2186899253"/>
+      </p:ext>
+    </p:extLst>
+  </p:cSld>
+  <p:clrMapOvr>
+    <a:masterClrMapping/>
+  </p:clrMapOvr>
+</p:sld>
+</file>
+
+<file path=ppt/slides/slide11.xml><?xml version="1.0" encoding="utf-8"?>
+<p:sld xmlns:a="http://schemas.openxmlformats.org/drawingml/2006/main" xmlns:r="http://schemas.openxmlformats.org/officeDocument/2006/relationships" xmlns:p="http://schemas.openxmlformats.org/presentationml/2006/main">
+  <p:cSld>
+    <p:spTree>
+      <p:nvGrpSpPr>
+        <p:cNvPr id="1" name=""/>
+        <p:cNvGrpSpPr/>
+        <p:nvPr/>
+      </p:nvGrpSpPr>
+      <p:grpSpPr>
+        <a:xfrm>
+          <a:off x="0" y="0"/>
+          <a:ext cx="0" cy="0"/>
+          <a:chOff x="0" y="0"/>
+          <a:chExt cx="0" cy="0"/>
+        </a:xfrm>
+      </p:grpSpPr>
+      <p:pic>
+        <p:nvPicPr>
+          <p:cNvPr id="4" name="Picture 4" descr="Table&#10;&#10;Description automatically generated">
+            <a:extLst>
+              <a:ext uri="{FF2B5EF4-FFF2-40B4-BE49-F238E27FC236}">
+                <a16:creationId xmlns:a16="http://schemas.microsoft.com/office/drawing/2014/main" id="{9CB4D531-D09B-9FE7-62BA-E5A2E872247F}"/>
+              </a:ext>
+            </a:extLst>
+          </p:cNvPr>
+          <p:cNvPicPr>
+            <a:picLocks noChangeAspect="1"/>
+          </p:cNvPicPr>
+          <p:nvPr/>
+        </p:nvPicPr>
+        <p:blipFill>
+          <a:blip r:embed="rId2"/>
+          <a:stretch>
+            <a:fillRect/>
+          </a:stretch>
+        </p:blipFill>
+        <p:spPr>
+          <a:xfrm>
+            <a:off x="1288211" y="1294419"/>
+            <a:ext cx="9989388" cy="5059916"/>
+          </a:xfrm>
+          <a:prstGeom prst="rect">
+            <a:avLst/>
+          </a:prstGeom>
+        </p:spPr>
+      </p:pic>
+      <p:sp>
+        <p:nvSpPr>
+          <p:cNvPr id="2" name="文本占位符 1">
+            <a:extLst>
+              <a:ext uri="{FF2B5EF4-FFF2-40B4-BE49-F238E27FC236}">
+                <a16:creationId xmlns:a16="http://schemas.microsoft.com/office/drawing/2014/main" id="{213CA3C2-2ACE-D148-9DEB-98694BBF639A}"/>
+              </a:ext>
+            </a:extLst>
+          </p:cNvPr>
+          <p:cNvSpPr>
+            <a:spLocks noGrp="1"/>
+          </p:cNvSpPr>
+          <p:nvPr>
+            <p:ph type="body" sz="quarter" idx="10"/>
+          </p:nvPr>
+        </p:nvSpPr>
+        <p:spPr/>
+        <p:txBody>
+          <a:bodyPr>
+            <a:normAutofit/>
+          </a:bodyPr>
+          <a:lstStyle/>
+          <a:p>
+            <a:pPr algn="l"/>
+            <a:r>
+              <a:rPr lang="zh-CN" altLang="en-US" sz="3600" b="1">
+                <a:ea typeface="宋体"/>
+                <a:cs typeface="Arial"/>
+              </a:rPr>
+              <a:t>Web Portal</a:t>
+            </a:r>
+            <a:endParaRPr lang="zh-CN" altLang="en-US" sz="3600" b="1"/>
+          </a:p>
+        </p:txBody>
+      </p:sp>
+      <p:sp>
+        <p:nvSpPr>
+          <p:cNvPr id="3" name="灯片编号占位符 2">
+            <a:extLst>
+              <a:ext uri="{FF2B5EF4-FFF2-40B4-BE49-F238E27FC236}">
+                <a16:creationId xmlns:a16="http://schemas.microsoft.com/office/drawing/2014/main" id="{206E8B07-3FBB-34EF-DF9F-3EC1027A9B3C}"/>
+              </a:ext>
+            </a:extLst>
+          </p:cNvPr>
+          <p:cNvSpPr>
+            <a:spLocks noGrp="1"/>
+          </p:cNvSpPr>
+          <p:nvPr>
+            <p:ph type="sldNum" sz="quarter" idx="13"/>
+          </p:nvPr>
+        </p:nvSpPr>
+        <p:spPr/>
+        <p:txBody>
+          <a:bodyPr/>
+          <a:lstStyle/>
+          <a:p>
+            <a:fld id="{330EA680-D336-4FF7-8B7A-9848BB0A1C32}" type="slidenum">
+              <a:rPr lang="en-GB" smtClean="0"/>
+              <a:t>11</a:t>
+            </a:fld>
+            <a:endParaRPr lang="en-GB"/>
+          </a:p>
+        </p:txBody>
+      </p:sp>
+      <p:sp>
+        <p:nvSpPr>
+          <p:cNvPr id="7" name="Rectangle: Rounded Corners 6">
+            <a:extLst>
+              <a:ext uri="{FF2B5EF4-FFF2-40B4-BE49-F238E27FC236}">
+                <a16:creationId xmlns:a16="http://schemas.microsoft.com/office/drawing/2014/main" id="{61AC131B-EF05-7E8D-4243-B7C34C39DC47}"/>
+              </a:ext>
+            </a:extLst>
+          </p:cNvPr>
+          <p:cNvSpPr/>
+          <p:nvPr/>
+        </p:nvSpPr>
+        <p:spPr>
+          <a:xfrm>
+            <a:off x="9379214" y="3244682"/>
+            <a:ext cx="394829" cy="365125"/>
+          </a:xfrm>
+          <a:prstGeom prst="roundRect">
+            <a:avLst/>
+          </a:prstGeom>
+          <a:noFill/>
+          <a:ln w="28575">
+            <a:solidFill>
+              <a:srgbClr val="FF0000"/>
+            </a:solidFill>
+          </a:ln>
+        </p:spPr>
+        <p:style>
+          <a:lnRef idx="2">
+            <a:schemeClr val="accent1">
+              <a:shade val="50000"/>
+            </a:schemeClr>
+          </a:lnRef>
+          <a:fillRef idx="1">
+            <a:schemeClr val="accent1"/>
+          </a:fillRef>
+          <a:effectRef idx="0">
+            <a:schemeClr val="accent1"/>
+          </a:effectRef>
+          <a:fontRef idx="minor">
+            <a:schemeClr val="lt1"/>
+          </a:fontRef>
+        </p:style>
+        <p:txBody>
+          <a:bodyPr rtlCol="0" anchor="ctr"/>
+          <a:lstStyle/>
+          <a:p>
+            <a:pPr algn="ctr"/>
+            <a:endParaRPr lang="en-US"/>
+          </a:p>
+        </p:txBody>
+      </p:sp>
+    </p:spTree>
+    <p:extLst>
+      <p:ext uri="{BB962C8B-B14F-4D97-AF65-F5344CB8AC3E}">
+        <p14:creationId xmlns:p14="http://schemas.microsoft.com/office/powerpoint/2010/main" val="2596408939"/>
+      </p:ext>
+    </p:extLst>
+  </p:cSld>
+  <p:clrMapOvr>
+    <a:masterClrMapping/>
+  </p:clrMapOvr>
+</p:sld>
+</file>
+
+<file path=ppt/slides/slide12.xml><?xml version="1.0" encoding="utf-8"?>
+<p:sld xmlns:a="http://schemas.openxmlformats.org/drawingml/2006/main" xmlns:r="http://schemas.openxmlformats.org/officeDocument/2006/relationships" xmlns:p="http://schemas.openxmlformats.org/presentationml/2006/main">
+  <p:cSld>
+    <p:spTree>
+      <p:nvGrpSpPr>
+        <p:cNvPr id="1" name=""/>
+        <p:cNvGrpSpPr/>
+        <p:nvPr/>
+      </p:nvGrpSpPr>
+      <p:grpSpPr>
+        <a:xfrm>
+          <a:off x="0" y="0"/>
+          <a:ext cx="0" cy="0"/>
+          <a:chOff x="0" y="0"/>
+          <a:chExt cx="0" cy="0"/>
+        </a:xfrm>
+      </p:grpSpPr>
+      <p:sp>
+        <p:nvSpPr>
+          <p:cNvPr id="2" name="文本占位符 1">
+            <a:extLst>
+              <a:ext uri="{FF2B5EF4-FFF2-40B4-BE49-F238E27FC236}">
+                <a16:creationId xmlns:a16="http://schemas.microsoft.com/office/drawing/2014/main" id="{213CA3C2-2ACE-D148-9DEB-98694BBF639A}"/>
+              </a:ext>
+            </a:extLst>
+          </p:cNvPr>
+          <p:cNvSpPr>
+            <a:spLocks noGrp="1"/>
+          </p:cNvSpPr>
+          <p:nvPr>
+            <p:ph type="body" sz="quarter" idx="10"/>
+          </p:nvPr>
+        </p:nvSpPr>
+        <p:spPr/>
+        <p:txBody>
+          <a:bodyPr>
+            <a:normAutofit/>
+          </a:bodyPr>
+          <a:lstStyle/>
+          <a:p>
+            <a:pPr algn="l"/>
+            <a:r>
+              <a:rPr lang="zh-CN" altLang="en-US" sz="3600" b="1">
+                <a:ea typeface="宋体"/>
+                <a:cs typeface="Arial"/>
+              </a:rPr>
+              <a:t>Web Portal</a:t>
+            </a:r>
+            <a:endParaRPr lang="zh-CN" altLang="en-US" sz="3600" b="1"/>
+          </a:p>
+        </p:txBody>
+      </p:sp>
+      <p:sp>
+        <p:nvSpPr>
+          <p:cNvPr id="3" name="灯片编号占位符 2">
+            <a:extLst>
+              <a:ext uri="{FF2B5EF4-FFF2-40B4-BE49-F238E27FC236}">
+                <a16:creationId xmlns:a16="http://schemas.microsoft.com/office/drawing/2014/main" id="{206E8B07-3FBB-34EF-DF9F-3EC1027A9B3C}"/>
+              </a:ext>
+            </a:extLst>
+          </p:cNvPr>
+          <p:cNvSpPr>
+            <a:spLocks noGrp="1"/>
+          </p:cNvSpPr>
+          <p:nvPr>
+            <p:ph type="sldNum" sz="quarter" idx="13"/>
+          </p:nvPr>
+        </p:nvSpPr>
+        <p:spPr/>
+        <p:txBody>
+          <a:bodyPr/>
+          <a:lstStyle/>
+          <a:p>
+            <a:fld id="{330EA680-D336-4FF7-8B7A-9848BB0A1C32}" type="slidenum">
+              <a:rPr lang="en-GB" smtClean="0"/>
+              <a:t>12</a:t>
+            </a:fld>
+            <a:endParaRPr lang="en-GB"/>
+          </a:p>
+        </p:txBody>
+      </p:sp>
+      <p:pic>
+        <p:nvPicPr>
+          <p:cNvPr id="5" name="Picture 5" descr="Table&#10;&#10;Description automatically generated">
+            <a:extLst>
+              <a:ext uri="{FF2B5EF4-FFF2-40B4-BE49-F238E27FC236}">
+                <a16:creationId xmlns:a16="http://schemas.microsoft.com/office/drawing/2014/main" id="{F85D80DB-42C3-A42E-4EBE-7A838BF7942E}"/>
+              </a:ext>
+            </a:extLst>
+          </p:cNvPr>
+          <p:cNvPicPr>
+            <a:picLocks noChangeAspect="1"/>
+          </p:cNvPicPr>
+          <p:nvPr/>
+        </p:nvPicPr>
+        <p:blipFill>
+          <a:blip r:embed="rId2"/>
+          <a:stretch>
+            <a:fillRect/>
+          </a:stretch>
+        </p:blipFill>
+        <p:spPr>
+          <a:xfrm>
+            <a:off x="1245079" y="1325182"/>
+            <a:ext cx="9716218" cy="4940880"/>
+          </a:xfrm>
+          <a:prstGeom prst="rect">
+            <a:avLst/>
+          </a:prstGeom>
+        </p:spPr>
+      </p:pic>
+      <p:sp>
+        <p:nvSpPr>
+          <p:cNvPr id="7" name="Rectangle: Rounded Corners 6">
+            <a:extLst>
+              <a:ext uri="{FF2B5EF4-FFF2-40B4-BE49-F238E27FC236}">
+                <a16:creationId xmlns:a16="http://schemas.microsoft.com/office/drawing/2014/main" id="{8D99F6F2-EE31-C1B7-F255-C7361D7C5F03}"/>
+              </a:ext>
+            </a:extLst>
+          </p:cNvPr>
+          <p:cNvSpPr/>
+          <p:nvPr/>
+        </p:nvSpPr>
+        <p:spPr>
+          <a:xfrm>
+            <a:off x="1514799" y="4581776"/>
+            <a:ext cx="423583" cy="839577"/>
+          </a:xfrm>
+          <a:prstGeom prst="roundRect">
+            <a:avLst/>
+          </a:prstGeom>
+          <a:noFill/>
+          <a:ln w="28575">
+            <a:solidFill>
+              <a:srgbClr val="FF0000"/>
+            </a:solidFill>
+          </a:ln>
+        </p:spPr>
+        <p:style>
+          <a:lnRef idx="2">
+            <a:schemeClr val="accent1">
+              <a:shade val="50000"/>
+            </a:schemeClr>
+          </a:lnRef>
+          <a:fillRef idx="1">
+            <a:schemeClr val="accent1"/>
+          </a:fillRef>
+          <a:effectRef idx="0">
+            <a:schemeClr val="accent1"/>
+          </a:effectRef>
+          <a:fontRef idx="minor">
+            <a:schemeClr val="lt1"/>
+          </a:fontRef>
+        </p:style>
+        <p:txBody>
+          <a:bodyPr rtlCol="0" anchor="ctr"/>
+          <a:lstStyle/>
+          <a:p>
+            <a:pPr algn="ctr"/>
+            <a:endParaRPr lang="en-US"/>
+          </a:p>
+        </p:txBody>
+      </p:sp>
+      <p:sp>
+        <p:nvSpPr>
+          <p:cNvPr id="8" name="Rectangle: Rounded Corners 7">
+            <a:extLst>
+              <a:ext uri="{FF2B5EF4-FFF2-40B4-BE49-F238E27FC236}">
+                <a16:creationId xmlns:a16="http://schemas.microsoft.com/office/drawing/2014/main" id="{5BBA189E-2C6D-8D40-DC15-847F236FD959}"/>
+              </a:ext>
+            </a:extLst>
+          </p:cNvPr>
+          <p:cNvSpPr/>
+          <p:nvPr/>
+        </p:nvSpPr>
+        <p:spPr>
+          <a:xfrm>
+            <a:off x="9177930" y="5516304"/>
+            <a:ext cx="1329356" cy="609540"/>
+          </a:xfrm>
+          <a:prstGeom prst="roundRect">
+            <a:avLst/>
+          </a:prstGeom>
+          <a:noFill/>
+          <a:ln w="28575">
+            <a:solidFill>
+              <a:srgbClr val="FF0000"/>
+            </a:solidFill>
+          </a:ln>
+        </p:spPr>
+        <p:style>
+          <a:lnRef idx="2">
+            <a:schemeClr val="accent1">
+              <a:shade val="50000"/>
+            </a:schemeClr>
+          </a:lnRef>
+          <a:fillRef idx="1">
+            <a:schemeClr val="accent1"/>
+          </a:fillRef>
+          <a:effectRef idx="0">
+            <a:schemeClr val="accent1"/>
+          </a:effectRef>
+          <a:fontRef idx="minor">
+            <a:schemeClr val="lt1"/>
+          </a:fontRef>
+        </p:style>
+        <p:txBody>
+          <a:bodyPr rtlCol="0" anchor="ctr"/>
+          <a:lstStyle/>
+          <a:p>
+            <a:pPr algn="ctr"/>
+            <a:endParaRPr lang="en-US"/>
+          </a:p>
+        </p:txBody>
+      </p:sp>
+    </p:spTree>
+    <p:extLst>
+      <p:ext uri="{BB962C8B-B14F-4D97-AF65-F5344CB8AC3E}">
+        <p14:creationId xmlns:p14="http://schemas.microsoft.com/office/powerpoint/2010/main" val="856586084"/>
+      </p:ext>
+    </p:extLst>
+  </p:cSld>
+  <p:clrMapOvr>
+    <a:masterClrMapping/>
+  </p:clrMapOvr>
+</p:sld>
+</file>
+
+<file path=ppt/slides/slide13.xml><?xml version="1.0" encoding="utf-8"?>
+<p:sld xmlns:a="http://schemas.openxmlformats.org/drawingml/2006/main" xmlns:r="http://schemas.openxmlformats.org/officeDocument/2006/relationships" xmlns:p="http://schemas.openxmlformats.org/presentationml/2006/main">
+  <p:cSld>
+    <p:spTree>
+      <p:nvGrpSpPr>
+        <p:cNvPr id="1" name=""/>
+        <p:cNvGrpSpPr/>
+        <p:nvPr/>
+      </p:nvGrpSpPr>
+      <p:grpSpPr>
+        <a:xfrm>
+          <a:off x="0" y="0"/>
+          <a:ext cx="0" cy="0"/>
+          <a:chOff x="0" y="0"/>
+          <a:chExt cx="0" cy="0"/>
+        </a:xfrm>
+      </p:grpSpPr>
+      <p:sp>
+        <p:nvSpPr>
+          <p:cNvPr id="2" name="文本占位符 1">
+            <a:extLst>
+              <a:ext uri="{FF2B5EF4-FFF2-40B4-BE49-F238E27FC236}">
+                <a16:creationId xmlns:a16="http://schemas.microsoft.com/office/drawing/2014/main" id="{213CA3C2-2ACE-D148-9DEB-98694BBF639A}"/>
+              </a:ext>
+            </a:extLst>
+          </p:cNvPr>
+          <p:cNvSpPr>
+            <a:spLocks noGrp="1"/>
+          </p:cNvSpPr>
+          <p:nvPr>
+            <p:ph type="body" sz="quarter" idx="10"/>
+          </p:nvPr>
+        </p:nvSpPr>
+        <p:spPr/>
+        <p:txBody>
+          <a:bodyPr>
+            <a:normAutofit/>
+          </a:bodyPr>
+          <a:lstStyle/>
+          <a:p>
+            <a:pPr algn="l"/>
+            <a:r>
+              <a:rPr lang="zh-CN" altLang="en-US" sz="3600" b="1">
+                <a:ea typeface="宋体"/>
+                <a:cs typeface="Arial"/>
+              </a:rPr>
+              <a:t>Web Portal</a:t>
+            </a:r>
+            <a:endParaRPr lang="zh-CN" altLang="en-US" sz="3600" b="1"/>
+          </a:p>
+        </p:txBody>
+      </p:sp>
+      <p:sp>
+        <p:nvSpPr>
+          <p:cNvPr id="3" name="灯片编号占位符 2">
+            <a:extLst>
+              <a:ext uri="{FF2B5EF4-FFF2-40B4-BE49-F238E27FC236}">
+                <a16:creationId xmlns:a16="http://schemas.microsoft.com/office/drawing/2014/main" id="{206E8B07-3FBB-34EF-DF9F-3EC1027A9B3C}"/>
+              </a:ext>
+            </a:extLst>
+          </p:cNvPr>
+          <p:cNvSpPr>
+            <a:spLocks noGrp="1"/>
+          </p:cNvSpPr>
+          <p:nvPr>
+            <p:ph type="sldNum" sz="quarter" idx="13"/>
+          </p:nvPr>
+        </p:nvSpPr>
+        <p:spPr/>
+        <p:txBody>
+          <a:bodyPr/>
+          <a:lstStyle/>
+          <a:p>
+            <a:fld id="{330EA680-D336-4FF7-8B7A-9848BB0A1C32}" type="slidenum">
+              <a:rPr lang="en-GB" smtClean="0"/>
+              <a:t>13</a:t>
+            </a:fld>
+            <a:endParaRPr lang="en-GB"/>
+          </a:p>
+        </p:txBody>
+      </p:sp>
+      <p:pic>
+        <p:nvPicPr>
+          <p:cNvPr id="5" name="Picture 5" descr="A picture containing table&#10;&#10;Description automatically generated">
+            <a:extLst>
+              <a:ext uri="{FF2B5EF4-FFF2-40B4-BE49-F238E27FC236}">
+                <a16:creationId xmlns:a16="http://schemas.microsoft.com/office/drawing/2014/main" id="{8BC466E0-473E-56E8-F8AB-B03F73AB2C96}"/>
+              </a:ext>
+            </a:extLst>
+          </p:cNvPr>
+          <p:cNvPicPr>
+            <a:picLocks noChangeAspect="1"/>
+          </p:cNvPicPr>
+          <p:nvPr/>
+        </p:nvPicPr>
+        <p:blipFill>
+          <a:blip r:embed="rId2"/>
+          <a:stretch>
+            <a:fillRect/>
+          </a:stretch>
+        </p:blipFill>
+        <p:spPr>
+          <a:xfrm>
+            <a:off x="1360098" y="1210163"/>
+            <a:ext cx="9615577" cy="4897749"/>
+          </a:xfrm>
+          <a:prstGeom prst="rect">
+            <a:avLst/>
+          </a:prstGeom>
+        </p:spPr>
+      </p:pic>
+    </p:spTree>
+    <p:extLst>
+      <p:ext uri="{BB962C8B-B14F-4D97-AF65-F5344CB8AC3E}">
+        <p14:creationId xmlns:p14="http://schemas.microsoft.com/office/powerpoint/2010/main" val="411311228"/>
+      </p:ext>
+    </p:extLst>
+  </p:cSld>
+  <p:clrMapOvr>
+    <a:masterClrMapping/>
+  </p:clrMapOvr>
+</p:sld>
+</file>
+
+<file path=ppt/slides/slide14.xml><?xml version="1.0" encoding="utf-8"?>
+<p:sld xmlns:a="http://schemas.openxmlformats.org/drawingml/2006/main" xmlns:r="http://schemas.openxmlformats.org/officeDocument/2006/relationships" xmlns:p="http://schemas.openxmlformats.org/presentationml/2006/main">
+  <p:cSld>
+    <p:spTree>
+      <p:nvGrpSpPr>
+        <p:cNvPr id="1" name=""/>
+        <p:cNvGrpSpPr/>
+        <p:nvPr/>
+      </p:nvGrpSpPr>
+      <p:grpSpPr>
+        <a:xfrm>
+          <a:off x="0" y="0"/>
+          <a:ext cx="0" cy="0"/>
+          <a:chOff x="0" y="0"/>
+          <a:chExt cx="0" cy="0"/>
+        </a:xfrm>
+      </p:grpSpPr>
+      <p:sp>
+        <p:nvSpPr>
+          <p:cNvPr id="2" name="文本占位符 1">
+            <a:extLst>
+              <a:ext uri="{FF2B5EF4-FFF2-40B4-BE49-F238E27FC236}">
+                <a16:creationId xmlns:a16="http://schemas.microsoft.com/office/drawing/2014/main" id="{213CA3C2-2ACE-D148-9DEB-98694BBF639A}"/>
+              </a:ext>
+            </a:extLst>
+          </p:cNvPr>
+          <p:cNvSpPr>
+            <a:spLocks noGrp="1"/>
+          </p:cNvSpPr>
+          <p:nvPr>
+            <p:ph type="body" sz="quarter" idx="10"/>
+          </p:nvPr>
+        </p:nvSpPr>
+        <p:spPr/>
+        <p:txBody>
+          <a:bodyPr>
+            <a:normAutofit/>
+          </a:bodyPr>
+          <a:lstStyle/>
+          <a:p>
+            <a:pPr algn="l"/>
+            <a:r>
+              <a:rPr lang="zh-CN" altLang="en-US" sz="3600" b="1">
+                <a:ea typeface="宋体"/>
+                <a:cs typeface="Arial"/>
+              </a:rPr>
+              <a:t>Web Portal</a:t>
+            </a:r>
+            <a:endParaRPr lang="zh-CN" altLang="en-US" sz="3600" b="1"/>
+          </a:p>
+        </p:txBody>
+      </p:sp>
+      <p:sp>
+        <p:nvSpPr>
+          <p:cNvPr id="3" name="灯片编号占位符 2">
+            <a:extLst>
+              <a:ext uri="{FF2B5EF4-FFF2-40B4-BE49-F238E27FC236}">
+                <a16:creationId xmlns:a16="http://schemas.microsoft.com/office/drawing/2014/main" id="{206E8B07-3FBB-34EF-DF9F-3EC1027A9B3C}"/>
+              </a:ext>
+            </a:extLst>
+          </p:cNvPr>
+          <p:cNvSpPr>
+            <a:spLocks noGrp="1"/>
+          </p:cNvSpPr>
+          <p:nvPr>
+            <p:ph type="sldNum" sz="quarter" idx="13"/>
+          </p:nvPr>
+        </p:nvSpPr>
+        <p:spPr/>
+        <p:txBody>
+          <a:bodyPr/>
+          <a:lstStyle/>
+          <a:p>
+            <a:fld id="{330EA680-D336-4FF7-8B7A-9848BB0A1C32}" type="slidenum">
+              <a:rPr lang="en-GB" smtClean="0"/>
+              <a:t>14</a:t>
+            </a:fld>
+            <a:endParaRPr lang="en-GB"/>
+          </a:p>
+        </p:txBody>
+      </p:sp>
+      <p:pic>
+        <p:nvPicPr>
+          <p:cNvPr id="5" name="Picture 5" descr="Graphical user interface, text, application, email&#10;&#10;Description automatically generated">
+            <a:extLst>
+              <a:ext uri="{FF2B5EF4-FFF2-40B4-BE49-F238E27FC236}">
+                <a16:creationId xmlns:a16="http://schemas.microsoft.com/office/drawing/2014/main" id="{1547FB71-0D4C-8FD6-96D1-6858075CD204}"/>
+              </a:ext>
+            </a:extLst>
+          </p:cNvPr>
+          <p:cNvPicPr>
+            <a:picLocks noChangeAspect="1"/>
+          </p:cNvPicPr>
+          <p:nvPr/>
+        </p:nvPicPr>
+        <p:blipFill>
+          <a:blip r:embed="rId2"/>
+          <a:stretch>
+            <a:fillRect/>
+          </a:stretch>
+        </p:blipFill>
+        <p:spPr>
+          <a:xfrm>
+            <a:off x="1216325" y="1134260"/>
+            <a:ext cx="10147539" cy="5222084"/>
+          </a:xfrm>
+          <a:prstGeom prst="rect">
+            <a:avLst/>
+          </a:prstGeom>
+        </p:spPr>
+      </p:pic>
+    </p:spTree>
+    <p:extLst>
+      <p:ext uri="{BB962C8B-B14F-4D97-AF65-F5344CB8AC3E}">
+        <p14:creationId xmlns:p14="http://schemas.microsoft.com/office/powerpoint/2010/main" val="1866968101"/>
+      </p:ext>
+    </p:extLst>
+  </p:cSld>
+  <p:clrMapOvr>
+    <a:masterClrMapping/>
+  </p:clrMapOvr>
+</p:sld>
+</file>
+
+<file path=ppt/slides/slide15.xml><?xml version="1.0" encoding="utf-8"?>
+<p:sld xmlns:a="http://schemas.openxmlformats.org/drawingml/2006/main" xmlns:r="http://schemas.openxmlformats.org/officeDocument/2006/relationships" xmlns:p="http://schemas.openxmlformats.org/presentationml/2006/main">
+  <p:cSld>
+    <p:spTree>
+      <p:nvGrpSpPr>
+        <p:cNvPr id="1" name=""/>
+        <p:cNvGrpSpPr/>
+        <p:nvPr/>
+      </p:nvGrpSpPr>
+      <p:grpSpPr>
+        <a:xfrm>
+          <a:off x="0" y="0"/>
+          <a:ext cx="0" cy="0"/>
+          <a:chOff x="0" y="0"/>
+          <a:chExt cx="0" cy="0"/>
+        </a:xfrm>
+      </p:grpSpPr>
+      <p:sp>
+        <p:nvSpPr>
+          <p:cNvPr id="3" name="Slide Number Placeholder 2">
+            <a:extLst>
+              <a:ext uri="{FF2B5EF4-FFF2-40B4-BE49-F238E27FC236}">
+                <a16:creationId xmlns:a16="http://schemas.microsoft.com/office/drawing/2014/main" id="{AB4F9BFB-1A7C-4705-BCCE-4E4EFB7D2992}"/>
+              </a:ext>
+            </a:extLst>
+          </p:cNvPr>
+          <p:cNvSpPr>
+            <a:spLocks noGrp="1"/>
+          </p:cNvSpPr>
+          <p:nvPr>
+            <p:ph type="sldNum" sz="quarter" idx="12"/>
+          </p:nvPr>
+        </p:nvSpPr>
+        <p:spPr/>
+        <p:txBody>
+          <a:bodyPr/>
+          <a:lstStyle/>
+          <a:p>
+            <a:fld id="{330EA680-D336-4FF7-8B7A-9848BB0A1C32}" type="slidenum">
+              <a:rPr lang="en-GB" smtClean="0"/>
+              <a:t>15</a:t>
+            </a:fld>
+            <a:endParaRPr lang="en-GB"/>
+          </a:p>
+        </p:txBody>
+      </p:sp>
+      <p:sp>
+        <p:nvSpPr>
+          <p:cNvPr id="24" name="Text Placeholder 1">
+            <a:extLst>
+              <a:ext uri="{FF2B5EF4-FFF2-40B4-BE49-F238E27FC236}">
+                <a16:creationId xmlns:a16="http://schemas.microsoft.com/office/drawing/2014/main" id="{BFA11CF6-82D4-B75E-8E75-6F359B679429}"/>
+              </a:ext>
+            </a:extLst>
+          </p:cNvPr>
+          <p:cNvSpPr txBox="1">
+            <a:spLocks/>
+          </p:cNvSpPr>
+          <p:nvPr/>
+        </p:nvSpPr>
+        <p:spPr>
+          <a:xfrm>
+            <a:off x="323529" y="339509"/>
+            <a:ext cx="11573197" cy="724247"/>
+          </a:xfrm>
+          <a:prstGeom prst="rect">
+            <a:avLst/>
+          </a:prstGeom>
+        </p:spPr>
+        <p:txBody>
+          <a:bodyPr vert="horz" lIns="91440" tIns="45720" rIns="91440" bIns="45720" rtlCol="0" anchor="ctr">
+            <a:normAutofit/>
+          </a:bodyPr>
+          <a:lstStyle>
+            <a:lvl1pPr marL="0" indent="0" algn="ctr" defTabSz="914400" rtl="0" eaLnBrk="1" latinLnBrk="0" hangingPunct="1">
+              <a:lnSpc>
+                <a:spcPct val="90000"/>
+              </a:lnSpc>
+              <a:spcBef>
+                <a:spcPts val="1000"/>
+              </a:spcBef>
+              <a:buFont typeface="Arial" panose="020B0604020202090204" pitchFamily="34" charset="0"/>
+              <a:buNone/>
+              <a:defRPr sz="5400" b="0" kern="1200" baseline="0">
+                <a:solidFill>
+                  <a:schemeClr val="tx1">
+                    <a:lumMod val="85000"/>
+                    <a:lumOff val="15000"/>
+                  </a:schemeClr>
+                </a:solidFill>
+                <a:latin typeface="+mj-lt"/>
+                <a:ea typeface="+mn-ea"/>
+                <a:cs typeface="Arial" panose="020B0604020202090204" pitchFamily="34" charset="0"/>
+              </a:defRPr>
+            </a:lvl1pPr>
+            <a:lvl2pPr marL="685800" indent="-228600" algn="l" defTabSz="914400" rtl="0" eaLnBrk="1" latinLnBrk="0" hangingPunct="1">
+              <a:lnSpc>
+                <a:spcPct val="90000"/>
+              </a:lnSpc>
+              <a:spcBef>
+                <a:spcPts val="500"/>
+              </a:spcBef>
+              <a:buFont typeface="Arial" panose="020B0604020202090204" pitchFamily="34" charset="0"/>
+              <a:buChar char="•"/>
+              <a:defRPr sz="2400" kern="1200">
+                <a:solidFill>
+                  <a:schemeClr val="tx1"/>
+                </a:solidFill>
+                <a:latin typeface="+mn-lt"/>
+                <a:ea typeface="+mn-ea"/>
+                <a:cs typeface="+mn-cs"/>
+              </a:defRPr>
+            </a:lvl2pPr>
+            <a:lvl3pPr marL="1143000" indent="-228600" algn="l" defTabSz="914400" rtl="0" eaLnBrk="1" latinLnBrk="0" hangingPunct="1">
+              <a:lnSpc>
+                <a:spcPct val="90000"/>
+              </a:lnSpc>
+              <a:spcBef>
+                <a:spcPts val="500"/>
+              </a:spcBef>
+              <a:buFont typeface="Arial" panose="020B0604020202090204" pitchFamily="34" charset="0"/>
+              <a:buChar char="•"/>
+              <a:defRPr sz="2000" kern="1200">
+                <a:solidFill>
+                  <a:schemeClr val="tx1"/>
+                </a:solidFill>
+                <a:latin typeface="+mn-lt"/>
+                <a:ea typeface="+mn-ea"/>
+                <a:cs typeface="+mn-cs"/>
+              </a:defRPr>
+            </a:lvl3pPr>
+            <a:lvl4pPr marL="1600200" indent="-228600" algn="l" defTabSz="914400" rtl="0" eaLnBrk="1" latinLnBrk="0" hangingPunct="1">
+              <a:lnSpc>
+                <a:spcPct val="90000"/>
+              </a:lnSpc>
+              <a:spcBef>
+                <a:spcPts val="500"/>
+              </a:spcBef>
+              <a:buFont typeface="Arial" panose="020B0604020202090204" pitchFamily="34" charset="0"/>
+              <a:buChar char="•"/>
+              <a:defRPr sz="1800" kern="1200">
+                <a:solidFill>
+                  <a:schemeClr val="tx1"/>
+                </a:solidFill>
+                <a:latin typeface="+mn-lt"/>
+                <a:ea typeface="+mn-ea"/>
+                <a:cs typeface="+mn-cs"/>
+              </a:defRPr>
+            </a:lvl4pPr>
+            <a:lvl5pPr marL="2057400" indent="-228600" algn="l" defTabSz="914400" rtl="0" eaLnBrk="1" latinLnBrk="0" hangingPunct="1">
+              <a:lnSpc>
+                <a:spcPct val="90000"/>
+              </a:lnSpc>
+              <a:spcBef>
+                <a:spcPts val="500"/>
+              </a:spcBef>
+              <a:buFont typeface="Arial" panose="020B0604020202090204" pitchFamily="34" charset="0"/>
+              <a:buChar char="•"/>
+              <a:defRPr sz="1800" kern="1200">
+                <a:solidFill>
+                  <a:schemeClr val="tx1"/>
+                </a:solidFill>
+                <a:latin typeface="+mn-lt"/>
+                <a:ea typeface="+mn-ea"/>
+                <a:cs typeface="+mn-cs"/>
+              </a:defRPr>
+            </a:lvl5pPr>
+            <a:lvl6pPr marL="2514600" indent="-228600" algn="l" defTabSz="914400" rtl="0" eaLnBrk="1" latinLnBrk="0" hangingPunct="1">
+              <a:lnSpc>
+                <a:spcPct val="90000"/>
+              </a:lnSpc>
+              <a:spcBef>
+                <a:spcPts val="500"/>
+              </a:spcBef>
+              <a:buFont typeface="Arial" panose="020B0604020202090204" pitchFamily="34" charset="0"/>
+              <a:buChar char="•"/>
+              <a:defRPr sz="1800" kern="1200">
+                <a:solidFill>
+                  <a:schemeClr val="tx1"/>
+                </a:solidFill>
+                <a:latin typeface="+mn-lt"/>
+                <a:ea typeface="+mn-ea"/>
+                <a:cs typeface="+mn-cs"/>
+              </a:defRPr>
+            </a:lvl6pPr>
+            <a:lvl7pPr marL="2971800" indent="-228600" algn="l" defTabSz="914400" rtl="0" eaLnBrk="1" latinLnBrk="0" hangingPunct="1">
+              <a:lnSpc>
+                <a:spcPct val="90000"/>
+              </a:lnSpc>
+              <a:spcBef>
+                <a:spcPts val="500"/>
+              </a:spcBef>
+              <a:buFont typeface="Arial" panose="020B0604020202090204" pitchFamily="34" charset="0"/>
+              <a:buChar char="•"/>
+              <a:defRPr sz="1800" kern="1200">
+                <a:solidFill>
+                  <a:schemeClr val="tx1"/>
+                </a:solidFill>
+                <a:latin typeface="+mn-lt"/>
+                <a:ea typeface="+mn-ea"/>
+                <a:cs typeface="+mn-cs"/>
+              </a:defRPr>
+            </a:lvl7pPr>
+            <a:lvl8pPr marL="3429000" indent="-228600" algn="l" defTabSz="914400" rtl="0" eaLnBrk="1" latinLnBrk="0" hangingPunct="1">
+              <a:lnSpc>
+                <a:spcPct val="90000"/>
+              </a:lnSpc>
+              <a:spcBef>
+                <a:spcPts val="500"/>
+              </a:spcBef>
+              <a:buFont typeface="Arial" panose="020B0604020202090204" pitchFamily="34" charset="0"/>
+              <a:buChar char="•"/>
+              <a:defRPr sz="1800" kern="1200">
+                <a:solidFill>
+                  <a:schemeClr val="tx1"/>
+                </a:solidFill>
+                <a:latin typeface="+mn-lt"/>
+                <a:ea typeface="+mn-ea"/>
+                <a:cs typeface="+mn-cs"/>
+              </a:defRPr>
+            </a:lvl8pPr>
+            <a:lvl9pPr marL="3886200" indent="-228600" algn="l" defTabSz="914400" rtl="0" eaLnBrk="1" latinLnBrk="0" hangingPunct="1">
+              <a:lnSpc>
+                <a:spcPct val="90000"/>
+              </a:lnSpc>
+              <a:spcBef>
+                <a:spcPts val="500"/>
+              </a:spcBef>
+              <a:buFont typeface="Arial" panose="020B0604020202090204" pitchFamily="34" charset="0"/>
+              <a:buChar char="•"/>
+              <a:defRPr sz="1800" kern="1200">
+                <a:solidFill>
+                  <a:schemeClr val="tx1"/>
+                </a:solidFill>
+                <a:latin typeface="+mn-lt"/>
+                <a:ea typeface="+mn-ea"/>
+                <a:cs typeface="+mn-cs"/>
+              </a:defRPr>
+            </a:lvl9pPr>
+          </a:lstStyle>
+          <a:p>
+            <a:pPr algn="l"/>
+            <a:r>
+              <a:rPr lang="en-GB" altLang="zh-CN" sz="3600" b="1">
+                <a:ea typeface="宋体"/>
+                <a:cs typeface="Arial"/>
+              </a:rPr>
+              <a:t>Web Portal</a:t>
+            </a:r>
+            <a:endParaRPr lang="en-GB" altLang="zh-CN" sz="3600" b="1">
+              <a:ea typeface="宋体"/>
+            </a:endParaRPr>
+          </a:p>
+        </p:txBody>
+      </p:sp>
+      <p:pic>
+        <p:nvPicPr>
+          <p:cNvPr id="2" name="Picture 3" descr="Graphical user interface, text, application&#10;&#10;Description automatically generated">
+            <a:extLst>
+              <a:ext uri="{FF2B5EF4-FFF2-40B4-BE49-F238E27FC236}">
+                <a16:creationId xmlns:a16="http://schemas.microsoft.com/office/drawing/2014/main" id="{BC56B29A-493C-56C4-777F-8C677E05A1D6}"/>
+              </a:ext>
+            </a:extLst>
+          </p:cNvPr>
+          <p:cNvPicPr>
+            <a:picLocks noChangeAspect="1"/>
+          </p:cNvPicPr>
+          <p:nvPr/>
+        </p:nvPicPr>
+        <p:blipFill rotWithShape="1">
+          <a:blip r:embed="rId3"/>
+          <a:srcRect r="157" b="2769"/>
+          <a:stretch/>
+        </p:blipFill>
+        <p:spPr>
+          <a:xfrm>
+            <a:off x="1158815" y="1304781"/>
+            <a:ext cx="9558074" cy="4751850"/>
+          </a:xfrm>
+          <a:prstGeom prst="rect">
+            <a:avLst/>
+          </a:prstGeom>
+        </p:spPr>
+      </p:pic>
+    </p:spTree>
+    <p:custDataLst>
+      <p:tags r:id="rId1"/>
+    </p:custDataLst>
+    <p:extLst>
+      <p:ext uri="{BB962C8B-B14F-4D97-AF65-F5344CB8AC3E}">
+        <p14:creationId xmlns:p14="http://schemas.microsoft.com/office/powerpoint/2010/main" val="2333955248"/>
       </p:ext>
     </p:extLst>
   </p:cSld>
@@ -3487,7 +4757,7 @@
             <p:ph idx="1"/>
             <p:extLst>
               <p:ext uri="{D42A27DB-BD31-4B8C-83A1-F6EECF244321}">
-                <p14:modId xmlns:p14="http://schemas.microsoft.com/office/powerpoint/2010/main" val="477656536"/>
+                <p14:modId xmlns:p14="http://schemas.microsoft.com/office/powerpoint/2010/main" val="1850266323"/>
               </p:ext>
             </p:extLst>
           </p:nvPr>
@@ -3623,7 +4893,10 @@
                     <a:bodyPr/>
                     <a:lstStyle/>
                     <a:p>
-                      <a:endParaRPr lang="en-US" dirty="0"/>
+                      <a:r>
+                        <a:rPr lang="en-US" dirty="0"/>
+                        <a:t>Tongtong</a:t>
+                      </a:r>
                     </a:p>
                   </a:txBody>
                   <a:tcPr/>
@@ -3850,6 +5123,947 @@
     <a:masterClrMapping/>
   </p:clrMapOvr>
 </p:sld>
+</file>
+
+<file path=ppt/slides/slide3.xml><?xml version="1.0" encoding="utf-8"?>
+<p:sld xmlns:a="http://schemas.openxmlformats.org/drawingml/2006/main" xmlns:r="http://schemas.openxmlformats.org/officeDocument/2006/relationships" xmlns:p="http://schemas.openxmlformats.org/presentationml/2006/main">
+  <p:cSld>
+    <p:spTree>
+      <p:nvGrpSpPr>
+        <p:cNvPr id="1" name=""/>
+        <p:cNvGrpSpPr/>
+        <p:nvPr/>
+      </p:nvGrpSpPr>
+      <p:grpSpPr>
+        <a:xfrm>
+          <a:off x="0" y="0"/>
+          <a:ext cx="0" cy="0"/>
+          <a:chOff x="0" y="0"/>
+          <a:chExt cx="0" cy="0"/>
+        </a:xfrm>
+      </p:grpSpPr>
+      <p:sp>
+        <p:nvSpPr>
+          <p:cNvPr id="2" name="Title 1">
+            <a:extLst>
+              <a:ext uri="{FF2B5EF4-FFF2-40B4-BE49-F238E27FC236}">
+                <a16:creationId xmlns:a16="http://schemas.microsoft.com/office/drawing/2014/main" id="{25FCC1C3-BEE5-4A53-8316-F7F56FAB9B79}"/>
+              </a:ext>
+            </a:extLst>
+          </p:cNvPr>
+          <p:cNvSpPr>
+            <a:spLocks noGrp="1"/>
+          </p:cNvSpPr>
+          <p:nvPr>
+            <p:ph type="title"/>
+          </p:nvPr>
+        </p:nvSpPr>
+        <p:spPr/>
+        <p:txBody>
+          <a:bodyPr/>
+          <a:lstStyle/>
+          <a:p>
+            <a:r>
+              <a:rPr lang="en-US" dirty="0"/>
+              <a:t>Contents</a:t>
+            </a:r>
+          </a:p>
+        </p:txBody>
+      </p:sp>
+      <p:sp>
+        <p:nvSpPr>
+          <p:cNvPr id="3" name="Content Placeholder 2">
+            <a:extLst>
+              <a:ext uri="{FF2B5EF4-FFF2-40B4-BE49-F238E27FC236}">
+                <a16:creationId xmlns:a16="http://schemas.microsoft.com/office/drawing/2014/main" id="{70998903-B2F3-4CA9-A141-37101E721EC0}"/>
+              </a:ext>
+            </a:extLst>
+          </p:cNvPr>
+          <p:cNvSpPr>
+            <a:spLocks noGrp="1"/>
+          </p:cNvSpPr>
+          <p:nvPr>
+            <p:ph idx="1"/>
+          </p:nvPr>
+        </p:nvSpPr>
+        <p:spPr/>
+        <p:txBody>
+          <a:bodyPr/>
+          <a:lstStyle/>
+          <a:p>
+            <a:r>
+              <a:rPr lang="en-US" dirty="0"/>
+              <a:t>Login</a:t>
+            </a:r>
+          </a:p>
+          <a:p>
+            <a:r>
+              <a:rPr lang="en-US" dirty="0"/>
+              <a:t>Main</a:t>
+            </a:r>
+          </a:p>
+          <a:p>
+            <a:r>
+              <a:rPr lang="en-US" dirty="0"/>
+              <a:t>Upload</a:t>
+            </a:r>
+          </a:p>
+          <a:p>
+            <a:r>
+              <a:rPr lang="en-US" dirty="0"/>
+              <a:t>History</a:t>
+            </a:r>
+          </a:p>
+          <a:p>
+            <a:r>
+              <a:rPr lang="en-US" dirty="0"/>
+              <a:t>Report</a:t>
+            </a:r>
+          </a:p>
+          <a:p>
+            <a:r>
+              <a:rPr lang="en-US" dirty="0"/>
+              <a:t>About</a:t>
+            </a:r>
+          </a:p>
+          <a:p>
+            <a:endParaRPr lang="en-US" dirty="0"/>
+          </a:p>
+        </p:txBody>
+      </p:sp>
+    </p:spTree>
+    <p:extLst>
+      <p:ext uri="{BB962C8B-B14F-4D97-AF65-F5344CB8AC3E}">
+        <p14:creationId xmlns:p14="http://schemas.microsoft.com/office/powerpoint/2010/main" val="3356828406"/>
+      </p:ext>
+    </p:extLst>
+  </p:cSld>
+  <p:clrMapOvr>
+    <a:masterClrMapping/>
+  </p:clrMapOvr>
+</p:sld>
+</file>
+
+<file path=ppt/slides/slide4.xml><?xml version="1.0" encoding="utf-8"?>
+<p:sld xmlns:a="http://schemas.openxmlformats.org/drawingml/2006/main" xmlns:r="http://schemas.openxmlformats.org/officeDocument/2006/relationships" xmlns:p="http://schemas.openxmlformats.org/presentationml/2006/main">
+  <p:cSld>
+    <p:spTree>
+      <p:nvGrpSpPr>
+        <p:cNvPr id="1" name=""/>
+        <p:cNvGrpSpPr/>
+        <p:nvPr/>
+      </p:nvGrpSpPr>
+      <p:grpSpPr>
+        <a:xfrm>
+          <a:off x="0" y="0"/>
+          <a:ext cx="0" cy="0"/>
+          <a:chOff x="0" y="0"/>
+          <a:chExt cx="0" cy="0"/>
+        </a:xfrm>
+      </p:grpSpPr>
+      <p:sp>
+        <p:nvSpPr>
+          <p:cNvPr id="2" name="Title 1">
+            <a:extLst>
+              <a:ext uri="{FF2B5EF4-FFF2-40B4-BE49-F238E27FC236}">
+                <a16:creationId xmlns:a16="http://schemas.microsoft.com/office/drawing/2014/main" id="{928CA48A-31D2-4E26-B0A3-2FC10AE686AD}"/>
+              </a:ext>
+            </a:extLst>
+          </p:cNvPr>
+          <p:cNvSpPr>
+            <a:spLocks noGrp="1"/>
+          </p:cNvSpPr>
+          <p:nvPr>
+            <p:ph type="title"/>
+          </p:nvPr>
+        </p:nvSpPr>
+        <p:spPr/>
+        <p:txBody>
+          <a:bodyPr/>
+          <a:lstStyle/>
+          <a:p>
+            <a:r>
+              <a:rPr lang="en-US" dirty="0"/>
+              <a:t>Login</a:t>
+            </a:r>
+          </a:p>
+        </p:txBody>
+      </p:sp>
+      <p:sp>
+        <p:nvSpPr>
+          <p:cNvPr id="3" name="TextBox 2">
+            <a:extLst>
+              <a:ext uri="{FF2B5EF4-FFF2-40B4-BE49-F238E27FC236}">
+                <a16:creationId xmlns:a16="http://schemas.microsoft.com/office/drawing/2014/main" id="{FB9F481E-755B-4DB2-ABA9-7E573AA40CA6}"/>
+              </a:ext>
+            </a:extLst>
+          </p:cNvPr>
+          <p:cNvSpPr txBox="1"/>
+          <p:nvPr/>
+        </p:nvSpPr>
+        <p:spPr>
+          <a:xfrm>
+            <a:off x="1472241" y="6123543"/>
+            <a:ext cx="8679766" cy="369332"/>
+          </a:xfrm>
+          <a:prstGeom prst="rect">
+            <a:avLst/>
+          </a:prstGeom>
+          <a:noFill/>
+        </p:spPr>
+        <p:txBody>
+          <a:bodyPr wrap="square" rtlCol="0">
+            <a:spAutoFit/>
+          </a:bodyPr>
+          <a:lstStyle/>
+          <a:p>
+            <a:r>
+              <a:rPr lang="en-US" dirty="0"/>
+              <a:t>User can login with his/her username and password.</a:t>
+            </a:r>
+          </a:p>
+        </p:txBody>
+      </p:sp>
+    </p:spTree>
+    <p:extLst>
+      <p:ext uri="{BB962C8B-B14F-4D97-AF65-F5344CB8AC3E}">
+        <p14:creationId xmlns:p14="http://schemas.microsoft.com/office/powerpoint/2010/main" val="1777324752"/>
+      </p:ext>
+    </p:extLst>
+  </p:cSld>
+  <p:clrMapOvr>
+    <a:masterClrMapping/>
+  </p:clrMapOvr>
+</p:sld>
+</file>
+
+<file path=ppt/slides/slide5.xml><?xml version="1.0" encoding="utf-8"?>
+<p:sld xmlns:a="http://schemas.openxmlformats.org/drawingml/2006/main" xmlns:r="http://schemas.openxmlformats.org/officeDocument/2006/relationships" xmlns:p="http://schemas.openxmlformats.org/presentationml/2006/main">
+  <p:cSld>
+    <p:spTree>
+      <p:nvGrpSpPr>
+        <p:cNvPr id="1" name=""/>
+        <p:cNvGrpSpPr/>
+        <p:nvPr/>
+      </p:nvGrpSpPr>
+      <p:grpSpPr>
+        <a:xfrm>
+          <a:off x="0" y="0"/>
+          <a:ext cx="0" cy="0"/>
+          <a:chOff x="0" y="0"/>
+          <a:chExt cx="0" cy="0"/>
+        </a:xfrm>
+      </p:grpSpPr>
+      <p:pic>
+        <p:nvPicPr>
+          <p:cNvPr id="4" name="Picture 7" descr="Graphical user interface, text, application, email&#10;&#10;Description automatically generated">
+            <a:extLst>
+              <a:ext uri="{FF2B5EF4-FFF2-40B4-BE49-F238E27FC236}">
+                <a16:creationId xmlns:a16="http://schemas.microsoft.com/office/drawing/2014/main" id="{BE6C0C58-FEB8-4DFC-B8B6-C1B14D7DCD3C}"/>
+              </a:ext>
+            </a:extLst>
+          </p:cNvPr>
+          <p:cNvPicPr>
+            <a:picLocks noChangeAspect="1"/>
+          </p:cNvPicPr>
+          <p:nvPr/>
+        </p:nvPicPr>
+        <p:blipFill>
+          <a:blip r:embed="rId2"/>
+          <a:stretch>
+            <a:fillRect/>
+          </a:stretch>
+        </p:blipFill>
+        <p:spPr>
+          <a:xfrm>
+            <a:off x="1790401" y="1690688"/>
+            <a:ext cx="8043446" cy="4130868"/>
+          </a:xfrm>
+          <a:prstGeom prst="rect">
+            <a:avLst/>
+          </a:prstGeom>
+        </p:spPr>
+      </p:pic>
+      <p:sp>
+        <p:nvSpPr>
+          <p:cNvPr id="2" name="Title 1">
+            <a:extLst>
+              <a:ext uri="{FF2B5EF4-FFF2-40B4-BE49-F238E27FC236}">
+                <a16:creationId xmlns:a16="http://schemas.microsoft.com/office/drawing/2014/main" id="{928CA48A-31D2-4E26-B0A3-2FC10AE686AD}"/>
+              </a:ext>
+            </a:extLst>
+          </p:cNvPr>
+          <p:cNvSpPr>
+            <a:spLocks noGrp="1"/>
+          </p:cNvSpPr>
+          <p:nvPr>
+            <p:ph type="title"/>
+          </p:nvPr>
+        </p:nvSpPr>
+        <p:spPr/>
+        <p:txBody>
+          <a:bodyPr/>
+          <a:lstStyle/>
+          <a:p>
+            <a:r>
+              <a:rPr lang="en-US" dirty="0"/>
+              <a:t>Main</a:t>
+            </a:r>
+          </a:p>
+        </p:txBody>
+      </p:sp>
+      <p:sp>
+        <p:nvSpPr>
+          <p:cNvPr id="3" name="TextBox 2">
+            <a:extLst>
+              <a:ext uri="{FF2B5EF4-FFF2-40B4-BE49-F238E27FC236}">
+                <a16:creationId xmlns:a16="http://schemas.microsoft.com/office/drawing/2014/main" id="{FB9F481E-755B-4DB2-ABA9-7E573AA40CA6}"/>
+              </a:ext>
+            </a:extLst>
+          </p:cNvPr>
+          <p:cNvSpPr txBox="1"/>
+          <p:nvPr/>
+        </p:nvSpPr>
+        <p:spPr>
+          <a:xfrm>
+            <a:off x="1472241" y="6123543"/>
+            <a:ext cx="8679766" cy="369332"/>
+          </a:xfrm>
+          <a:prstGeom prst="rect">
+            <a:avLst/>
+          </a:prstGeom>
+          <a:noFill/>
+        </p:spPr>
+        <p:txBody>
+          <a:bodyPr wrap="square" rtlCol="0">
+            <a:spAutoFit/>
+          </a:bodyPr>
+          <a:lstStyle/>
+          <a:p>
+            <a:r>
+              <a:rPr lang="en-US" dirty="0"/>
+              <a:t>This is designed as a dashboard to show summary information of current user.</a:t>
+            </a:r>
+          </a:p>
+        </p:txBody>
+      </p:sp>
+    </p:spTree>
+    <p:extLst>
+      <p:ext uri="{BB962C8B-B14F-4D97-AF65-F5344CB8AC3E}">
+        <p14:creationId xmlns:p14="http://schemas.microsoft.com/office/powerpoint/2010/main" val="2607911492"/>
+      </p:ext>
+    </p:extLst>
+  </p:cSld>
+  <p:clrMapOvr>
+    <a:masterClrMapping/>
+  </p:clrMapOvr>
+</p:sld>
+</file>
+
+<file path=ppt/slides/slide6.xml><?xml version="1.0" encoding="utf-8"?>
+<p:sld xmlns:a="http://schemas.openxmlformats.org/drawingml/2006/main" xmlns:r="http://schemas.openxmlformats.org/officeDocument/2006/relationships" xmlns:p="http://schemas.openxmlformats.org/presentationml/2006/main">
+  <p:cSld>
+    <p:spTree>
+      <p:nvGrpSpPr>
+        <p:cNvPr id="1" name=""/>
+        <p:cNvGrpSpPr/>
+        <p:nvPr/>
+      </p:nvGrpSpPr>
+      <p:grpSpPr>
+        <a:xfrm>
+          <a:off x="0" y="0"/>
+          <a:ext cx="0" cy="0"/>
+          <a:chOff x="0" y="0"/>
+          <a:chExt cx="0" cy="0"/>
+        </a:xfrm>
+      </p:grpSpPr>
+      <p:sp>
+        <p:nvSpPr>
+          <p:cNvPr id="2" name="文本占位符 1">
+            <a:extLst>
+              <a:ext uri="{FF2B5EF4-FFF2-40B4-BE49-F238E27FC236}">
+                <a16:creationId xmlns:a16="http://schemas.microsoft.com/office/drawing/2014/main" id="{213CA3C2-2ACE-D148-9DEB-98694BBF639A}"/>
+              </a:ext>
+            </a:extLst>
+          </p:cNvPr>
+          <p:cNvSpPr>
+            <a:spLocks noGrp="1"/>
+          </p:cNvSpPr>
+          <p:nvPr>
+            <p:ph type="body" sz="quarter" idx="10"/>
+          </p:nvPr>
+        </p:nvSpPr>
+        <p:spPr/>
+        <p:txBody>
+          <a:bodyPr>
+            <a:normAutofit/>
+          </a:bodyPr>
+          <a:lstStyle/>
+          <a:p>
+            <a:pPr algn="l"/>
+            <a:r>
+              <a:rPr lang="zh-CN" altLang="en-US" sz="3600" b="1" dirty="0">
+                <a:ea typeface="宋体"/>
+                <a:cs typeface="Arial"/>
+              </a:rPr>
+              <a:t>Web Portal</a:t>
+            </a:r>
+            <a:endParaRPr lang="zh-CN" altLang="en-US" sz="3600" b="1" dirty="0"/>
+          </a:p>
+        </p:txBody>
+      </p:sp>
+      <p:sp>
+        <p:nvSpPr>
+          <p:cNvPr id="3" name="灯片编号占位符 2">
+            <a:extLst>
+              <a:ext uri="{FF2B5EF4-FFF2-40B4-BE49-F238E27FC236}">
+                <a16:creationId xmlns:a16="http://schemas.microsoft.com/office/drawing/2014/main" id="{206E8B07-3FBB-34EF-DF9F-3EC1027A9B3C}"/>
+              </a:ext>
+            </a:extLst>
+          </p:cNvPr>
+          <p:cNvSpPr>
+            <a:spLocks noGrp="1"/>
+          </p:cNvSpPr>
+          <p:nvPr>
+            <p:ph type="sldNum" sz="quarter" idx="13"/>
+          </p:nvPr>
+        </p:nvSpPr>
+        <p:spPr/>
+        <p:txBody>
+          <a:bodyPr/>
+          <a:lstStyle/>
+          <a:p>
+            <a:fld id="{330EA680-D336-4FF7-8B7A-9848BB0A1C32}" type="slidenum">
+              <a:rPr lang="en-GB" smtClean="0"/>
+              <a:t>6</a:t>
+            </a:fld>
+            <a:endParaRPr lang="en-GB"/>
+          </a:p>
+        </p:txBody>
+      </p:sp>
+      <p:pic>
+        <p:nvPicPr>
+          <p:cNvPr id="6" name="Picture 6" descr="Graphical user interface, text, application, email&#10;&#10;Description automatically generated">
+            <a:extLst>
+              <a:ext uri="{FF2B5EF4-FFF2-40B4-BE49-F238E27FC236}">
+                <a16:creationId xmlns:a16="http://schemas.microsoft.com/office/drawing/2014/main" id="{459336C1-9643-9062-263A-1C0831F373C5}"/>
+              </a:ext>
+            </a:extLst>
+          </p:cNvPr>
+          <p:cNvPicPr>
+            <a:picLocks noChangeAspect="1"/>
+          </p:cNvPicPr>
+          <p:nvPr/>
+        </p:nvPicPr>
+        <p:blipFill>
+          <a:blip r:embed="rId2"/>
+          <a:stretch>
+            <a:fillRect/>
+          </a:stretch>
+        </p:blipFill>
+        <p:spPr>
+          <a:xfrm>
+            <a:off x="1460740" y="1377672"/>
+            <a:ext cx="8954217" cy="4562732"/>
+          </a:xfrm>
+          <a:prstGeom prst="rect">
+            <a:avLst/>
+          </a:prstGeom>
+        </p:spPr>
+      </p:pic>
+    </p:spTree>
+    <p:extLst>
+      <p:ext uri="{BB962C8B-B14F-4D97-AF65-F5344CB8AC3E}">
+        <p14:creationId xmlns:p14="http://schemas.microsoft.com/office/powerpoint/2010/main" val="724010758"/>
+      </p:ext>
+    </p:extLst>
+  </p:cSld>
+  <p:clrMapOvr>
+    <a:masterClrMapping/>
+  </p:clrMapOvr>
+</p:sld>
+</file>
+
+<file path=ppt/slides/slide7.xml><?xml version="1.0" encoding="utf-8"?>
+<p:sld xmlns:a="http://schemas.openxmlformats.org/drawingml/2006/main" xmlns:r="http://schemas.openxmlformats.org/officeDocument/2006/relationships" xmlns:p="http://schemas.openxmlformats.org/presentationml/2006/main">
+  <p:cSld>
+    <p:spTree>
+      <p:nvGrpSpPr>
+        <p:cNvPr id="1" name=""/>
+        <p:cNvGrpSpPr/>
+        <p:nvPr/>
+      </p:nvGrpSpPr>
+      <p:grpSpPr>
+        <a:xfrm>
+          <a:off x="0" y="0"/>
+          <a:ext cx="0" cy="0"/>
+          <a:chOff x="0" y="0"/>
+          <a:chExt cx="0" cy="0"/>
+        </a:xfrm>
+      </p:grpSpPr>
+      <p:sp>
+        <p:nvSpPr>
+          <p:cNvPr id="2" name="文本占位符 1">
+            <a:extLst>
+              <a:ext uri="{FF2B5EF4-FFF2-40B4-BE49-F238E27FC236}">
+                <a16:creationId xmlns:a16="http://schemas.microsoft.com/office/drawing/2014/main" id="{213CA3C2-2ACE-D148-9DEB-98694BBF639A}"/>
+              </a:ext>
+            </a:extLst>
+          </p:cNvPr>
+          <p:cNvSpPr>
+            <a:spLocks noGrp="1"/>
+          </p:cNvSpPr>
+          <p:nvPr>
+            <p:ph type="body" sz="quarter" idx="10"/>
+          </p:nvPr>
+        </p:nvSpPr>
+        <p:spPr/>
+        <p:txBody>
+          <a:bodyPr>
+            <a:normAutofit/>
+          </a:bodyPr>
+          <a:lstStyle/>
+          <a:p>
+            <a:pPr algn="l"/>
+            <a:r>
+              <a:rPr lang="zh-CN" altLang="en-US" sz="3600" b="1">
+                <a:ea typeface="宋体"/>
+                <a:cs typeface="Arial"/>
+              </a:rPr>
+              <a:t>Web Portal</a:t>
+            </a:r>
+            <a:endParaRPr lang="zh-CN" altLang="en-US" sz="3600" b="1"/>
+          </a:p>
+        </p:txBody>
+      </p:sp>
+      <p:sp>
+        <p:nvSpPr>
+          <p:cNvPr id="3" name="灯片编号占位符 2">
+            <a:extLst>
+              <a:ext uri="{FF2B5EF4-FFF2-40B4-BE49-F238E27FC236}">
+                <a16:creationId xmlns:a16="http://schemas.microsoft.com/office/drawing/2014/main" id="{206E8B07-3FBB-34EF-DF9F-3EC1027A9B3C}"/>
+              </a:ext>
+            </a:extLst>
+          </p:cNvPr>
+          <p:cNvSpPr>
+            <a:spLocks noGrp="1"/>
+          </p:cNvSpPr>
+          <p:nvPr>
+            <p:ph type="sldNum" sz="quarter" idx="13"/>
+          </p:nvPr>
+        </p:nvSpPr>
+        <p:spPr/>
+        <p:txBody>
+          <a:bodyPr/>
+          <a:lstStyle/>
+          <a:p>
+            <a:fld id="{330EA680-D336-4FF7-8B7A-9848BB0A1C32}" type="slidenum">
+              <a:rPr lang="en-GB" smtClean="0"/>
+              <a:t>7</a:t>
+            </a:fld>
+            <a:endParaRPr lang="en-GB"/>
+          </a:p>
+        </p:txBody>
+      </p:sp>
+      <p:pic>
+        <p:nvPicPr>
+          <p:cNvPr id="5" name="Picture 5" descr="Table&#10;&#10;Description automatically generated">
+            <a:extLst>
+              <a:ext uri="{FF2B5EF4-FFF2-40B4-BE49-F238E27FC236}">
+                <a16:creationId xmlns:a16="http://schemas.microsoft.com/office/drawing/2014/main" id="{791E7A98-277C-CDA1-EF2E-FDA7B22795E8}"/>
+              </a:ext>
+            </a:extLst>
+          </p:cNvPr>
+          <p:cNvPicPr>
+            <a:picLocks noChangeAspect="1"/>
+          </p:cNvPicPr>
+          <p:nvPr/>
+        </p:nvPicPr>
+        <p:blipFill>
+          <a:blip r:embed="rId2"/>
+          <a:stretch>
+            <a:fillRect/>
+          </a:stretch>
+        </p:blipFill>
+        <p:spPr>
+          <a:xfrm>
+            <a:off x="1201947" y="1277030"/>
+            <a:ext cx="9701841" cy="4950922"/>
+          </a:xfrm>
+          <a:prstGeom prst="rect">
+            <a:avLst/>
+          </a:prstGeom>
+        </p:spPr>
+      </p:pic>
+    </p:spTree>
+    <p:extLst>
+      <p:ext uri="{BB962C8B-B14F-4D97-AF65-F5344CB8AC3E}">
+        <p14:creationId xmlns:p14="http://schemas.microsoft.com/office/powerpoint/2010/main" val="1332731430"/>
+      </p:ext>
+    </p:extLst>
+  </p:cSld>
+  <p:clrMapOvr>
+    <a:masterClrMapping/>
+  </p:clrMapOvr>
+</p:sld>
+</file>
+
+<file path=ppt/slides/slide8.xml><?xml version="1.0" encoding="utf-8"?>
+<p:sld xmlns:a="http://schemas.openxmlformats.org/drawingml/2006/main" xmlns:r="http://schemas.openxmlformats.org/officeDocument/2006/relationships" xmlns:p="http://schemas.openxmlformats.org/presentationml/2006/main">
+  <p:cSld>
+    <p:spTree>
+      <p:nvGrpSpPr>
+        <p:cNvPr id="1" name=""/>
+        <p:cNvGrpSpPr/>
+        <p:nvPr/>
+      </p:nvGrpSpPr>
+      <p:grpSpPr>
+        <a:xfrm>
+          <a:off x="0" y="0"/>
+          <a:ext cx="0" cy="0"/>
+          <a:chOff x="0" y="0"/>
+          <a:chExt cx="0" cy="0"/>
+        </a:xfrm>
+      </p:grpSpPr>
+      <p:pic>
+        <p:nvPicPr>
+          <p:cNvPr id="5" name="Picture 5" descr="Graphical user interface, application, Word&#10;&#10;Description automatically generated">
+            <a:extLst>
+              <a:ext uri="{FF2B5EF4-FFF2-40B4-BE49-F238E27FC236}">
+                <a16:creationId xmlns:a16="http://schemas.microsoft.com/office/drawing/2014/main" id="{FEB6E118-FD54-25FC-D0AE-9C2C6CCF6348}"/>
+              </a:ext>
+            </a:extLst>
+          </p:cNvPr>
+          <p:cNvPicPr>
+            <a:picLocks noChangeAspect="1"/>
+          </p:cNvPicPr>
+          <p:nvPr/>
+        </p:nvPicPr>
+        <p:blipFill>
+          <a:blip r:embed="rId2"/>
+          <a:stretch>
+            <a:fillRect/>
+          </a:stretch>
+        </p:blipFill>
+        <p:spPr>
+          <a:xfrm>
+            <a:off x="1000665" y="1174379"/>
+            <a:ext cx="10003766" cy="5084334"/>
+          </a:xfrm>
+          <a:prstGeom prst="rect">
+            <a:avLst/>
+          </a:prstGeom>
+        </p:spPr>
+      </p:pic>
+      <p:sp>
+        <p:nvSpPr>
+          <p:cNvPr id="2" name="文本占位符 1">
+            <a:extLst>
+              <a:ext uri="{FF2B5EF4-FFF2-40B4-BE49-F238E27FC236}">
+                <a16:creationId xmlns:a16="http://schemas.microsoft.com/office/drawing/2014/main" id="{213CA3C2-2ACE-D148-9DEB-98694BBF639A}"/>
+              </a:ext>
+            </a:extLst>
+          </p:cNvPr>
+          <p:cNvSpPr>
+            <a:spLocks noGrp="1"/>
+          </p:cNvSpPr>
+          <p:nvPr>
+            <p:ph type="body" sz="quarter" idx="10"/>
+          </p:nvPr>
+        </p:nvSpPr>
+        <p:spPr/>
+        <p:txBody>
+          <a:bodyPr>
+            <a:normAutofit/>
+          </a:bodyPr>
+          <a:lstStyle/>
+          <a:p>
+            <a:pPr algn="l"/>
+            <a:r>
+              <a:rPr lang="zh-CN" altLang="en-US" sz="3600" b="1">
+                <a:ea typeface="宋体"/>
+                <a:cs typeface="Arial"/>
+              </a:rPr>
+              <a:t>Web Portal</a:t>
+            </a:r>
+            <a:endParaRPr lang="zh-CN" altLang="en-US" sz="3600" b="1"/>
+          </a:p>
+        </p:txBody>
+      </p:sp>
+      <p:sp>
+        <p:nvSpPr>
+          <p:cNvPr id="3" name="灯片编号占位符 2">
+            <a:extLst>
+              <a:ext uri="{FF2B5EF4-FFF2-40B4-BE49-F238E27FC236}">
+                <a16:creationId xmlns:a16="http://schemas.microsoft.com/office/drawing/2014/main" id="{206E8B07-3FBB-34EF-DF9F-3EC1027A9B3C}"/>
+              </a:ext>
+            </a:extLst>
+          </p:cNvPr>
+          <p:cNvSpPr>
+            <a:spLocks noGrp="1"/>
+          </p:cNvSpPr>
+          <p:nvPr>
+            <p:ph type="sldNum" sz="quarter" idx="13"/>
+          </p:nvPr>
+        </p:nvSpPr>
+        <p:spPr/>
+        <p:txBody>
+          <a:bodyPr/>
+          <a:lstStyle/>
+          <a:p>
+            <a:fld id="{330EA680-D336-4FF7-8B7A-9848BB0A1C32}" type="slidenum">
+              <a:rPr lang="en-GB" smtClean="0"/>
+              <a:t>8</a:t>
+            </a:fld>
+            <a:endParaRPr lang="en-GB"/>
+          </a:p>
+        </p:txBody>
+      </p:sp>
+      <p:sp>
+        <p:nvSpPr>
+          <p:cNvPr id="7" name="Rectangle: Rounded Corners 6">
+            <a:extLst>
+              <a:ext uri="{FF2B5EF4-FFF2-40B4-BE49-F238E27FC236}">
+                <a16:creationId xmlns:a16="http://schemas.microsoft.com/office/drawing/2014/main" id="{56E149E3-66A3-A11B-D3DB-5EB22B71E8C8}"/>
+              </a:ext>
+            </a:extLst>
+          </p:cNvPr>
+          <p:cNvSpPr/>
+          <p:nvPr/>
+        </p:nvSpPr>
+        <p:spPr>
+          <a:xfrm>
+            <a:off x="1720316" y="4566119"/>
+            <a:ext cx="2113210" cy="432628"/>
+          </a:xfrm>
+          <a:prstGeom prst="roundRect">
+            <a:avLst/>
+          </a:prstGeom>
+          <a:noFill/>
+          <a:ln w="28575">
+            <a:solidFill>
+              <a:srgbClr val="FF0000"/>
+            </a:solidFill>
+          </a:ln>
+        </p:spPr>
+        <p:style>
+          <a:lnRef idx="2">
+            <a:schemeClr val="accent1">
+              <a:shade val="50000"/>
+            </a:schemeClr>
+          </a:lnRef>
+          <a:fillRef idx="1">
+            <a:schemeClr val="accent1"/>
+          </a:fillRef>
+          <a:effectRef idx="0">
+            <a:schemeClr val="accent1"/>
+          </a:effectRef>
+          <a:fontRef idx="minor">
+            <a:schemeClr val="lt1"/>
+          </a:fontRef>
+        </p:style>
+        <p:txBody>
+          <a:bodyPr rtlCol="0" anchor="ctr"/>
+          <a:lstStyle/>
+          <a:p>
+            <a:pPr algn="ctr"/>
+            <a:endParaRPr lang="en-US"/>
+          </a:p>
+        </p:txBody>
+      </p:sp>
+    </p:spTree>
+    <p:extLst>
+      <p:ext uri="{BB962C8B-B14F-4D97-AF65-F5344CB8AC3E}">
+        <p14:creationId xmlns:p14="http://schemas.microsoft.com/office/powerpoint/2010/main" val="1083243503"/>
+      </p:ext>
+    </p:extLst>
+  </p:cSld>
+  <p:clrMapOvr>
+    <a:masterClrMapping/>
+  </p:clrMapOvr>
+</p:sld>
+</file>
+
+<file path=ppt/slides/slide9.xml><?xml version="1.0" encoding="utf-8"?>
+<p:sld xmlns:a="http://schemas.openxmlformats.org/drawingml/2006/main" xmlns:r="http://schemas.openxmlformats.org/officeDocument/2006/relationships" xmlns:p="http://schemas.openxmlformats.org/presentationml/2006/main">
+  <p:cSld>
+    <p:spTree>
+      <p:nvGrpSpPr>
+        <p:cNvPr id="1" name=""/>
+        <p:cNvGrpSpPr/>
+        <p:nvPr/>
+      </p:nvGrpSpPr>
+      <p:grpSpPr>
+        <a:xfrm>
+          <a:off x="0" y="0"/>
+          <a:ext cx="0" cy="0"/>
+          <a:chOff x="0" y="0"/>
+          <a:chExt cx="0" cy="0"/>
+        </a:xfrm>
+      </p:grpSpPr>
+      <p:pic>
+        <p:nvPicPr>
+          <p:cNvPr id="4" name="Picture 5" descr="Graphical user interface, table&#10;&#10;Description automatically generated">
+            <a:extLst>
+              <a:ext uri="{FF2B5EF4-FFF2-40B4-BE49-F238E27FC236}">
+                <a16:creationId xmlns:a16="http://schemas.microsoft.com/office/drawing/2014/main" id="{C931689E-C63E-4904-B2E1-C09AA81CECE6}"/>
+              </a:ext>
+            </a:extLst>
+          </p:cNvPr>
+          <p:cNvPicPr>
+            <a:picLocks noChangeAspect="1"/>
+          </p:cNvPicPr>
+          <p:nvPr/>
+        </p:nvPicPr>
+        <p:blipFill>
+          <a:blip r:embed="rId2"/>
+          <a:stretch>
+            <a:fillRect/>
+          </a:stretch>
+        </p:blipFill>
+        <p:spPr>
+          <a:xfrm>
+            <a:off x="1173192" y="1058357"/>
+            <a:ext cx="10190671" cy="5201360"/>
+          </a:xfrm>
+          <a:prstGeom prst="rect">
+            <a:avLst/>
+          </a:prstGeom>
+        </p:spPr>
+      </p:pic>
+      <p:sp>
+        <p:nvSpPr>
+          <p:cNvPr id="2" name="文本占位符 1">
+            <a:extLst>
+              <a:ext uri="{FF2B5EF4-FFF2-40B4-BE49-F238E27FC236}">
+                <a16:creationId xmlns:a16="http://schemas.microsoft.com/office/drawing/2014/main" id="{213CA3C2-2ACE-D148-9DEB-98694BBF639A}"/>
+              </a:ext>
+            </a:extLst>
+          </p:cNvPr>
+          <p:cNvSpPr>
+            <a:spLocks noGrp="1"/>
+          </p:cNvSpPr>
+          <p:nvPr>
+            <p:ph type="body" sz="quarter" idx="10"/>
+          </p:nvPr>
+        </p:nvSpPr>
+        <p:spPr/>
+        <p:txBody>
+          <a:bodyPr>
+            <a:normAutofit/>
+          </a:bodyPr>
+          <a:lstStyle/>
+          <a:p>
+            <a:pPr algn="l"/>
+            <a:r>
+              <a:rPr lang="zh-CN" altLang="en-US" sz="3600" b="1">
+                <a:ea typeface="宋体"/>
+                <a:cs typeface="Arial"/>
+              </a:rPr>
+              <a:t>Web Portal</a:t>
+            </a:r>
+            <a:endParaRPr lang="zh-CN" altLang="en-US" sz="3600" b="1"/>
+          </a:p>
+        </p:txBody>
+      </p:sp>
+      <p:sp>
+        <p:nvSpPr>
+          <p:cNvPr id="3" name="灯片编号占位符 2">
+            <a:extLst>
+              <a:ext uri="{FF2B5EF4-FFF2-40B4-BE49-F238E27FC236}">
+                <a16:creationId xmlns:a16="http://schemas.microsoft.com/office/drawing/2014/main" id="{206E8B07-3FBB-34EF-DF9F-3EC1027A9B3C}"/>
+              </a:ext>
+            </a:extLst>
+          </p:cNvPr>
+          <p:cNvSpPr>
+            <a:spLocks noGrp="1"/>
+          </p:cNvSpPr>
+          <p:nvPr>
+            <p:ph type="sldNum" sz="quarter" idx="13"/>
+          </p:nvPr>
+        </p:nvSpPr>
+        <p:spPr/>
+        <p:txBody>
+          <a:bodyPr/>
+          <a:lstStyle/>
+          <a:p>
+            <a:fld id="{330EA680-D336-4FF7-8B7A-9848BB0A1C32}" type="slidenum">
+              <a:rPr lang="en-GB" smtClean="0"/>
+              <a:t>9</a:t>
+            </a:fld>
+            <a:endParaRPr lang="en-GB"/>
+          </a:p>
+        </p:txBody>
+      </p:sp>
+      <p:sp>
+        <p:nvSpPr>
+          <p:cNvPr id="7" name="Rectangle: Rounded Corners 6">
+            <a:extLst>
+              <a:ext uri="{FF2B5EF4-FFF2-40B4-BE49-F238E27FC236}">
+                <a16:creationId xmlns:a16="http://schemas.microsoft.com/office/drawing/2014/main" id="{B40A0F2C-EBA4-54AF-1588-12627841FE25}"/>
+              </a:ext>
+            </a:extLst>
+          </p:cNvPr>
+          <p:cNvSpPr/>
+          <p:nvPr/>
+        </p:nvSpPr>
+        <p:spPr>
+          <a:xfrm>
+            <a:off x="10296803" y="5002928"/>
+            <a:ext cx="540327" cy="332510"/>
+          </a:xfrm>
+          <a:prstGeom prst="roundRect">
+            <a:avLst/>
+          </a:prstGeom>
+          <a:noFill/>
+          <a:ln w="28575">
+            <a:solidFill>
+              <a:srgbClr val="FF0000"/>
+            </a:solidFill>
+          </a:ln>
+        </p:spPr>
+        <p:style>
+          <a:lnRef idx="2">
+            <a:schemeClr val="accent1">
+              <a:shade val="50000"/>
+            </a:schemeClr>
+          </a:lnRef>
+          <a:fillRef idx="1">
+            <a:schemeClr val="accent1"/>
+          </a:fillRef>
+          <a:effectRef idx="0">
+            <a:schemeClr val="accent1"/>
+          </a:effectRef>
+          <a:fontRef idx="minor">
+            <a:schemeClr val="lt1"/>
+          </a:fontRef>
+        </p:style>
+        <p:txBody>
+          <a:bodyPr rtlCol="0" anchor="ctr"/>
+          <a:lstStyle/>
+          <a:p>
+            <a:pPr algn="ctr"/>
+            <a:endParaRPr lang="en-US"/>
+          </a:p>
+        </p:txBody>
+      </p:sp>
+    </p:spTree>
+    <p:extLst>
+      <p:ext uri="{BB962C8B-B14F-4D97-AF65-F5344CB8AC3E}">
+        <p14:creationId xmlns:p14="http://schemas.microsoft.com/office/powerpoint/2010/main" val="3819532891"/>
+      </p:ext>
+    </p:extLst>
+  </p:cSld>
+  <p:clrMapOvr>
+    <a:masterClrMapping/>
+  </p:clrMapOvr>
+</p:sld>
+</file>
+
+<file path=ppt/tags/tag1.xml><?xml version="1.0" encoding="utf-8"?>
+<p:tagLst xmlns:a="http://schemas.openxmlformats.org/drawingml/2006/main" xmlns:r="http://schemas.openxmlformats.org/officeDocument/2006/relationships" xmlns:p="http://schemas.openxmlformats.org/presentationml/2006/main">
+  <p:tag name="ISLIDE.DIAGRAM" val="#789207;"/>
+</p:tagLst>
 </file>
 
 <file path=ppt/theme/theme1.xml><?xml version="1.0" encoding="utf-8"?>

</xml_diff>

<commit_message>
ver0.9.1: add PII & fix issues
</commit_message>
<xml_diff>
--- a/uob_website/analysis/utils/Voice_To_Text_Analysis_Web_UserGuide.pptx
+++ b/uob_website/analysis/utils/Voice_To_Text_Analysis_Web_UserGuide.pptx
@@ -276,7 +276,7 @@
           <a:p>
             <a:fld id="{B8DA96DE-0D36-4043-B197-B43A25F71520}" type="datetimeFigureOut">
               <a:rPr lang="en-US" smtClean="0"/>
-              <a:t>6/15/2022</a:t>
+              <a:t>6/18/2022</a:t>
             </a:fld>
             <a:endParaRPr lang="en-US"/>
           </a:p>
@@ -474,7 +474,7 @@
           <a:p>
             <a:fld id="{B8DA96DE-0D36-4043-B197-B43A25F71520}" type="datetimeFigureOut">
               <a:rPr lang="en-US" smtClean="0"/>
-              <a:t>6/15/2022</a:t>
+              <a:t>6/18/2022</a:t>
             </a:fld>
             <a:endParaRPr lang="en-US"/>
           </a:p>
@@ -682,7 +682,7 @@
           <a:p>
             <a:fld id="{B8DA96DE-0D36-4043-B197-B43A25F71520}" type="datetimeFigureOut">
               <a:rPr lang="en-US" smtClean="0"/>
-              <a:t>6/15/2022</a:t>
+              <a:t>6/18/2022</a:t>
             </a:fld>
             <a:endParaRPr lang="en-US"/>
           </a:p>
@@ -834,7 +834,7 @@
           <a:p>
             <a:fld id="{83B2EA90-AADE-4FEC-AB5C-BA7E4B8504AC}" type="datetime1">
               <a:rPr lang="en-SG" smtClean="0"/>
-              <a:t>15/6/2022</a:t>
+              <a:t>18/6/2022</a:t>
             </a:fld>
             <a:endParaRPr lang="en-GB"/>
           </a:p>
@@ -1020,7 +1020,7 @@
           <a:p>
             <a:fld id="{B8DA96DE-0D36-4043-B197-B43A25F71520}" type="datetimeFigureOut">
               <a:rPr lang="en-US" smtClean="0"/>
-              <a:t>6/15/2022</a:t>
+              <a:t>6/18/2022</a:t>
             </a:fld>
             <a:endParaRPr lang="en-US"/>
           </a:p>
@@ -1295,7 +1295,7 @@
           <a:p>
             <a:fld id="{B8DA96DE-0D36-4043-B197-B43A25F71520}" type="datetimeFigureOut">
               <a:rPr lang="en-US" smtClean="0"/>
-              <a:t>6/15/2022</a:t>
+              <a:t>6/18/2022</a:t>
             </a:fld>
             <a:endParaRPr lang="en-US"/>
           </a:p>
@@ -1560,7 +1560,7 @@
           <a:p>
             <a:fld id="{B8DA96DE-0D36-4043-B197-B43A25F71520}" type="datetimeFigureOut">
               <a:rPr lang="en-US" smtClean="0"/>
-              <a:t>6/15/2022</a:t>
+              <a:t>6/18/2022</a:t>
             </a:fld>
             <a:endParaRPr lang="en-US"/>
           </a:p>
@@ -1972,7 +1972,7 @@
           <a:p>
             <a:fld id="{B8DA96DE-0D36-4043-B197-B43A25F71520}" type="datetimeFigureOut">
               <a:rPr lang="en-US" smtClean="0"/>
-              <a:t>6/15/2022</a:t>
+              <a:t>6/18/2022</a:t>
             </a:fld>
             <a:endParaRPr lang="en-US"/>
           </a:p>
@@ -2113,7 +2113,7 @@
           <a:p>
             <a:fld id="{B8DA96DE-0D36-4043-B197-B43A25F71520}" type="datetimeFigureOut">
               <a:rPr lang="en-US" smtClean="0"/>
-              <a:t>6/15/2022</a:t>
+              <a:t>6/18/2022</a:t>
             </a:fld>
             <a:endParaRPr lang="en-US"/>
           </a:p>
@@ -2226,7 +2226,7 @@
           <a:p>
             <a:fld id="{B8DA96DE-0D36-4043-B197-B43A25F71520}" type="datetimeFigureOut">
               <a:rPr lang="en-US" smtClean="0"/>
-              <a:t>6/15/2022</a:t>
+              <a:t>6/18/2022</a:t>
             </a:fld>
             <a:endParaRPr lang="en-US"/>
           </a:p>
@@ -2537,7 +2537,7 @@
           <a:p>
             <a:fld id="{B8DA96DE-0D36-4043-B197-B43A25F71520}" type="datetimeFigureOut">
               <a:rPr lang="en-US" smtClean="0"/>
-              <a:t>6/15/2022</a:t>
+              <a:t>6/18/2022</a:t>
             </a:fld>
             <a:endParaRPr lang="en-US"/>
           </a:p>
@@ -2825,7 +2825,7 @@
           <a:p>
             <a:fld id="{B8DA96DE-0D36-4043-B197-B43A25F71520}" type="datetimeFigureOut">
               <a:rPr lang="en-US" smtClean="0"/>
-              <a:t>6/15/2022</a:t>
+              <a:t>6/18/2022</a:t>
             </a:fld>
             <a:endParaRPr lang="en-US"/>
           </a:p>
@@ -3066,7 +3066,7 @@
           <a:p>
             <a:fld id="{B8DA96DE-0D36-4043-B197-B43A25F71520}" type="datetimeFigureOut">
               <a:rPr lang="en-US" smtClean="0"/>
-              <a:t>6/15/2022</a:t>
+              <a:t>6/18/2022</a:t>
             </a:fld>
             <a:endParaRPr lang="en-US"/>
           </a:p>
@@ -4080,10 +4080,10 @@
       </p:grpSpPr>
       <p:pic>
         <p:nvPicPr>
-          <p:cNvPr id="4" name="Picture 5" descr="Graphical user interface, application&#10;&#10;Description automatically generated">
-            <a:extLst>
-              <a:ext uri="{FF2B5EF4-FFF2-40B4-BE49-F238E27FC236}">
-                <a16:creationId xmlns:a16="http://schemas.microsoft.com/office/drawing/2014/main" id="{A84C8EA0-B4B1-C9C5-A9DD-531E3AD4BE82}"/>
+          <p:cNvPr id="17" name="Picture 16">
+            <a:extLst>
+              <a:ext uri="{FF2B5EF4-FFF2-40B4-BE49-F238E27FC236}">
+                <a16:creationId xmlns:a16="http://schemas.microsoft.com/office/drawing/2014/main" id="{5F44A812-0708-4131-9CE1-71226C1A7A0F}"/>
               </a:ext>
             </a:extLst>
           </p:cNvPr>
@@ -4100,8 +4100,8 @@
         </p:blipFill>
         <p:spPr>
           <a:xfrm>
-            <a:off x="1388853" y="1059361"/>
-            <a:ext cx="9975011" cy="5084334"/>
+            <a:off x="1274695" y="1259061"/>
+            <a:ext cx="10079105" cy="5142852"/>
           </a:xfrm>
           <a:prstGeom prst="rect">
             <a:avLst/>
@@ -4211,7 +4211,7 @@
         </p:nvGrpSpPr>
         <p:grpSpPr>
           <a:xfrm>
-            <a:off x="9546102" y="1561234"/>
+            <a:off x="9489830" y="1786320"/>
             <a:ext cx="2512691" cy="1825562"/>
             <a:chOff x="175531" y="4209549"/>
             <a:chExt cx="2512691" cy="1825562"/>
@@ -4368,10 +4368,10 @@
         </p:nvGrpSpPr>
         <p:grpSpPr>
           <a:xfrm>
-            <a:off x="2352588" y="1491094"/>
-            <a:ext cx="3415166" cy="2039616"/>
+            <a:off x="2352588" y="1800587"/>
+            <a:ext cx="3415166" cy="1811295"/>
             <a:chOff x="611629" y="4209549"/>
-            <a:chExt cx="3415166" cy="2039616"/>
+            <a:chExt cx="3415166" cy="1811295"/>
           </a:xfrm>
         </p:grpSpPr>
         <p:sp>
@@ -4389,7 +4389,7 @@
           <p:spPr>
             <a:xfrm>
               <a:off x="2932799" y="5264427"/>
-              <a:ext cx="1093996" cy="984738"/>
+              <a:ext cx="1093996" cy="756417"/>
             </a:xfrm>
             <a:prstGeom prst="roundRect">
               <a:avLst/>
@@ -4422,7 +4422,7 @@
             <a:lstStyle/>
             <a:p>
               <a:pPr algn="ctr"/>
-              <a:endParaRPr lang="en-US"/>
+              <a:endParaRPr lang="en-US" dirty="0"/>
             </a:p>
           </p:txBody>
         </p:sp>
@@ -5920,6 +5920,50 @@
           <a:chExt cx="0" cy="0"/>
         </a:xfrm>
       </p:grpSpPr>
+      <p:pic>
+        <p:nvPicPr>
+          <p:cNvPr id="9" name="Picture 8">
+            <a:extLst>
+              <a:ext uri="{FF2B5EF4-FFF2-40B4-BE49-F238E27FC236}">
+                <a16:creationId xmlns:a16="http://schemas.microsoft.com/office/drawing/2014/main" id="{09D89E28-30C1-46D1-BA87-1C0A89B39C13}"/>
+              </a:ext>
+            </a:extLst>
+          </p:cNvPr>
+          <p:cNvPicPr>
+            <a:picLocks noChangeAspect="1"/>
+          </p:cNvPicPr>
+          <p:nvPr/>
+        </p:nvPicPr>
+        <p:blipFill>
+          <a:blip r:embed="rId2"/>
+          <a:stretch>
+            <a:fillRect/>
+          </a:stretch>
+        </p:blipFill>
+        <p:spPr>
+          <a:xfrm>
+            <a:off x="1303606" y="1406769"/>
+            <a:ext cx="9443054" cy="4825221"/>
+          </a:xfrm>
+          <a:prstGeom prst="rect">
+            <a:avLst/>
+          </a:prstGeom>
+          <a:ln w="38100" cap="sq">
+            <a:solidFill>
+              <a:srgbClr val="000000"/>
+            </a:solidFill>
+            <a:prstDash val="solid"/>
+            <a:miter lim="800000"/>
+          </a:ln>
+          <a:effectLst>
+            <a:outerShdw blurRad="50800" dist="38100" dir="2700000" algn="tl" rotWithShape="0">
+              <a:srgbClr val="000000">
+                <a:alpha val="43000"/>
+              </a:srgbClr>
+            </a:outerShdw>
+          </a:effectLst>
+        </p:spPr>
+      </p:pic>
       <p:sp>
         <p:nvSpPr>
           <p:cNvPr id="2" name="文本占位符 1">
@@ -5995,50 +6039,6 @@
           </a:p>
         </p:txBody>
       </p:sp>
-      <p:pic>
-        <p:nvPicPr>
-          <p:cNvPr id="5" name="Picture 5" descr="A picture containing table&#10;&#10;Description automatically generated">
-            <a:extLst>
-              <a:ext uri="{FF2B5EF4-FFF2-40B4-BE49-F238E27FC236}">
-                <a16:creationId xmlns:a16="http://schemas.microsoft.com/office/drawing/2014/main" id="{8BC466E0-473E-56E8-F8AB-B03F73AB2C96}"/>
-              </a:ext>
-            </a:extLst>
-          </p:cNvPr>
-          <p:cNvPicPr>
-            <a:picLocks noChangeAspect="1"/>
-          </p:cNvPicPr>
-          <p:nvPr/>
-        </p:nvPicPr>
-        <p:blipFill>
-          <a:blip r:embed="rId2"/>
-          <a:stretch>
-            <a:fillRect/>
-          </a:stretch>
-        </p:blipFill>
-        <p:spPr>
-          <a:xfrm>
-            <a:off x="1360098" y="1210163"/>
-            <a:ext cx="9615577" cy="4897749"/>
-          </a:xfrm>
-          <a:prstGeom prst="rect">
-            <a:avLst/>
-          </a:prstGeom>
-          <a:ln w="38100" cap="sq">
-            <a:solidFill>
-              <a:srgbClr val="000000"/>
-            </a:solidFill>
-            <a:prstDash val="solid"/>
-            <a:miter lim="800000"/>
-          </a:ln>
-          <a:effectLst>
-            <a:outerShdw blurRad="50800" dist="38100" dir="2700000" algn="tl" rotWithShape="0">
-              <a:srgbClr val="000000">
-                <a:alpha val="43000"/>
-              </a:srgbClr>
-            </a:outerShdw>
-          </a:effectLst>
-        </p:spPr>
-      </p:pic>
       <p:grpSp>
         <p:nvGrpSpPr>
           <p:cNvPr id="6" name="Group 5">
@@ -6353,10 +6353,10 @@
       </p:grpSpPr>
       <p:pic>
         <p:nvPicPr>
-          <p:cNvPr id="24" name="Picture 23">
-            <a:extLst>
-              <a:ext uri="{FF2B5EF4-FFF2-40B4-BE49-F238E27FC236}">
-                <a16:creationId xmlns:a16="http://schemas.microsoft.com/office/drawing/2014/main" id="{024881DB-8480-48D3-8B83-5058CAB27C47}"/>
+          <p:cNvPr id="5" name="Picture 4">
+            <a:extLst>
+              <a:ext uri="{FF2B5EF4-FFF2-40B4-BE49-F238E27FC236}">
+                <a16:creationId xmlns:a16="http://schemas.microsoft.com/office/drawing/2014/main" id="{B98AD4A1-A1C6-463E-BA3F-7C027B03FC0B}"/>
               </a:ext>
             </a:extLst>
           </p:cNvPr>
@@ -6373,8 +6373,8 @@
         </p:blipFill>
         <p:spPr>
           <a:xfrm>
-            <a:off x="1360097" y="1441162"/>
-            <a:ext cx="9473733" cy="4813157"/>
+            <a:off x="1363123" y="1463044"/>
+            <a:ext cx="9525052" cy="4867121"/>
           </a:xfrm>
           <a:prstGeom prst="rect">
             <a:avLst/>
@@ -7189,10 +7189,10 @@
       </p:sp>
       <p:pic>
         <p:nvPicPr>
-          <p:cNvPr id="5" name="Picture 5" descr="Graphical user interface, text, application, email&#10;&#10;Description automatically generated">
-            <a:extLst>
-              <a:ext uri="{FF2B5EF4-FFF2-40B4-BE49-F238E27FC236}">
-                <a16:creationId xmlns:a16="http://schemas.microsoft.com/office/drawing/2014/main" id="{1547FB71-0D4C-8FD6-96D1-6858075CD204}"/>
+          <p:cNvPr id="6" name="Picture 5">
+            <a:extLst>
+              <a:ext uri="{FF2B5EF4-FFF2-40B4-BE49-F238E27FC236}">
+                <a16:creationId xmlns:a16="http://schemas.microsoft.com/office/drawing/2014/main" id="{0EE1A250-CE80-47C6-97D9-0D90C5EC0091}"/>
               </a:ext>
             </a:extLst>
           </p:cNvPr>
@@ -7209,8 +7209,8 @@
         </p:blipFill>
         <p:spPr>
           <a:xfrm>
-            <a:off x="1216325" y="1134260"/>
-            <a:ext cx="10147539" cy="5222084"/>
+            <a:off x="1305951" y="1503181"/>
+            <a:ext cx="9580098" cy="4853169"/>
           </a:xfrm>
           <a:prstGeom prst="rect">
             <a:avLst/>
@@ -7527,6 +7527,20 @@
           <a:prstGeom prst="rect">
             <a:avLst/>
           </a:prstGeom>
+          <a:ln w="38100" cap="sq">
+            <a:solidFill>
+              <a:srgbClr val="000000"/>
+            </a:solidFill>
+            <a:prstDash val="solid"/>
+            <a:miter lim="800000"/>
+          </a:ln>
+          <a:effectLst>
+            <a:outerShdw blurRad="50800" dist="38100" dir="2700000" algn="tl" rotWithShape="0">
+              <a:srgbClr val="000000">
+                <a:alpha val="43000"/>
+              </a:srgbClr>
+            </a:outerShdw>
+          </a:effectLst>
         </p:spPr>
       </p:pic>
       <p:grpSp>

</xml_diff>

<commit_message>
Update user guide ppt
</commit_message>
<xml_diff>
--- a/uob_website/analysis/utils/Voice_To_Text_Analysis_Web_UserGuide.pptx
+++ b/uob_website/analysis/utils/Voice_To_Text_Analysis_Web_UserGuide.pptx
@@ -4,6 +4,9 @@
   <p:sldMasterIdLst>
     <p:sldMasterId id="2147483648" r:id="rId1"/>
   </p:sldMasterIdLst>
+  <p:notesMasterIdLst>
+    <p:notesMasterId r:id="rId20"/>
+  </p:notesMasterIdLst>
   <p:sldIdLst>
     <p:sldId id="256" r:id="rId2"/>
     <p:sldId id="257" r:id="rId3"/>
@@ -129,6 +132,439 @@
 </p:presentation>
 </file>
 
+<file path=ppt/notesMasters/notesMaster1.xml><?xml version="1.0" encoding="utf-8"?>
+<p:notesMaster xmlns:a="http://schemas.openxmlformats.org/drawingml/2006/main" xmlns:r="http://schemas.openxmlformats.org/officeDocument/2006/relationships" xmlns:p="http://schemas.openxmlformats.org/presentationml/2006/main">
+  <p:cSld>
+    <p:bg>
+      <p:bgRef idx="1001">
+        <a:schemeClr val="bg1"/>
+      </p:bgRef>
+    </p:bg>
+    <p:spTree>
+      <p:nvGrpSpPr>
+        <p:cNvPr id="1" name=""/>
+        <p:cNvGrpSpPr/>
+        <p:nvPr/>
+      </p:nvGrpSpPr>
+      <p:grpSpPr>
+        <a:xfrm>
+          <a:off x="0" y="0"/>
+          <a:ext cx="0" cy="0"/>
+          <a:chOff x="0" y="0"/>
+          <a:chExt cx="0" cy="0"/>
+        </a:xfrm>
+      </p:grpSpPr>
+      <p:sp>
+        <p:nvSpPr>
+          <p:cNvPr id="2" name="Header Placeholder 1"/>
+          <p:cNvSpPr>
+            <a:spLocks noGrp="1"/>
+          </p:cNvSpPr>
+          <p:nvPr>
+            <p:ph type="hdr" sz="quarter"/>
+          </p:nvPr>
+        </p:nvSpPr>
+        <p:spPr>
+          <a:xfrm>
+            <a:off x="0" y="0"/>
+            <a:ext cx="2971800" cy="458788"/>
+          </a:xfrm>
+          <a:prstGeom prst="rect">
+            <a:avLst/>
+          </a:prstGeom>
+        </p:spPr>
+        <p:txBody>
+          <a:bodyPr vert="horz" lIns="91440" tIns="45720" rIns="91440" bIns="45720" rtlCol="0"/>
+          <a:lstStyle>
+            <a:lvl1pPr algn="l">
+              <a:defRPr sz="1200"/>
+            </a:lvl1pPr>
+          </a:lstStyle>
+          <a:p>
+            <a:endParaRPr lang="en-US"/>
+          </a:p>
+        </p:txBody>
+      </p:sp>
+      <p:sp>
+        <p:nvSpPr>
+          <p:cNvPr id="3" name="Date Placeholder 2"/>
+          <p:cNvSpPr>
+            <a:spLocks noGrp="1"/>
+          </p:cNvSpPr>
+          <p:nvPr>
+            <p:ph type="dt" idx="1"/>
+          </p:nvPr>
+        </p:nvSpPr>
+        <p:spPr>
+          <a:xfrm>
+            <a:off x="3884613" y="0"/>
+            <a:ext cx="2971800" cy="458788"/>
+          </a:xfrm>
+          <a:prstGeom prst="rect">
+            <a:avLst/>
+          </a:prstGeom>
+        </p:spPr>
+        <p:txBody>
+          <a:bodyPr vert="horz" lIns="91440" tIns="45720" rIns="91440" bIns="45720" rtlCol="0"/>
+          <a:lstStyle>
+            <a:lvl1pPr algn="r">
+              <a:defRPr sz="1200"/>
+            </a:lvl1pPr>
+          </a:lstStyle>
+          <a:p>
+            <a:fld id="{8776D80D-BD5D-4F36-BCCF-18D348B83A61}" type="datetimeFigureOut">
+              <a:rPr lang="en-US" smtClean="0"/>
+              <a:t>6/28/2022</a:t>
+            </a:fld>
+            <a:endParaRPr lang="en-US"/>
+          </a:p>
+        </p:txBody>
+      </p:sp>
+      <p:sp>
+        <p:nvSpPr>
+          <p:cNvPr id="4" name="Slide Image Placeholder 3"/>
+          <p:cNvSpPr>
+            <a:spLocks noGrp="1" noRot="1" noChangeAspect="1"/>
+          </p:cNvSpPr>
+          <p:nvPr>
+            <p:ph type="sldImg" idx="2"/>
+          </p:nvPr>
+        </p:nvSpPr>
+        <p:spPr>
+          <a:xfrm>
+            <a:off x="685800" y="1143000"/>
+            <a:ext cx="5486400" cy="3086100"/>
+          </a:xfrm>
+          <a:prstGeom prst="rect">
+            <a:avLst/>
+          </a:prstGeom>
+          <a:noFill/>
+          <a:ln w="12700">
+            <a:solidFill>
+              <a:prstClr val="black"/>
+            </a:solidFill>
+          </a:ln>
+        </p:spPr>
+        <p:txBody>
+          <a:bodyPr vert="horz" lIns="91440" tIns="45720" rIns="91440" bIns="45720" rtlCol="0" anchor="ctr"/>
+          <a:lstStyle/>
+          <a:p>
+            <a:endParaRPr lang="en-US"/>
+          </a:p>
+        </p:txBody>
+      </p:sp>
+      <p:sp>
+        <p:nvSpPr>
+          <p:cNvPr id="5" name="Notes Placeholder 4"/>
+          <p:cNvSpPr>
+            <a:spLocks noGrp="1"/>
+          </p:cNvSpPr>
+          <p:nvPr>
+            <p:ph type="body" sz="quarter" idx="3"/>
+          </p:nvPr>
+        </p:nvSpPr>
+        <p:spPr>
+          <a:xfrm>
+            <a:off x="685800" y="4400550"/>
+            <a:ext cx="5486400" cy="3600450"/>
+          </a:xfrm>
+          <a:prstGeom prst="rect">
+            <a:avLst/>
+          </a:prstGeom>
+        </p:spPr>
+        <p:txBody>
+          <a:bodyPr vert="horz" lIns="91440" tIns="45720" rIns="91440" bIns="45720" rtlCol="0"/>
+          <a:lstStyle/>
+          <a:p>
+            <a:pPr lvl="0"/>
+            <a:r>
+              <a:rPr lang="en-US"/>
+              <a:t>Click to edit Master text styles</a:t>
+            </a:r>
+          </a:p>
+          <a:p>
+            <a:pPr lvl="1"/>
+            <a:r>
+              <a:rPr lang="en-US"/>
+              <a:t>Second level</a:t>
+            </a:r>
+          </a:p>
+          <a:p>
+            <a:pPr lvl="2"/>
+            <a:r>
+              <a:rPr lang="en-US"/>
+              <a:t>Third level</a:t>
+            </a:r>
+          </a:p>
+          <a:p>
+            <a:pPr lvl="3"/>
+            <a:r>
+              <a:rPr lang="en-US"/>
+              <a:t>Fourth level</a:t>
+            </a:r>
+          </a:p>
+          <a:p>
+            <a:pPr lvl="4"/>
+            <a:r>
+              <a:rPr lang="en-US"/>
+              <a:t>Fifth level</a:t>
+            </a:r>
+          </a:p>
+        </p:txBody>
+      </p:sp>
+      <p:sp>
+        <p:nvSpPr>
+          <p:cNvPr id="6" name="Footer Placeholder 5"/>
+          <p:cNvSpPr>
+            <a:spLocks noGrp="1"/>
+          </p:cNvSpPr>
+          <p:nvPr>
+            <p:ph type="ftr" sz="quarter" idx="4"/>
+          </p:nvPr>
+        </p:nvSpPr>
+        <p:spPr>
+          <a:xfrm>
+            <a:off x="0" y="8685213"/>
+            <a:ext cx="2971800" cy="458787"/>
+          </a:xfrm>
+          <a:prstGeom prst="rect">
+            <a:avLst/>
+          </a:prstGeom>
+        </p:spPr>
+        <p:txBody>
+          <a:bodyPr vert="horz" lIns="91440" tIns="45720" rIns="91440" bIns="45720" rtlCol="0" anchor="b"/>
+          <a:lstStyle>
+            <a:lvl1pPr algn="l">
+              <a:defRPr sz="1200"/>
+            </a:lvl1pPr>
+          </a:lstStyle>
+          <a:p>
+            <a:endParaRPr lang="en-US"/>
+          </a:p>
+        </p:txBody>
+      </p:sp>
+      <p:sp>
+        <p:nvSpPr>
+          <p:cNvPr id="7" name="Slide Number Placeholder 6"/>
+          <p:cNvSpPr>
+            <a:spLocks noGrp="1"/>
+          </p:cNvSpPr>
+          <p:nvPr>
+            <p:ph type="sldNum" sz="quarter" idx="5"/>
+          </p:nvPr>
+        </p:nvSpPr>
+        <p:spPr>
+          <a:xfrm>
+            <a:off x="3884613" y="8685213"/>
+            <a:ext cx="2971800" cy="458787"/>
+          </a:xfrm>
+          <a:prstGeom prst="rect">
+            <a:avLst/>
+          </a:prstGeom>
+        </p:spPr>
+        <p:txBody>
+          <a:bodyPr vert="horz" lIns="91440" tIns="45720" rIns="91440" bIns="45720" rtlCol="0" anchor="b"/>
+          <a:lstStyle>
+            <a:lvl1pPr algn="r">
+              <a:defRPr sz="1200"/>
+            </a:lvl1pPr>
+          </a:lstStyle>
+          <a:p>
+            <a:fld id="{F1EB8383-C5E5-4076-9CA3-4AB68C0CE1B3}" type="slidenum">
+              <a:rPr lang="en-US" smtClean="0"/>
+              <a:t>‹#›</a:t>
+            </a:fld>
+            <a:endParaRPr lang="en-US"/>
+          </a:p>
+        </p:txBody>
+      </p:sp>
+    </p:spTree>
+    <p:extLst>
+      <p:ext uri="{BB962C8B-B14F-4D97-AF65-F5344CB8AC3E}">
+        <p14:creationId xmlns:p14="http://schemas.microsoft.com/office/powerpoint/2010/main" val="1778737009"/>
+      </p:ext>
+    </p:extLst>
+  </p:cSld>
+  <p:clrMap bg1="lt1" tx1="dk1" bg2="lt2" tx2="dk2" accent1="accent1" accent2="accent2" accent3="accent3" accent4="accent4" accent5="accent5" accent6="accent6" hlink="hlink" folHlink="folHlink"/>
+  <p:notesStyle>
+    <a:lvl1pPr marL="0" algn="l" defTabSz="914400" rtl="0" eaLnBrk="1" latinLnBrk="0" hangingPunct="1">
+      <a:defRPr sz="1200" kern="1200">
+        <a:solidFill>
+          <a:schemeClr val="tx1"/>
+        </a:solidFill>
+        <a:latin typeface="+mn-lt"/>
+        <a:ea typeface="+mn-ea"/>
+        <a:cs typeface="+mn-cs"/>
+      </a:defRPr>
+    </a:lvl1pPr>
+    <a:lvl2pPr marL="457200" algn="l" defTabSz="914400" rtl="0" eaLnBrk="1" latinLnBrk="0" hangingPunct="1">
+      <a:defRPr sz="1200" kern="1200">
+        <a:solidFill>
+          <a:schemeClr val="tx1"/>
+        </a:solidFill>
+        <a:latin typeface="+mn-lt"/>
+        <a:ea typeface="+mn-ea"/>
+        <a:cs typeface="+mn-cs"/>
+      </a:defRPr>
+    </a:lvl2pPr>
+    <a:lvl3pPr marL="914400" algn="l" defTabSz="914400" rtl="0" eaLnBrk="1" latinLnBrk="0" hangingPunct="1">
+      <a:defRPr sz="1200" kern="1200">
+        <a:solidFill>
+          <a:schemeClr val="tx1"/>
+        </a:solidFill>
+        <a:latin typeface="+mn-lt"/>
+        <a:ea typeface="+mn-ea"/>
+        <a:cs typeface="+mn-cs"/>
+      </a:defRPr>
+    </a:lvl3pPr>
+    <a:lvl4pPr marL="1371600" algn="l" defTabSz="914400" rtl="0" eaLnBrk="1" latinLnBrk="0" hangingPunct="1">
+      <a:defRPr sz="1200" kern="1200">
+        <a:solidFill>
+          <a:schemeClr val="tx1"/>
+        </a:solidFill>
+        <a:latin typeface="+mn-lt"/>
+        <a:ea typeface="+mn-ea"/>
+        <a:cs typeface="+mn-cs"/>
+      </a:defRPr>
+    </a:lvl4pPr>
+    <a:lvl5pPr marL="1828800" algn="l" defTabSz="914400" rtl="0" eaLnBrk="1" latinLnBrk="0" hangingPunct="1">
+      <a:defRPr sz="1200" kern="1200">
+        <a:solidFill>
+          <a:schemeClr val="tx1"/>
+        </a:solidFill>
+        <a:latin typeface="+mn-lt"/>
+        <a:ea typeface="+mn-ea"/>
+        <a:cs typeface="+mn-cs"/>
+      </a:defRPr>
+    </a:lvl5pPr>
+    <a:lvl6pPr marL="2286000" algn="l" defTabSz="914400" rtl="0" eaLnBrk="1" latinLnBrk="0" hangingPunct="1">
+      <a:defRPr sz="1200" kern="1200">
+        <a:solidFill>
+          <a:schemeClr val="tx1"/>
+        </a:solidFill>
+        <a:latin typeface="+mn-lt"/>
+        <a:ea typeface="+mn-ea"/>
+        <a:cs typeface="+mn-cs"/>
+      </a:defRPr>
+    </a:lvl6pPr>
+    <a:lvl7pPr marL="2743200" algn="l" defTabSz="914400" rtl="0" eaLnBrk="1" latinLnBrk="0" hangingPunct="1">
+      <a:defRPr sz="1200" kern="1200">
+        <a:solidFill>
+          <a:schemeClr val="tx1"/>
+        </a:solidFill>
+        <a:latin typeface="+mn-lt"/>
+        <a:ea typeface="+mn-ea"/>
+        <a:cs typeface="+mn-cs"/>
+      </a:defRPr>
+    </a:lvl7pPr>
+    <a:lvl8pPr marL="3200400" algn="l" defTabSz="914400" rtl="0" eaLnBrk="1" latinLnBrk="0" hangingPunct="1">
+      <a:defRPr sz="1200" kern="1200">
+        <a:solidFill>
+          <a:schemeClr val="tx1"/>
+        </a:solidFill>
+        <a:latin typeface="+mn-lt"/>
+        <a:ea typeface="+mn-ea"/>
+        <a:cs typeface="+mn-cs"/>
+      </a:defRPr>
+    </a:lvl8pPr>
+    <a:lvl9pPr marL="3657600" algn="l" defTabSz="914400" rtl="0" eaLnBrk="1" latinLnBrk="0" hangingPunct="1">
+      <a:defRPr sz="1200" kern="1200">
+        <a:solidFill>
+          <a:schemeClr val="tx1"/>
+        </a:solidFill>
+        <a:latin typeface="+mn-lt"/>
+        <a:ea typeface="+mn-ea"/>
+        <a:cs typeface="+mn-cs"/>
+      </a:defRPr>
+    </a:lvl9pPr>
+  </p:notesStyle>
+</p:notesMaster>
+</file>
+
+<file path=ppt/notesSlides/notesSlide1.xml><?xml version="1.0" encoding="utf-8"?>
+<p:notes xmlns:a="http://schemas.openxmlformats.org/drawingml/2006/main" xmlns:r="http://schemas.openxmlformats.org/officeDocument/2006/relationships" xmlns:p="http://schemas.openxmlformats.org/presentationml/2006/main">
+  <p:cSld>
+    <p:spTree>
+      <p:nvGrpSpPr>
+        <p:cNvPr id="1" name=""/>
+        <p:cNvGrpSpPr/>
+        <p:nvPr/>
+      </p:nvGrpSpPr>
+      <p:grpSpPr>
+        <a:xfrm>
+          <a:off x="0" y="0"/>
+          <a:ext cx="0" cy="0"/>
+          <a:chOff x="0" y="0"/>
+          <a:chExt cx="0" cy="0"/>
+        </a:xfrm>
+      </p:grpSpPr>
+      <p:sp>
+        <p:nvSpPr>
+          <p:cNvPr id="2" name="Slide Image Placeholder 1"/>
+          <p:cNvSpPr>
+            <a:spLocks noGrp="1" noRot="1" noChangeAspect="1"/>
+          </p:cNvSpPr>
+          <p:nvPr>
+            <p:ph type="sldImg"/>
+          </p:nvPr>
+        </p:nvSpPr>
+        <p:spPr/>
+      </p:sp>
+      <p:sp>
+        <p:nvSpPr>
+          <p:cNvPr id="3" name="Notes Placeholder 2"/>
+          <p:cNvSpPr>
+            <a:spLocks noGrp="1"/>
+          </p:cNvSpPr>
+          <p:nvPr>
+            <p:ph type="body" idx="1"/>
+          </p:nvPr>
+        </p:nvSpPr>
+        <p:spPr/>
+        <p:txBody>
+          <a:bodyPr/>
+          <a:lstStyle/>
+          <a:p>
+            <a:endParaRPr lang="en-US" dirty="0"/>
+          </a:p>
+        </p:txBody>
+      </p:sp>
+      <p:sp>
+        <p:nvSpPr>
+          <p:cNvPr id="4" name="Slide Number Placeholder 3"/>
+          <p:cNvSpPr>
+            <a:spLocks noGrp="1"/>
+          </p:cNvSpPr>
+          <p:nvPr>
+            <p:ph type="sldNum" sz="quarter" idx="5"/>
+          </p:nvPr>
+        </p:nvSpPr>
+        <p:spPr/>
+        <p:txBody>
+          <a:bodyPr/>
+          <a:lstStyle/>
+          <a:p>
+            <a:fld id="{F1EB8383-C5E5-4076-9CA3-4AB68C0CE1B3}" type="slidenum">
+              <a:rPr lang="en-US" smtClean="0"/>
+              <a:t>8</a:t>
+            </a:fld>
+            <a:endParaRPr lang="en-US"/>
+          </a:p>
+        </p:txBody>
+      </p:sp>
+    </p:spTree>
+    <p:extLst>
+      <p:ext uri="{BB962C8B-B14F-4D97-AF65-F5344CB8AC3E}">
+        <p14:creationId xmlns:p14="http://schemas.microsoft.com/office/powerpoint/2010/main" val="2225406284"/>
+      </p:ext>
+    </p:extLst>
+  </p:cSld>
+  <p:clrMapOvr>
+    <a:masterClrMapping/>
+  </p:clrMapOvr>
+</p:notes>
+</file>
+
 <file path=ppt/slideLayouts/slideLayout1.xml><?xml version="1.0" encoding="utf-8"?>
 <p:sldLayout xmlns:a="http://schemas.openxmlformats.org/drawingml/2006/main" xmlns:r="http://schemas.openxmlformats.org/officeDocument/2006/relationships" xmlns:p="http://schemas.openxmlformats.org/presentationml/2006/main" type="title" preserve="1">
   <p:cSld name="Title Slide">
@@ -276,7 +712,7 @@
           <a:p>
             <a:fld id="{B8DA96DE-0D36-4043-B197-B43A25F71520}" type="datetimeFigureOut">
               <a:rPr lang="en-US" smtClean="0"/>
-              <a:t>6/18/2022</a:t>
+              <a:t>6/28/2022</a:t>
             </a:fld>
             <a:endParaRPr lang="en-US"/>
           </a:p>
@@ -474,7 +910,7 @@
           <a:p>
             <a:fld id="{B8DA96DE-0D36-4043-B197-B43A25F71520}" type="datetimeFigureOut">
               <a:rPr lang="en-US" smtClean="0"/>
-              <a:t>6/18/2022</a:t>
+              <a:t>6/28/2022</a:t>
             </a:fld>
             <a:endParaRPr lang="en-US"/>
           </a:p>
@@ -682,7 +1118,7 @@
           <a:p>
             <a:fld id="{B8DA96DE-0D36-4043-B197-B43A25F71520}" type="datetimeFigureOut">
               <a:rPr lang="en-US" smtClean="0"/>
-              <a:t>6/18/2022</a:t>
+              <a:t>6/28/2022</a:t>
             </a:fld>
             <a:endParaRPr lang="en-US"/>
           </a:p>
@@ -834,7 +1270,7 @@
           <a:p>
             <a:fld id="{83B2EA90-AADE-4FEC-AB5C-BA7E4B8504AC}" type="datetime1">
               <a:rPr lang="en-SG" smtClean="0"/>
-              <a:t>18/6/2022</a:t>
+              <a:t>28 Jun 2022</a:t>
             </a:fld>
             <a:endParaRPr lang="en-GB"/>
           </a:p>
@@ -1020,7 +1456,7 @@
           <a:p>
             <a:fld id="{B8DA96DE-0D36-4043-B197-B43A25F71520}" type="datetimeFigureOut">
               <a:rPr lang="en-US" smtClean="0"/>
-              <a:t>6/18/2022</a:t>
+              <a:t>6/28/2022</a:t>
             </a:fld>
             <a:endParaRPr lang="en-US"/>
           </a:p>
@@ -1295,7 +1731,7 @@
           <a:p>
             <a:fld id="{B8DA96DE-0D36-4043-B197-B43A25F71520}" type="datetimeFigureOut">
               <a:rPr lang="en-US" smtClean="0"/>
-              <a:t>6/18/2022</a:t>
+              <a:t>6/28/2022</a:t>
             </a:fld>
             <a:endParaRPr lang="en-US"/>
           </a:p>
@@ -1560,7 +1996,7 @@
           <a:p>
             <a:fld id="{B8DA96DE-0D36-4043-B197-B43A25F71520}" type="datetimeFigureOut">
               <a:rPr lang="en-US" smtClean="0"/>
-              <a:t>6/18/2022</a:t>
+              <a:t>6/28/2022</a:t>
             </a:fld>
             <a:endParaRPr lang="en-US"/>
           </a:p>
@@ -1972,7 +2408,7 @@
           <a:p>
             <a:fld id="{B8DA96DE-0D36-4043-B197-B43A25F71520}" type="datetimeFigureOut">
               <a:rPr lang="en-US" smtClean="0"/>
-              <a:t>6/18/2022</a:t>
+              <a:t>6/28/2022</a:t>
             </a:fld>
             <a:endParaRPr lang="en-US"/>
           </a:p>
@@ -2113,7 +2549,7 @@
           <a:p>
             <a:fld id="{B8DA96DE-0D36-4043-B197-B43A25F71520}" type="datetimeFigureOut">
               <a:rPr lang="en-US" smtClean="0"/>
-              <a:t>6/18/2022</a:t>
+              <a:t>6/28/2022</a:t>
             </a:fld>
             <a:endParaRPr lang="en-US"/>
           </a:p>
@@ -2226,7 +2662,7 @@
           <a:p>
             <a:fld id="{B8DA96DE-0D36-4043-B197-B43A25F71520}" type="datetimeFigureOut">
               <a:rPr lang="en-US" smtClean="0"/>
-              <a:t>6/18/2022</a:t>
+              <a:t>6/28/2022</a:t>
             </a:fld>
             <a:endParaRPr lang="en-US"/>
           </a:p>
@@ -2537,7 +2973,7 @@
           <a:p>
             <a:fld id="{B8DA96DE-0D36-4043-B197-B43A25F71520}" type="datetimeFigureOut">
               <a:rPr lang="en-US" smtClean="0"/>
-              <a:t>6/18/2022</a:t>
+              <a:t>6/28/2022</a:t>
             </a:fld>
             <a:endParaRPr lang="en-US"/>
           </a:p>
@@ -2825,7 +3261,7 @@
           <a:p>
             <a:fld id="{B8DA96DE-0D36-4043-B197-B43A25F71520}" type="datetimeFigureOut">
               <a:rPr lang="en-US" smtClean="0"/>
-              <a:t>6/18/2022</a:t>
+              <a:t>6/28/2022</a:t>
             </a:fld>
             <a:endParaRPr lang="en-US"/>
           </a:p>
@@ -3066,7 +3502,7 @@
           <a:p>
             <a:fld id="{B8DA96DE-0D36-4043-B197-B43A25F71520}" type="datetimeFigureOut">
               <a:rPr lang="en-US" smtClean="0"/>
-              <a:t>6/18/2022</a:t>
+              <a:t>6/28/2022</a:t>
             </a:fld>
             <a:endParaRPr lang="en-US"/>
           </a:p>
@@ -7902,14 +8338,14 @@
             <p:ph idx="1"/>
             <p:extLst>
               <p:ext uri="{D42A27DB-BD31-4B8C-83A1-F6EECF244321}">
-                <p14:modId xmlns:p14="http://schemas.microsoft.com/office/powerpoint/2010/main" val="1850266323"/>
+                <p14:modId xmlns:p14="http://schemas.microsoft.com/office/powerpoint/2010/main" val="1673493780"/>
               </p:ext>
             </p:extLst>
           </p:nvPr>
         </p:nvGraphicFramePr>
         <p:xfrm>
           <a:off x="838200" y="1825625"/>
-          <a:ext cx="10515600" cy="2225040"/>
+          <a:ext cx="10515600" cy="2494280"/>
         </p:xfrm>
         <a:graphic>
           <a:graphicData uri="http://schemas.openxmlformats.org/drawingml/2006/table">
@@ -8071,7 +8507,10 @@
                     <a:bodyPr/>
                     <a:lstStyle/>
                     <a:p>
-                      <a:endParaRPr lang="en-US"/>
+                      <a:r>
+                        <a:rPr lang="en-US" dirty="0"/>
+                        <a:t>1</a:t>
+                      </a:r>
                     </a:p>
                   </a:txBody>
                   <a:tcPr/>
@@ -8081,7 +8520,10 @@
                     <a:bodyPr/>
                     <a:lstStyle/>
                     <a:p>
-                      <a:endParaRPr lang="en-US"/>
+                      <a:r>
+                        <a:rPr lang="en-US" dirty="0"/>
+                        <a:t>2022.06.28</a:t>
+                      </a:r>
                     </a:p>
                   </a:txBody>
                   <a:tcPr/>
@@ -8091,7 +8533,15 @@
                     <a:bodyPr/>
                     <a:lstStyle/>
                     <a:p>
-                      <a:endParaRPr lang="en-US"/>
+                      <a:r>
+                        <a:rPr lang="en-US" dirty="0" err="1"/>
+                        <a:t>Z</a:t>
+                      </a:r>
+                      <a:r>
+                        <a:rPr lang="en-US" altLang="zh-CN" dirty="0" err="1"/>
+                        <a:t>engRui</a:t>
+                      </a:r>
+                      <a:endParaRPr lang="en-US" dirty="0"/>
                     </a:p>
                   </a:txBody>
                   <a:tcPr/>
@@ -8101,7 +8551,10 @@
                     <a:bodyPr/>
                     <a:lstStyle/>
                     <a:p>
-                      <a:endParaRPr lang="en-US"/>
+                      <a:r>
+                        <a:rPr lang="en-US" dirty="0"/>
+                        <a:t>Update some functional instructions</a:t>
+                      </a:r>
                     </a:p>
                   </a:txBody>
                   <a:tcPr/>
@@ -8148,7 +8601,7 @@
                     <a:bodyPr/>
                     <a:lstStyle/>
                     <a:p>
-                      <a:endParaRPr lang="en-US"/>
+                      <a:endParaRPr lang="en-US" dirty="0"/>
                     </a:p>
                   </a:txBody>
                   <a:tcPr/>
@@ -8185,7 +8638,7 @@
                     <a:bodyPr/>
                     <a:lstStyle/>
                     <a:p>
-                      <a:endParaRPr lang="en-US"/>
+                      <a:endParaRPr lang="en-US" dirty="0"/>
                     </a:p>
                   </a:txBody>
                   <a:tcPr/>
@@ -8441,49 +8894,6 @@
           </a:p>
         </p:txBody>
       </p:sp>
-      <p:pic>
-        <p:nvPicPr>
-          <p:cNvPr id="5" name="Picture 4">
-            <a:extLst>
-              <a:ext uri="{FF2B5EF4-FFF2-40B4-BE49-F238E27FC236}">
-                <a16:creationId xmlns:a16="http://schemas.microsoft.com/office/drawing/2014/main" id="{EE61710E-732F-4545-B226-B9825162AFC6}"/>
-              </a:ext>
-            </a:extLst>
-          </p:cNvPr>
-          <p:cNvPicPr>
-            <a:picLocks noChangeAspect="1"/>
-          </p:cNvPicPr>
-          <p:nvPr/>
-        </p:nvPicPr>
-        <p:blipFill rotWithShape="1">
-          <a:blip r:embed="rId2"/>
-          <a:srcRect b="1816"/>
-          <a:stretch/>
-        </p:blipFill>
-        <p:spPr>
-          <a:xfrm>
-            <a:off x="2018714" y="1690689"/>
-            <a:ext cx="8154572" cy="4091134"/>
-          </a:xfrm>
-          <a:prstGeom prst="rect">
-            <a:avLst/>
-          </a:prstGeom>
-          <a:ln w="38100" cap="sq">
-            <a:solidFill>
-              <a:srgbClr val="000000"/>
-            </a:solidFill>
-            <a:prstDash val="solid"/>
-            <a:miter lim="800000"/>
-          </a:ln>
-          <a:effectLst>
-            <a:outerShdw blurRad="50800" dist="38100" dir="2700000" algn="tl" rotWithShape="0">
-              <a:srgbClr val="000000">
-                <a:alpha val="43000"/>
-              </a:srgbClr>
-            </a:outerShdw>
-          </a:effectLst>
-        </p:spPr>
-      </p:pic>
       <p:sp>
         <p:nvSpPr>
           <p:cNvPr id="8" name="Text Placeholder 20">
@@ -8627,6 +9037,36 @@
           </a:p>
         </p:txBody>
       </p:sp>
+      <p:pic>
+        <p:nvPicPr>
+          <p:cNvPr id="7" name="Picture 6">
+            <a:extLst>
+              <a:ext uri="{FF2B5EF4-FFF2-40B4-BE49-F238E27FC236}">
+                <a16:creationId xmlns:a16="http://schemas.microsoft.com/office/drawing/2014/main" id="{484AEFCA-5172-7E4A-15F4-280030F2EACA}"/>
+              </a:ext>
+            </a:extLst>
+          </p:cNvPr>
+          <p:cNvPicPr>
+            <a:picLocks noChangeAspect="1"/>
+          </p:cNvPicPr>
+          <p:nvPr/>
+        </p:nvPicPr>
+        <p:blipFill>
+          <a:blip r:embed="rId2"/>
+          <a:stretch>
+            <a:fillRect/>
+          </a:stretch>
+        </p:blipFill>
+        <p:spPr>
+          <a:xfrm>
+            <a:off x="1472241" y="1670755"/>
+            <a:ext cx="8890000" cy="3845788"/>
+          </a:xfrm>
+          <a:prstGeom prst="rect">
+            <a:avLst/>
+          </a:prstGeom>
+        </p:spPr>
+      </p:pic>
     </p:spTree>
     <p:extLst>
       <p:ext uri="{BB962C8B-B14F-4D97-AF65-F5344CB8AC3E}">
@@ -8659,10 +9099,10 @@
       </p:grpSpPr>
       <p:pic>
         <p:nvPicPr>
-          <p:cNvPr id="4" name="Picture 7" descr="Graphical user interface, text, application, email&#10;&#10;Description automatically generated">
-            <a:extLst>
-              <a:ext uri="{FF2B5EF4-FFF2-40B4-BE49-F238E27FC236}">
-                <a16:creationId xmlns:a16="http://schemas.microsoft.com/office/drawing/2014/main" id="{BE6C0C58-FEB8-4DFC-B8B6-C1B14D7DCD3C}"/>
+          <p:cNvPr id="7" name="Picture 6">
+            <a:extLst>
+              <a:ext uri="{FF2B5EF4-FFF2-40B4-BE49-F238E27FC236}">
+                <a16:creationId xmlns:a16="http://schemas.microsoft.com/office/drawing/2014/main" id="{9CF6F799-5CD0-23A7-DFFB-CE8150920744}"/>
               </a:ext>
             </a:extLst>
           </p:cNvPr>
@@ -8679,26 +9119,12 @@
         </p:blipFill>
         <p:spPr>
           <a:xfrm>
-            <a:off x="2015489" y="1690688"/>
-            <a:ext cx="8043446" cy="4130868"/>
+            <a:off x="216172" y="1829212"/>
+            <a:ext cx="11975828" cy="3078162"/>
           </a:xfrm>
           <a:prstGeom prst="rect">
             <a:avLst/>
           </a:prstGeom>
-          <a:ln w="38100" cap="sq">
-            <a:solidFill>
-              <a:srgbClr val="000000"/>
-            </a:solidFill>
-            <a:prstDash val="solid"/>
-            <a:miter lim="800000"/>
-          </a:ln>
-          <a:effectLst>
-            <a:outerShdw blurRad="50800" dist="38100" dir="2700000" algn="tl" rotWithShape="0">
-              <a:srgbClr val="000000">
-                <a:alpha val="43000"/>
-              </a:srgbClr>
-            </a:outerShdw>
-          </a:effectLst>
         </p:spPr>
       </p:pic>
       <p:sp>
@@ -8715,7 +9141,7 @@
         </p:nvSpPr>
         <p:spPr>
           <a:xfrm>
-            <a:off x="1472241" y="6123543"/>
+            <a:off x="2195268" y="4722708"/>
             <a:ext cx="8679766" cy="369332"/>
           </a:xfrm>
           <a:prstGeom prst="rect">
@@ -8766,8 +9192,8 @@
         </p:nvSpPr>
         <p:spPr>
           <a:xfrm>
-            <a:off x="8904850" y="2166424"/>
-            <a:ext cx="753794" cy="257935"/>
+            <a:off x="11379200" y="2393950"/>
+            <a:ext cx="474266" cy="144709"/>
           </a:xfrm>
           <a:prstGeom prst="roundRect">
             <a:avLst/>
@@ -8818,7 +9244,7 @@
         </p:nvSpPr>
         <p:spPr>
           <a:xfrm>
-            <a:off x="2015489" y="3429000"/>
+            <a:off x="102772" y="3543300"/>
             <a:ext cx="1895330" cy="566225"/>
           </a:xfrm>
           <a:prstGeom prst="roundRect">
@@ -8866,14 +9292,15 @@
             </a:extLst>
           </p:cNvPr>
           <p:cNvCxnSpPr>
+            <a:cxnSpLocks/>
             <a:endCxn id="6" idx="2"/>
           </p:cNvCxnSpPr>
           <p:nvPr/>
         </p:nvCxnSpPr>
         <p:spPr>
           <a:xfrm flipH="1" flipV="1">
-            <a:off x="2963154" y="3995225"/>
-            <a:ext cx="2537314" cy="2128318"/>
+            <a:off x="1050437" y="4109525"/>
+            <a:ext cx="5813913" cy="613183"/>
           </a:xfrm>
           <a:prstGeom prst="straightConnector1">
             <a:avLst/>
@@ -8910,14 +9337,15 @@
             </a:extLst>
           </p:cNvPr>
           <p:cNvCxnSpPr>
+            <a:cxnSpLocks/>
             <a:endCxn id="5" idx="2"/>
           </p:cNvCxnSpPr>
           <p:nvPr/>
         </p:nvCxnSpPr>
         <p:spPr>
           <a:xfrm flipV="1">
-            <a:off x="8281183" y="2424359"/>
-            <a:ext cx="1000564" cy="3699184"/>
+            <a:off x="8934450" y="2538659"/>
+            <a:ext cx="2681883" cy="2184049"/>
           </a:xfrm>
           <a:prstGeom prst="straightConnector1">
             <a:avLst/>
@@ -9122,6 +9550,36 @@
           <a:chExt cx="0" cy="0"/>
         </a:xfrm>
       </p:grpSpPr>
+      <p:pic>
+        <p:nvPicPr>
+          <p:cNvPr id="4" name="Picture 3">
+            <a:extLst>
+              <a:ext uri="{FF2B5EF4-FFF2-40B4-BE49-F238E27FC236}">
+                <a16:creationId xmlns:a16="http://schemas.microsoft.com/office/drawing/2014/main" id="{A2A85750-FE2C-F11E-0402-368BD3AB0968}"/>
+              </a:ext>
+            </a:extLst>
+          </p:cNvPr>
+          <p:cNvPicPr>
+            <a:picLocks noChangeAspect="1"/>
+          </p:cNvPicPr>
+          <p:nvPr/>
+        </p:nvPicPr>
+        <p:blipFill>
+          <a:blip r:embed="rId3"/>
+          <a:stretch>
+            <a:fillRect/>
+          </a:stretch>
+        </p:blipFill>
+        <p:spPr>
+          <a:xfrm>
+            <a:off x="0" y="1964531"/>
+            <a:ext cx="12192000" cy="2928938"/>
+          </a:xfrm>
+          <a:prstGeom prst="rect">
+            <a:avLst/>
+          </a:prstGeom>
+        </p:spPr>
+      </p:pic>
       <p:sp>
         <p:nvSpPr>
           <p:cNvPr id="21" name="Text Placeholder 20">
@@ -9193,56 +9651,148 @@
           </a:p>
         </p:txBody>
       </p:sp>
-      <p:pic>
-        <p:nvPicPr>
-          <p:cNvPr id="6" name="Picture 6" descr="Graphical user interface, text, application, email&#10;&#10;Description automatically generated">
-            <a:extLst>
-              <a:ext uri="{FF2B5EF4-FFF2-40B4-BE49-F238E27FC236}">
-                <a16:creationId xmlns:a16="http://schemas.microsoft.com/office/drawing/2014/main" id="{459336C1-9643-9062-263A-1C0831F373C5}"/>
-              </a:ext>
-            </a:extLst>
-          </p:cNvPr>
-          <p:cNvPicPr>
-            <a:picLocks noChangeAspect="1"/>
-          </p:cNvPicPr>
+      <p:sp>
+        <p:nvSpPr>
+          <p:cNvPr id="9" name="Speech Bubble: Rectangle with Corners Rounded 8">
+            <a:extLst>
+              <a:ext uri="{FF2B5EF4-FFF2-40B4-BE49-F238E27FC236}">
+                <a16:creationId xmlns:a16="http://schemas.microsoft.com/office/drawing/2014/main" id="{59D0E5B9-C5CF-4192-887C-03A21E07412A}"/>
+              </a:ext>
+            </a:extLst>
+          </p:cNvPr>
+          <p:cNvSpPr/>
           <p:nvPr/>
-        </p:nvPicPr>
-        <p:blipFill>
-          <a:blip r:embed="rId3"/>
-          <a:stretch>
-            <a:fillRect/>
-          </a:stretch>
-        </p:blipFill>
+        </p:nvSpPr>
         <p:spPr>
           <a:xfrm>
-            <a:off x="1460740" y="1377672"/>
-            <a:ext cx="8954217" cy="4562732"/>
+            <a:off x="893799" y="4327841"/>
+            <a:ext cx="1716259" cy="1055078"/>
           </a:xfrm>
-          <a:prstGeom prst="rect">
-            <a:avLst/>
+          <a:prstGeom prst="wedgeRoundRectCallout">
+            <a:avLst>
+              <a:gd name="adj1" fmla="val 71789"/>
+              <a:gd name="adj2" fmla="val -79137"/>
+              <a:gd name="adj3" fmla="val 16667"/>
+            </a:avLst>
           </a:prstGeom>
-          <a:ln w="38100" cap="sq">
+          <a:solidFill>
+            <a:schemeClr val="accent5">
+              <a:lumMod val="20000"/>
+              <a:lumOff val="80000"/>
+            </a:schemeClr>
+          </a:solidFill>
+          <a:ln w="28575">
             <a:solidFill>
-              <a:srgbClr val="000000"/>
+              <a:srgbClr val="FF0000"/>
             </a:solidFill>
-            <a:prstDash val="solid"/>
-            <a:miter lim="800000"/>
           </a:ln>
-          <a:effectLst>
-            <a:outerShdw blurRad="50800" dist="38100" dir="2700000" algn="tl" rotWithShape="0">
-              <a:srgbClr val="000000">
-                <a:alpha val="43000"/>
-              </a:srgbClr>
-            </a:outerShdw>
-          </a:effectLst>
         </p:spPr>
-      </p:pic>
+        <p:style>
+          <a:lnRef idx="2">
+            <a:schemeClr val="accent1">
+              <a:shade val="50000"/>
+            </a:schemeClr>
+          </a:lnRef>
+          <a:fillRef idx="1">
+            <a:schemeClr val="accent1"/>
+          </a:fillRef>
+          <a:effectRef idx="0">
+            <a:schemeClr val="accent1"/>
+          </a:effectRef>
+          <a:fontRef idx="minor">
+            <a:schemeClr val="lt1"/>
+          </a:fontRef>
+        </p:style>
+        <p:txBody>
+          <a:bodyPr rtlCol="0" anchor="ctr"/>
+          <a:lstStyle/>
+          <a:p>
+            <a:pPr algn="ctr"/>
+            <a:r>
+              <a:rPr lang="en-US" sz="1400" dirty="0">
+                <a:solidFill>
+                  <a:sysClr val="windowText" lastClr="000000"/>
+                </a:solidFill>
+              </a:rPr>
+              <a:t>1. Click here to choose the file to upload</a:t>
+            </a:r>
+          </a:p>
+        </p:txBody>
+      </p:sp>
+      <p:sp>
+        <p:nvSpPr>
+          <p:cNvPr id="13" name="Speech Bubble: Rectangle with Corners Rounded 12">
+            <a:extLst>
+              <a:ext uri="{FF2B5EF4-FFF2-40B4-BE49-F238E27FC236}">
+                <a16:creationId xmlns:a16="http://schemas.microsoft.com/office/drawing/2014/main" id="{F2048750-DB1A-4019-A7B2-0908C0DD1856}"/>
+              </a:ext>
+            </a:extLst>
+          </p:cNvPr>
+          <p:cNvSpPr/>
+          <p:nvPr/>
+        </p:nvSpPr>
+        <p:spPr>
+          <a:xfrm>
+            <a:off x="770124" y="3043780"/>
+            <a:ext cx="1716259" cy="928468"/>
+          </a:xfrm>
+          <a:prstGeom prst="wedgeRoundRectCallout">
+            <a:avLst>
+              <a:gd name="adj1" fmla="val 73110"/>
+              <a:gd name="adj2" fmla="val -897"/>
+              <a:gd name="adj3" fmla="val 16667"/>
+            </a:avLst>
+          </a:prstGeom>
+          <a:solidFill>
+            <a:schemeClr val="accent5">
+              <a:lumMod val="20000"/>
+              <a:lumOff val="80000"/>
+            </a:schemeClr>
+          </a:solidFill>
+          <a:ln w="28575">
+            <a:solidFill>
+              <a:srgbClr val="FF0000"/>
+            </a:solidFill>
+          </a:ln>
+        </p:spPr>
+        <p:style>
+          <a:lnRef idx="2">
+            <a:schemeClr val="accent1">
+              <a:shade val="50000"/>
+            </a:schemeClr>
+          </a:lnRef>
+          <a:fillRef idx="1">
+            <a:schemeClr val="accent1"/>
+          </a:fillRef>
+          <a:effectRef idx="0">
+            <a:schemeClr val="accent1"/>
+          </a:effectRef>
+          <a:fontRef idx="minor">
+            <a:schemeClr val="lt1"/>
+          </a:fontRef>
+        </p:style>
+        <p:txBody>
+          <a:bodyPr rtlCol="0" anchor="ctr"/>
+          <a:lstStyle/>
+          <a:p>
+            <a:pPr algn="ctr"/>
+            <a:r>
+              <a:rPr lang="en-US" sz="1400" dirty="0">
+                <a:solidFill>
+                  <a:sysClr val="windowText" lastClr="000000"/>
+                </a:solidFill>
+              </a:rPr>
+              <a:t>2. [Optional] Input Description for the upload file.</a:t>
+            </a:r>
+          </a:p>
+        </p:txBody>
+      </p:sp>
       <p:grpSp>
         <p:nvGrpSpPr>
-          <p:cNvPr id="10" name="Group 9">
-            <a:extLst>
-              <a:ext uri="{FF2B5EF4-FFF2-40B4-BE49-F238E27FC236}">
-                <a16:creationId xmlns:a16="http://schemas.microsoft.com/office/drawing/2014/main" id="{3D7A9CA7-4D00-4CA9-A665-8C0D925E13BB}"/>
+          <p:cNvPr id="14" name="Group 13">
+            <a:extLst>
+              <a:ext uri="{FF2B5EF4-FFF2-40B4-BE49-F238E27FC236}">
+                <a16:creationId xmlns:a16="http://schemas.microsoft.com/office/drawing/2014/main" id="{F2FC3547-1994-4638-AAC5-817BCB9414EA}"/>
               </a:ext>
             </a:extLst>
           </p:cNvPr>
@@ -9251,18 +9801,18 @@
         </p:nvGrpSpPr>
         <p:grpSpPr>
           <a:xfrm>
-            <a:off x="118425" y="3756074"/>
-            <a:ext cx="8308122" cy="1575582"/>
-            <a:chOff x="118425" y="3756074"/>
-            <a:chExt cx="8308122" cy="1575582"/>
+            <a:off x="7491738" y="3807336"/>
+            <a:ext cx="1716259" cy="1905960"/>
+            <a:chOff x="4873646" y="2976008"/>
+            <a:chExt cx="1716259" cy="1905960"/>
           </a:xfrm>
         </p:grpSpPr>
         <p:sp>
           <p:nvSpPr>
-            <p:cNvPr id="8" name="Rectangle: Rounded Corners 7">
+            <p:cNvPr id="15" name="Rectangle: Rounded Corners 14">
               <a:extLst>
                 <a:ext uri="{FF2B5EF4-FFF2-40B4-BE49-F238E27FC236}">
-                  <a16:creationId xmlns:a16="http://schemas.microsoft.com/office/drawing/2014/main" id="{C6F5FDD3-2197-45A8-A6FB-326D3198AB94}"/>
+                  <a16:creationId xmlns:a16="http://schemas.microsoft.com/office/drawing/2014/main" id="{B0B8277C-052D-43FF-B2E3-C56A5B519DAC}"/>
                 </a:ext>
               </a:extLst>
             </p:cNvPr>
@@ -9270,9 +9820,9 @@
             <p:nvPr/>
           </p:nvSpPr>
           <p:spPr>
-            <a:xfrm>
-              <a:off x="2208628" y="3756074"/>
-              <a:ext cx="6217919" cy="281354"/>
+            <a:xfrm flipV="1">
+              <a:off x="5699911" y="2976008"/>
+              <a:ext cx="444997" cy="281354"/>
             </a:xfrm>
             <a:prstGeom prst="roundRect">
               <a:avLst/>
@@ -9305,289 +9855,7 @@
             <a:lstStyle/>
             <a:p>
               <a:pPr algn="ctr"/>
-              <a:endParaRPr lang="en-US"/>
-            </a:p>
-          </p:txBody>
-        </p:sp>
-        <p:sp>
-          <p:nvSpPr>
-            <p:cNvPr id="9" name="Speech Bubble: Rectangle with Corners Rounded 8">
-              <a:extLst>
-                <a:ext uri="{FF2B5EF4-FFF2-40B4-BE49-F238E27FC236}">
-                  <a16:creationId xmlns:a16="http://schemas.microsoft.com/office/drawing/2014/main" id="{59D0E5B9-C5CF-4192-887C-03A21E07412A}"/>
-                </a:ext>
-              </a:extLst>
-            </p:cNvPr>
-            <p:cNvSpPr/>
-            <p:nvPr/>
-          </p:nvSpPr>
-          <p:spPr>
-            <a:xfrm>
-              <a:off x="118425" y="4276578"/>
-              <a:ext cx="1716259" cy="1055078"/>
-            </a:xfrm>
-            <a:prstGeom prst="wedgeRoundRectCallout">
-              <a:avLst>
-                <a:gd name="adj1" fmla="val 71789"/>
-                <a:gd name="adj2" fmla="val -79137"/>
-                <a:gd name="adj3" fmla="val 16667"/>
-              </a:avLst>
-            </a:prstGeom>
-            <a:solidFill>
-              <a:schemeClr val="accent5">
-                <a:lumMod val="20000"/>
-                <a:lumOff val="80000"/>
-              </a:schemeClr>
-            </a:solidFill>
-            <a:ln w="28575">
-              <a:solidFill>
-                <a:srgbClr val="FF0000"/>
-              </a:solidFill>
-            </a:ln>
-          </p:spPr>
-          <p:style>
-            <a:lnRef idx="2">
-              <a:schemeClr val="accent1">
-                <a:shade val="50000"/>
-              </a:schemeClr>
-            </a:lnRef>
-            <a:fillRef idx="1">
-              <a:schemeClr val="accent1"/>
-            </a:fillRef>
-            <a:effectRef idx="0">
-              <a:schemeClr val="accent1"/>
-            </a:effectRef>
-            <a:fontRef idx="minor">
-              <a:schemeClr val="lt1"/>
-            </a:fontRef>
-          </p:style>
-          <p:txBody>
-            <a:bodyPr rtlCol="0" anchor="ctr"/>
-            <a:lstStyle/>
-            <a:p>
-              <a:pPr algn="ctr"/>
-              <a:r>
-                <a:rPr lang="en-US" sz="1400" dirty="0">
-                  <a:solidFill>
-                    <a:sysClr val="windowText" lastClr="000000"/>
-                  </a:solidFill>
-                </a:rPr>
-                <a:t>1. Click here to choose the file to upload</a:t>
-              </a:r>
-            </a:p>
-          </p:txBody>
-        </p:sp>
-      </p:grpSp>
-      <p:grpSp>
-        <p:nvGrpSpPr>
-          <p:cNvPr id="11" name="Group 10">
-            <a:extLst>
-              <a:ext uri="{FF2B5EF4-FFF2-40B4-BE49-F238E27FC236}">
-                <a16:creationId xmlns:a16="http://schemas.microsoft.com/office/drawing/2014/main" id="{BA844D17-E174-413D-80B3-0AA7B9AA6CAE}"/>
-              </a:ext>
-            </a:extLst>
-          </p:cNvPr>
-          <p:cNvGrpSpPr/>
-          <p:nvPr/>
-        </p:nvGrpSpPr>
-        <p:grpSpPr>
-          <a:xfrm>
-            <a:off x="115506" y="2820572"/>
-            <a:ext cx="9450525" cy="928468"/>
-            <a:chOff x="-68547" y="3483967"/>
-            <a:chExt cx="9450525" cy="928468"/>
-          </a:xfrm>
-        </p:grpSpPr>
-        <p:sp>
-          <p:nvSpPr>
-            <p:cNvPr id="12" name="Rectangle: Rounded Corners 11">
-              <a:extLst>
-                <a:ext uri="{FF2B5EF4-FFF2-40B4-BE49-F238E27FC236}">
-                  <a16:creationId xmlns:a16="http://schemas.microsoft.com/office/drawing/2014/main" id="{3BC429B1-F977-4BC0-9B62-79A80306090F}"/>
-                </a:ext>
-              </a:extLst>
-            </p:cNvPr>
-            <p:cNvSpPr/>
-            <p:nvPr/>
-          </p:nvSpPr>
-          <p:spPr>
-            <a:xfrm>
-              <a:off x="2018737" y="3765321"/>
-              <a:ext cx="7363241" cy="327073"/>
-            </a:xfrm>
-            <a:prstGeom prst="roundRect">
-              <a:avLst/>
-            </a:prstGeom>
-            <a:noFill/>
-            <a:ln w="28575">
-              <a:solidFill>
-                <a:srgbClr val="FF0000"/>
-              </a:solidFill>
-            </a:ln>
-          </p:spPr>
-          <p:style>
-            <a:lnRef idx="2">
-              <a:schemeClr val="accent1">
-                <a:shade val="50000"/>
-              </a:schemeClr>
-            </a:lnRef>
-            <a:fillRef idx="1">
-              <a:schemeClr val="accent1"/>
-            </a:fillRef>
-            <a:effectRef idx="0">
-              <a:schemeClr val="accent1"/>
-            </a:effectRef>
-            <a:fontRef idx="minor">
-              <a:schemeClr val="lt1"/>
-            </a:fontRef>
-          </p:style>
-          <p:txBody>
-            <a:bodyPr rtlCol="0" anchor="ctr"/>
-            <a:lstStyle/>
-            <a:p>
-              <a:pPr algn="ctr"/>
-              <a:endParaRPr lang="en-US"/>
-            </a:p>
-          </p:txBody>
-        </p:sp>
-        <p:sp>
-          <p:nvSpPr>
-            <p:cNvPr id="13" name="Speech Bubble: Rectangle with Corners Rounded 12">
-              <a:extLst>
-                <a:ext uri="{FF2B5EF4-FFF2-40B4-BE49-F238E27FC236}">
-                  <a16:creationId xmlns:a16="http://schemas.microsoft.com/office/drawing/2014/main" id="{F2048750-DB1A-4019-A7B2-0908C0DD1856}"/>
-                </a:ext>
-              </a:extLst>
-            </p:cNvPr>
-            <p:cNvSpPr/>
-            <p:nvPr/>
-          </p:nvSpPr>
-          <p:spPr>
-            <a:xfrm>
-              <a:off x="-68547" y="3483967"/>
-              <a:ext cx="1716259" cy="928468"/>
-            </a:xfrm>
-            <a:prstGeom prst="wedgeRoundRectCallout">
-              <a:avLst>
-                <a:gd name="adj1" fmla="val 70150"/>
-                <a:gd name="adj2" fmla="val 11414"/>
-                <a:gd name="adj3" fmla="val 16667"/>
-              </a:avLst>
-            </a:prstGeom>
-            <a:solidFill>
-              <a:schemeClr val="accent5">
-                <a:lumMod val="20000"/>
-                <a:lumOff val="80000"/>
-              </a:schemeClr>
-            </a:solidFill>
-            <a:ln w="28575">
-              <a:solidFill>
-                <a:srgbClr val="FF0000"/>
-              </a:solidFill>
-            </a:ln>
-          </p:spPr>
-          <p:style>
-            <a:lnRef idx="2">
-              <a:schemeClr val="accent1">
-                <a:shade val="50000"/>
-              </a:schemeClr>
-            </a:lnRef>
-            <a:fillRef idx="1">
-              <a:schemeClr val="accent1"/>
-            </a:fillRef>
-            <a:effectRef idx="0">
-              <a:schemeClr val="accent1"/>
-            </a:effectRef>
-            <a:fontRef idx="minor">
-              <a:schemeClr val="lt1"/>
-            </a:fontRef>
-          </p:style>
-          <p:txBody>
-            <a:bodyPr rtlCol="0" anchor="ctr"/>
-            <a:lstStyle/>
-            <a:p>
-              <a:pPr algn="ctr"/>
-              <a:r>
-                <a:rPr lang="en-US" sz="1400" dirty="0">
-                  <a:solidFill>
-                    <a:sysClr val="windowText" lastClr="000000"/>
-                  </a:solidFill>
-                </a:rPr>
-                <a:t>2. [Optional] Input Description for the upload file.</a:t>
-              </a:r>
-            </a:p>
-          </p:txBody>
-        </p:sp>
-      </p:grpSp>
-      <p:grpSp>
-        <p:nvGrpSpPr>
-          <p:cNvPr id="14" name="Group 13">
-            <a:extLst>
-              <a:ext uri="{FF2B5EF4-FFF2-40B4-BE49-F238E27FC236}">
-                <a16:creationId xmlns:a16="http://schemas.microsoft.com/office/drawing/2014/main" id="{F2FC3547-1994-4638-AAC5-817BCB9414EA}"/>
-              </a:ext>
-            </a:extLst>
-          </p:cNvPr>
-          <p:cNvGrpSpPr/>
-          <p:nvPr/>
-        </p:nvGrpSpPr>
-        <p:grpSpPr>
-          <a:xfrm>
-            <a:off x="7752470" y="3672575"/>
-            <a:ext cx="1716259" cy="2008217"/>
-            <a:chOff x="5025682" y="2916542"/>
-            <a:chExt cx="1716259" cy="2008217"/>
-          </a:xfrm>
-        </p:grpSpPr>
-        <p:sp>
-          <p:nvSpPr>
-            <p:cNvPr id="15" name="Rectangle: Rounded Corners 14">
-              <a:extLst>
-                <a:ext uri="{FF2B5EF4-FFF2-40B4-BE49-F238E27FC236}">
-                  <a16:creationId xmlns:a16="http://schemas.microsoft.com/office/drawing/2014/main" id="{B0B8277C-052D-43FF-B2E3-C56A5B519DAC}"/>
-                </a:ext>
-              </a:extLst>
-            </p:cNvPr>
-            <p:cNvSpPr/>
-            <p:nvPr/>
-          </p:nvSpPr>
-          <p:spPr>
-            <a:xfrm flipV="1">
-              <a:off x="5699759" y="2916542"/>
-              <a:ext cx="618979" cy="407054"/>
-            </a:xfrm>
-            <a:prstGeom prst="roundRect">
-              <a:avLst/>
-            </a:prstGeom>
-            <a:noFill/>
-            <a:ln w="28575">
-              <a:solidFill>
-                <a:srgbClr val="FF0000"/>
-              </a:solidFill>
-            </a:ln>
-          </p:spPr>
-          <p:style>
-            <a:lnRef idx="2">
-              <a:schemeClr val="accent1">
-                <a:shade val="50000"/>
-              </a:schemeClr>
-            </a:lnRef>
-            <a:fillRef idx="1">
-              <a:schemeClr val="accent1"/>
-            </a:fillRef>
-            <a:effectRef idx="0">
-              <a:schemeClr val="accent1"/>
-            </a:effectRef>
-            <a:fontRef idx="minor">
-              <a:schemeClr val="lt1"/>
-            </a:fontRef>
-          </p:style>
-          <p:txBody>
-            <a:bodyPr rtlCol="0" anchor="ctr"/>
-            <a:lstStyle/>
-            <a:p>
-              <a:pPr algn="ctr"/>
-              <a:endParaRPr lang="en-US"/>
+              <a:endParaRPr lang="en-US" dirty="0"/>
             </a:p>
           </p:txBody>
         </p:sp>
@@ -9605,7 +9873,7 @@
           </p:nvSpPr>
           <p:spPr>
             <a:xfrm>
-              <a:off x="5025682" y="3869681"/>
+              <a:off x="4873646" y="3826890"/>
               <a:ext cx="1716259" cy="1055078"/>
             </a:xfrm>
             <a:prstGeom prst="wedgeRoundRectCallout">
@@ -9674,10 +9942,10 @@
         </p:nvGrpSpPr>
         <p:grpSpPr>
           <a:xfrm>
-            <a:off x="9093875" y="3669367"/>
-            <a:ext cx="2259925" cy="2011425"/>
-            <a:chOff x="4482016" y="2913334"/>
-            <a:chExt cx="2259925" cy="2011425"/>
+            <a:off x="8763000" y="3807336"/>
+            <a:ext cx="2259925" cy="1863393"/>
+            <a:chOff x="4482016" y="2960321"/>
+            <a:chExt cx="2259925" cy="1863393"/>
           </a:xfrm>
         </p:grpSpPr>
         <p:sp>
@@ -9694,8 +9962,8 @@
           </p:nvSpPr>
           <p:spPr>
             <a:xfrm flipV="1">
-              <a:off x="4482016" y="2913334"/>
-              <a:ext cx="618979" cy="407054"/>
+              <a:off x="4482016" y="2960321"/>
+              <a:ext cx="444997" cy="281354"/>
             </a:xfrm>
             <a:prstGeom prst="roundRect">
               <a:avLst/>
@@ -9746,7 +10014,7 @@
           </p:nvSpPr>
           <p:spPr>
             <a:xfrm>
-              <a:off x="5025682" y="3869681"/>
+              <a:off x="5025682" y="3768636"/>
               <a:ext cx="1716259" cy="1055078"/>
             </a:xfrm>
             <a:prstGeom prst="wedgeRoundRectCallout">
@@ -9833,10 +10101,10 @@
       </p:grpSpPr>
       <p:pic>
         <p:nvPicPr>
-          <p:cNvPr id="9" name="Picture 8">
-            <a:extLst>
-              <a:ext uri="{FF2B5EF4-FFF2-40B4-BE49-F238E27FC236}">
-                <a16:creationId xmlns:a16="http://schemas.microsoft.com/office/drawing/2014/main" id="{4F1F47BD-E197-4EFB-A62D-91461974EA80}"/>
+          <p:cNvPr id="6" name="Picture 5">
+            <a:extLst>
+              <a:ext uri="{FF2B5EF4-FFF2-40B4-BE49-F238E27FC236}">
+                <a16:creationId xmlns:a16="http://schemas.microsoft.com/office/drawing/2014/main" id="{DCB706F4-42ED-A986-74E8-21A8103D5EF8}"/>
               </a:ext>
             </a:extLst>
           </p:cNvPr>
@@ -9853,26 +10121,12 @@
         </p:blipFill>
         <p:spPr>
           <a:xfrm>
-            <a:off x="1833566" y="1363518"/>
-            <a:ext cx="9059667" cy="4629317"/>
+            <a:off x="1066800" y="1156177"/>
+            <a:ext cx="9826433" cy="5362314"/>
           </a:xfrm>
           <a:prstGeom prst="rect">
             <a:avLst/>
           </a:prstGeom>
-          <a:ln w="38100" cap="sq">
-            <a:solidFill>
-              <a:srgbClr val="000000"/>
-            </a:solidFill>
-            <a:prstDash val="solid"/>
-            <a:miter lim="800000"/>
-          </a:ln>
-          <a:effectLst>
-            <a:outerShdw blurRad="50800" dist="38100" dir="2700000" algn="tl" rotWithShape="0">
-              <a:srgbClr val="000000">
-                <a:alpha val="43000"/>
-              </a:srgbClr>
-            </a:outerShdw>
-          </a:effectLst>
         </p:spPr>
       </p:pic>
       <p:sp>
@@ -9968,10 +10222,10 @@
         </p:nvGrpSpPr>
         <p:grpSpPr>
           <a:xfrm>
-            <a:off x="918913" y="4376242"/>
-            <a:ext cx="5397481" cy="1878078"/>
-            <a:chOff x="5025682" y="3046681"/>
-            <a:chExt cx="5397481" cy="1878078"/>
+            <a:off x="2138113" y="2999154"/>
+            <a:ext cx="3583237" cy="1738063"/>
+            <a:chOff x="5216182" y="3066593"/>
+            <a:chExt cx="3583237" cy="1738063"/>
           </a:xfrm>
         </p:grpSpPr>
         <p:sp>
@@ -9988,8 +10242,8 @@
           </p:nvSpPr>
           <p:spPr>
             <a:xfrm flipV="1">
-              <a:off x="6432451" y="3046681"/>
-              <a:ext cx="3990712" cy="336435"/>
+              <a:off x="6527701" y="3066593"/>
+              <a:ext cx="2271718" cy="176708"/>
             </a:xfrm>
             <a:prstGeom prst="roundRect">
               <a:avLst/>
@@ -10040,7 +10294,7 @@
           </p:nvSpPr>
           <p:spPr>
             <a:xfrm>
-              <a:off x="5025682" y="3869681"/>
+              <a:off x="5216182" y="3749578"/>
               <a:ext cx="1716259" cy="1055078"/>
             </a:xfrm>
             <a:prstGeom prst="wedgeRoundRectCallout">
@@ -10095,6 +10349,74 @@
           </p:txBody>
         </p:sp>
       </p:grpSp>
+      <p:sp>
+        <p:nvSpPr>
+          <p:cNvPr id="12" name="Speech Bubble: Rectangle with Corners Rounded 11">
+            <a:extLst>
+              <a:ext uri="{FF2B5EF4-FFF2-40B4-BE49-F238E27FC236}">
+                <a16:creationId xmlns:a16="http://schemas.microsoft.com/office/drawing/2014/main" id="{96B22336-EB6A-6BDD-9156-2CA8324E06A5}"/>
+              </a:ext>
+            </a:extLst>
+          </p:cNvPr>
+          <p:cNvSpPr/>
+          <p:nvPr/>
+        </p:nvSpPr>
+        <p:spPr>
+          <a:xfrm>
+            <a:off x="6894341" y="4806089"/>
+            <a:ext cx="1716259" cy="1055078"/>
+          </a:xfrm>
+          <a:prstGeom prst="wedgeRoundRectCallout">
+            <a:avLst>
+              <a:gd name="adj1" fmla="val -62815"/>
+              <a:gd name="adj2" fmla="val 79529"/>
+              <a:gd name="adj3" fmla="val 16667"/>
+            </a:avLst>
+          </a:prstGeom>
+          <a:solidFill>
+            <a:schemeClr val="accent5">
+              <a:lumMod val="20000"/>
+              <a:lumOff val="80000"/>
+            </a:schemeClr>
+          </a:solidFill>
+          <a:ln w="28575">
+            <a:solidFill>
+              <a:srgbClr val="FF0000"/>
+            </a:solidFill>
+          </a:ln>
+        </p:spPr>
+        <p:style>
+          <a:lnRef idx="2">
+            <a:schemeClr val="accent1">
+              <a:shade val="50000"/>
+            </a:schemeClr>
+          </a:lnRef>
+          <a:fillRef idx="1">
+            <a:schemeClr val="accent1"/>
+          </a:fillRef>
+          <a:effectRef idx="0">
+            <a:schemeClr val="accent1"/>
+          </a:effectRef>
+          <a:fontRef idx="minor">
+            <a:schemeClr val="lt1"/>
+          </a:fontRef>
+        </p:style>
+        <p:txBody>
+          <a:bodyPr rtlCol="0" anchor="ctr"/>
+          <a:lstStyle/>
+          <a:p>
+            <a:pPr algn="ctr"/>
+            <a:r>
+              <a:rPr lang="en-US" sz="1400" dirty="0">
+                <a:solidFill>
+                  <a:sysClr val="windowText" lastClr="000000"/>
+                </a:solidFill>
+              </a:rPr>
+              <a:t>Popup message to show upload status</a:t>
+            </a:r>
+          </a:p>
+        </p:txBody>
+      </p:sp>
     </p:spTree>
     <p:extLst>
       <p:ext uri="{BB962C8B-B14F-4D97-AF65-F5344CB8AC3E}">
@@ -10125,6 +10447,36 @@
           <a:chExt cx="0" cy="0"/>
         </a:xfrm>
       </p:grpSpPr>
+      <p:pic>
+        <p:nvPicPr>
+          <p:cNvPr id="11" name="Picture 10">
+            <a:extLst>
+              <a:ext uri="{FF2B5EF4-FFF2-40B4-BE49-F238E27FC236}">
+                <a16:creationId xmlns:a16="http://schemas.microsoft.com/office/drawing/2014/main" id="{3EA43E11-C162-B1F8-D3E7-90B8DE61FFD9}"/>
+              </a:ext>
+            </a:extLst>
+          </p:cNvPr>
+          <p:cNvPicPr>
+            <a:picLocks noChangeAspect="1"/>
+          </p:cNvPicPr>
+          <p:nvPr/>
+        </p:nvPicPr>
+        <p:blipFill>
+          <a:blip r:embed="rId3"/>
+          <a:stretch>
+            <a:fillRect/>
+          </a:stretch>
+        </p:blipFill>
+        <p:spPr>
+          <a:xfrm>
+            <a:off x="1187450" y="1108064"/>
+            <a:ext cx="10382250" cy="5689960"/>
+          </a:xfrm>
+          <a:prstGeom prst="rect">
+            <a:avLst/>
+          </a:prstGeom>
+        </p:spPr>
+      </p:pic>
       <p:sp>
         <p:nvSpPr>
           <p:cNvPr id="2" name="文本占位符 1">
@@ -10204,50 +10556,6 @@
           </a:p>
         </p:txBody>
       </p:sp>
-      <p:pic>
-        <p:nvPicPr>
-          <p:cNvPr id="5" name="Picture 5" descr="Table&#10;&#10;Description automatically generated">
-            <a:extLst>
-              <a:ext uri="{FF2B5EF4-FFF2-40B4-BE49-F238E27FC236}">
-                <a16:creationId xmlns:a16="http://schemas.microsoft.com/office/drawing/2014/main" id="{791E7A98-277C-CDA1-EF2E-FDA7B22795E8}"/>
-              </a:ext>
-            </a:extLst>
-          </p:cNvPr>
-          <p:cNvPicPr>
-            <a:picLocks noChangeAspect="1"/>
-          </p:cNvPicPr>
-          <p:nvPr/>
-        </p:nvPicPr>
-        <p:blipFill>
-          <a:blip r:embed="rId2"/>
-          <a:stretch>
-            <a:fillRect/>
-          </a:stretch>
-        </p:blipFill>
-        <p:spPr>
-          <a:xfrm>
-            <a:off x="1201947" y="1277030"/>
-            <a:ext cx="9701841" cy="4950922"/>
-          </a:xfrm>
-          <a:prstGeom prst="rect">
-            <a:avLst/>
-          </a:prstGeom>
-          <a:ln w="38100" cap="sq">
-            <a:solidFill>
-              <a:srgbClr val="000000"/>
-            </a:solidFill>
-            <a:prstDash val="solid"/>
-            <a:miter lim="800000"/>
-          </a:ln>
-          <a:effectLst>
-            <a:outerShdw blurRad="50800" dist="38100" dir="2700000" algn="tl" rotWithShape="0">
-              <a:srgbClr val="000000">
-                <a:alpha val="43000"/>
-              </a:srgbClr>
-            </a:outerShdw>
-          </a:effectLst>
-        </p:spPr>
-      </p:pic>
       <p:grpSp>
         <p:nvGrpSpPr>
           <p:cNvPr id="6" name="Group 5">
@@ -10262,10 +10570,10 @@
         </p:nvGrpSpPr>
         <p:grpSpPr>
           <a:xfrm>
-            <a:off x="9191466" y="3205398"/>
-            <a:ext cx="3000534" cy="3022553"/>
-            <a:chOff x="13298235" y="1875837"/>
-            <a:chExt cx="3000534" cy="3022553"/>
+            <a:off x="8515350" y="2438104"/>
+            <a:ext cx="2903617" cy="3473743"/>
+            <a:chOff x="13331652" y="1875834"/>
+            <a:chExt cx="2903617" cy="3473743"/>
           </a:xfrm>
         </p:grpSpPr>
         <p:sp>
@@ -10282,8 +10590,8 @@
           </p:nvSpPr>
           <p:spPr>
             <a:xfrm flipV="1">
-              <a:off x="13298235" y="1875837"/>
-              <a:ext cx="1176423" cy="3022553"/>
+              <a:off x="13331652" y="1875834"/>
+              <a:ext cx="914400" cy="3473743"/>
             </a:xfrm>
             <a:prstGeom prst="roundRect">
               <a:avLst/>
@@ -10316,7 +10624,7 @@
             <a:lstStyle/>
             <a:p>
               <a:pPr algn="ctr"/>
-              <a:endParaRPr lang="en-US"/>
+              <a:endParaRPr lang="en-US" dirty="0"/>
             </a:p>
           </p:txBody>
         </p:sp>
@@ -10334,7 +10642,7 @@
           </p:nvSpPr>
           <p:spPr>
             <a:xfrm>
-              <a:off x="14582510" y="2257700"/>
+              <a:off x="14519010" y="3457850"/>
               <a:ext cx="1716259" cy="724247"/>
             </a:xfrm>
             <a:prstGeom prst="wedgeRoundRectCallout">
@@ -10403,13 +10711,13 @@
         </p:nvSpPr>
         <p:spPr>
           <a:xfrm>
-            <a:off x="111789" y="2419643"/>
-            <a:ext cx="1365319" cy="1529741"/>
+            <a:off x="111786" y="3212500"/>
+            <a:ext cx="1365319" cy="740544"/>
           </a:xfrm>
           <a:prstGeom prst="wedgeRoundRectCallout">
             <a:avLst>
-              <a:gd name="adj1" fmla="val 63553"/>
-              <a:gd name="adj2" fmla="val 28124"/>
+              <a:gd name="adj1" fmla="val 60297"/>
+              <a:gd name="adj2" fmla="val -28612"/>
               <a:gd name="adj3" fmla="val 16667"/>
             </a:avLst>
           </a:prstGeom>
@@ -10452,16 +10760,13 @@
                   <a:sysClr val="windowText" lastClr="000000"/>
                 </a:solidFill>
               </a:rPr>
-              <a:t>“Yellow” highlight </a:t>
+              <a:t>Unanalyzed</a:t>
             </a:r>
-            <a:r>
-              <a:rPr lang="en-US" sz="1400" dirty="0">
-                <a:solidFill>
-                  <a:sysClr val="windowText" lastClr="000000"/>
-                </a:solidFill>
-              </a:rPr>
-              <a:t>means the audio has not been performed any analysis.</a:t>
-            </a:r>
+            <a:endParaRPr lang="en-US" sz="1400" dirty="0">
+              <a:solidFill>
+                <a:sysClr val="windowText" lastClr="000000"/>
+              </a:solidFill>
+            </a:endParaRPr>
           </a:p>
         </p:txBody>
       </p:sp>
@@ -10479,7 +10784,7 @@
         </p:nvSpPr>
         <p:spPr>
           <a:xfrm>
-            <a:off x="111788" y="4311508"/>
+            <a:off x="111787" y="4174975"/>
             <a:ext cx="1365319" cy="1529741"/>
           </a:xfrm>
           <a:prstGeom prst="wedgeRoundRectCallout">
@@ -10523,32 +10828,371 @@
           <a:p>
             <a:pPr algn="ctr"/>
             <a:r>
-              <a:rPr lang="en-US" sz="1400" dirty="0">
+              <a:rPr lang="en-US" sz="1400" u="sng" dirty="0">
                 <a:solidFill>
                   <a:sysClr val="windowText" lastClr="000000"/>
                 </a:solidFill>
               </a:rPr>
-              <a:t>There is </a:t>
+              <a:t>Incomplete</a:t>
             </a:r>
+          </a:p>
+        </p:txBody>
+      </p:sp>
+      <p:grpSp>
+        <p:nvGrpSpPr>
+          <p:cNvPr id="12" name="Group 11">
+            <a:extLst>
+              <a:ext uri="{FF2B5EF4-FFF2-40B4-BE49-F238E27FC236}">
+                <a16:creationId xmlns:a16="http://schemas.microsoft.com/office/drawing/2014/main" id="{8DB0A7A1-6BBE-17CB-7AFC-628CD4F0F3FF}"/>
+              </a:ext>
+            </a:extLst>
+          </p:cNvPr>
+          <p:cNvGrpSpPr/>
+          <p:nvPr/>
+        </p:nvGrpSpPr>
+        <p:grpSpPr>
+          <a:xfrm>
+            <a:off x="8627891" y="826121"/>
+            <a:ext cx="2535409" cy="1466349"/>
+            <a:chOff x="13291793" y="111451"/>
+            <a:chExt cx="2535409" cy="1466349"/>
+          </a:xfrm>
+        </p:grpSpPr>
+        <p:sp>
+          <p:nvSpPr>
+            <p:cNvPr id="13" name="Rectangle: Rounded Corners 12">
+              <a:extLst>
+                <a:ext uri="{FF2B5EF4-FFF2-40B4-BE49-F238E27FC236}">
+                  <a16:creationId xmlns:a16="http://schemas.microsoft.com/office/drawing/2014/main" id="{5A65AB13-F904-C315-5ABF-F717A05F61BA}"/>
+                </a:ext>
+              </a:extLst>
+            </p:cNvPr>
+            <p:cNvSpPr/>
+            <p:nvPr/>
+          </p:nvSpPr>
+          <p:spPr>
+            <a:xfrm flipV="1">
+              <a:off x="14188902" y="1404192"/>
+              <a:ext cx="1638300" cy="173608"/>
+            </a:xfrm>
+            <a:prstGeom prst="roundRect">
+              <a:avLst/>
+            </a:prstGeom>
+            <a:noFill/>
+            <a:ln w="28575">
+              <a:solidFill>
+                <a:srgbClr val="FF0000"/>
+              </a:solidFill>
+            </a:ln>
+          </p:spPr>
+          <p:style>
+            <a:lnRef idx="2">
+              <a:schemeClr val="accent1">
+                <a:shade val="50000"/>
+              </a:schemeClr>
+            </a:lnRef>
+            <a:fillRef idx="1">
+              <a:schemeClr val="accent1"/>
+            </a:fillRef>
+            <a:effectRef idx="0">
+              <a:schemeClr val="accent1"/>
+            </a:effectRef>
+            <a:fontRef idx="minor">
+              <a:schemeClr val="lt1"/>
+            </a:fontRef>
+          </p:style>
+          <p:txBody>
+            <a:bodyPr rtlCol="0" anchor="ctr"/>
+            <a:lstStyle/>
+            <a:p>
+              <a:pPr algn="ctr"/>
+              <a:endParaRPr lang="en-US" dirty="0"/>
+            </a:p>
+          </p:txBody>
+        </p:sp>
+        <p:sp>
+          <p:nvSpPr>
+            <p:cNvPr id="14" name="Speech Bubble: Rectangle with Corners Rounded 13">
+              <a:extLst>
+                <a:ext uri="{FF2B5EF4-FFF2-40B4-BE49-F238E27FC236}">
+                  <a16:creationId xmlns:a16="http://schemas.microsoft.com/office/drawing/2014/main" id="{7D550289-D672-4668-B577-19C52E74EDE1}"/>
+                </a:ext>
+              </a:extLst>
+            </p:cNvPr>
+            <p:cNvSpPr/>
+            <p:nvPr/>
+          </p:nvSpPr>
+          <p:spPr>
+            <a:xfrm>
+              <a:off x="13291793" y="111451"/>
+              <a:ext cx="1716259" cy="724247"/>
+            </a:xfrm>
+            <a:prstGeom prst="wedgeRoundRectCallout">
+              <a:avLst>
+                <a:gd name="adj1" fmla="val 21908"/>
+                <a:gd name="adj2" fmla="val 105440"/>
+                <a:gd name="adj3" fmla="val 16667"/>
+              </a:avLst>
+            </a:prstGeom>
+            <a:solidFill>
+              <a:schemeClr val="accent5">
+                <a:lumMod val="20000"/>
+                <a:lumOff val="80000"/>
+              </a:schemeClr>
+            </a:solidFill>
+            <a:ln w="28575">
+              <a:solidFill>
+                <a:srgbClr val="FF0000"/>
+              </a:solidFill>
+            </a:ln>
+          </p:spPr>
+          <p:style>
+            <a:lnRef idx="2">
+              <a:schemeClr val="accent1">
+                <a:shade val="50000"/>
+              </a:schemeClr>
+            </a:lnRef>
+            <a:fillRef idx="1">
+              <a:schemeClr val="accent1"/>
+            </a:fillRef>
+            <a:effectRef idx="0">
+              <a:schemeClr val="accent1"/>
+            </a:effectRef>
+            <a:fontRef idx="minor">
+              <a:schemeClr val="lt1"/>
+            </a:fontRef>
+          </p:style>
+          <p:txBody>
+            <a:bodyPr rtlCol="0" anchor="ctr"/>
+            <a:lstStyle/>
+            <a:p>
+              <a:pPr algn="ctr"/>
+              <a:r>
+                <a:rPr lang="en-US" sz="1400" dirty="0">
+                  <a:solidFill>
+                    <a:sysClr val="windowText" lastClr="000000"/>
+                  </a:solidFill>
+                </a:rPr>
+                <a:t>Audio status sample</a:t>
+              </a:r>
+            </a:p>
+          </p:txBody>
+        </p:sp>
+      </p:grpSp>
+      <p:sp>
+        <p:nvSpPr>
+          <p:cNvPr id="15" name="Speech Bubble: Rectangle with Corners Rounded 14">
+            <a:extLst>
+              <a:ext uri="{FF2B5EF4-FFF2-40B4-BE49-F238E27FC236}">
+                <a16:creationId xmlns:a16="http://schemas.microsoft.com/office/drawing/2014/main" id="{11496C8E-8AA9-9D42-F1C9-118E4F289011}"/>
+              </a:ext>
+            </a:extLst>
+          </p:cNvPr>
+          <p:cNvSpPr/>
+          <p:nvPr/>
+        </p:nvSpPr>
+        <p:spPr>
+          <a:xfrm>
+            <a:off x="111785" y="2341123"/>
+            <a:ext cx="1365319" cy="740544"/>
+          </a:xfrm>
+          <a:prstGeom prst="wedgeRoundRectCallout">
+            <a:avLst>
+              <a:gd name="adj1" fmla="val 60297"/>
+              <a:gd name="adj2" fmla="val -5460"/>
+              <a:gd name="adj3" fmla="val 16667"/>
+            </a:avLst>
+          </a:prstGeom>
+          <a:solidFill>
+            <a:schemeClr val="accent5">
+              <a:lumMod val="20000"/>
+              <a:lumOff val="80000"/>
+            </a:schemeClr>
+          </a:solidFill>
+          <a:ln w="28575">
+            <a:solidFill>
+              <a:srgbClr val="FF0000"/>
+            </a:solidFill>
+          </a:ln>
+        </p:spPr>
+        <p:style>
+          <a:lnRef idx="2">
+            <a:schemeClr val="accent1">
+              <a:shade val="50000"/>
+            </a:schemeClr>
+          </a:lnRef>
+          <a:fillRef idx="1">
+            <a:schemeClr val="accent1"/>
+          </a:fillRef>
+          <a:effectRef idx="0">
+            <a:schemeClr val="accent1"/>
+          </a:effectRef>
+          <a:fontRef idx="minor">
+            <a:schemeClr val="lt1"/>
+          </a:fontRef>
+        </p:style>
+        <p:txBody>
+          <a:bodyPr rtlCol="0" anchor="ctr"/>
+          <a:lstStyle/>
+          <a:p>
+            <a:pPr algn="ctr"/>
             <a:r>
               <a:rPr lang="en-US" sz="1400" u="sng" dirty="0">
                 <a:solidFill>
                   <a:sysClr val="windowText" lastClr="000000"/>
                 </a:solidFill>
               </a:rPr>
-              <a:t>no highlight</a:t>
+              <a:t>Complete</a:t>
             </a:r>
-            <a:r>
-              <a:rPr lang="en-US" sz="1400" dirty="0">
-                <a:solidFill>
-                  <a:sysClr val="windowText" lastClr="000000"/>
-                </a:solidFill>
-              </a:rPr>
-              <a:t> on the audio that has been performed all available analysis.</a:t>
-            </a:r>
+            <a:endParaRPr lang="en-US" sz="1400" dirty="0">
+              <a:solidFill>
+                <a:sysClr val="windowText" lastClr="000000"/>
+              </a:solidFill>
+            </a:endParaRPr>
           </a:p>
         </p:txBody>
       </p:sp>
+      <p:grpSp>
+        <p:nvGrpSpPr>
+          <p:cNvPr id="16" name="Group 15">
+            <a:extLst>
+              <a:ext uri="{FF2B5EF4-FFF2-40B4-BE49-F238E27FC236}">
+                <a16:creationId xmlns:a16="http://schemas.microsoft.com/office/drawing/2014/main" id="{A121BD42-49B9-89AC-1743-8485BCF312B9}"/>
+              </a:ext>
+            </a:extLst>
+          </p:cNvPr>
+          <p:cNvGrpSpPr/>
+          <p:nvPr/>
+        </p:nvGrpSpPr>
+        <p:grpSpPr>
+          <a:xfrm>
+            <a:off x="1498600" y="5911847"/>
+            <a:ext cx="3177295" cy="724247"/>
+            <a:chOff x="11763202" y="4780186"/>
+            <a:chExt cx="3177295" cy="724247"/>
+          </a:xfrm>
+        </p:grpSpPr>
+        <p:sp>
+          <p:nvSpPr>
+            <p:cNvPr id="17" name="Rectangle: Rounded Corners 16">
+              <a:extLst>
+                <a:ext uri="{FF2B5EF4-FFF2-40B4-BE49-F238E27FC236}">
+                  <a16:creationId xmlns:a16="http://schemas.microsoft.com/office/drawing/2014/main" id="{40A6A660-6BA4-4306-35B0-6A83BDD6CCB5}"/>
+                </a:ext>
+              </a:extLst>
+            </p:cNvPr>
+            <p:cNvSpPr/>
+            <p:nvPr/>
+          </p:nvSpPr>
+          <p:spPr>
+            <a:xfrm flipV="1">
+              <a:off x="11763202" y="4985501"/>
+              <a:ext cx="914400" cy="239188"/>
+            </a:xfrm>
+            <a:prstGeom prst="roundRect">
+              <a:avLst/>
+            </a:prstGeom>
+            <a:noFill/>
+            <a:ln w="28575">
+              <a:solidFill>
+                <a:srgbClr val="FF0000"/>
+              </a:solidFill>
+            </a:ln>
+          </p:spPr>
+          <p:style>
+            <a:lnRef idx="2">
+              <a:schemeClr val="accent1">
+                <a:shade val="50000"/>
+              </a:schemeClr>
+            </a:lnRef>
+            <a:fillRef idx="1">
+              <a:schemeClr val="accent1"/>
+            </a:fillRef>
+            <a:effectRef idx="0">
+              <a:schemeClr val="accent1"/>
+            </a:effectRef>
+            <a:fontRef idx="minor">
+              <a:schemeClr val="lt1"/>
+            </a:fontRef>
+          </p:style>
+          <p:txBody>
+            <a:bodyPr rtlCol="0" anchor="ctr"/>
+            <a:lstStyle/>
+            <a:p>
+              <a:pPr algn="ctr"/>
+              <a:endParaRPr lang="en-US" dirty="0"/>
+            </a:p>
+          </p:txBody>
+        </p:sp>
+        <p:sp>
+          <p:nvSpPr>
+            <p:cNvPr id="18" name="Speech Bubble: Rectangle with Corners Rounded 17">
+              <a:extLst>
+                <a:ext uri="{FF2B5EF4-FFF2-40B4-BE49-F238E27FC236}">
+                  <a16:creationId xmlns:a16="http://schemas.microsoft.com/office/drawing/2014/main" id="{1EB10AD6-4D30-36B7-3511-BA7314E81CDE}"/>
+                </a:ext>
+              </a:extLst>
+            </p:cNvPr>
+            <p:cNvSpPr/>
+            <p:nvPr/>
+          </p:nvSpPr>
+          <p:spPr>
+            <a:xfrm>
+              <a:off x="13224238" y="4780186"/>
+              <a:ext cx="1716259" cy="724247"/>
+            </a:xfrm>
+            <a:prstGeom prst="wedgeRoundRectCallout">
+              <a:avLst>
+                <a:gd name="adj1" fmla="val -71700"/>
+                <a:gd name="adj2" fmla="val -6787"/>
+                <a:gd name="adj3" fmla="val 16667"/>
+              </a:avLst>
+            </a:prstGeom>
+            <a:solidFill>
+              <a:schemeClr val="accent5">
+                <a:lumMod val="20000"/>
+                <a:lumOff val="80000"/>
+              </a:schemeClr>
+            </a:solidFill>
+            <a:ln w="28575">
+              <a:solidFill>
+                <a:srgbClr val="FF0000"/>
+              </a:solidFill>
+            </a:ln>
+          </p:spPr>
+          <p:style>
+            <a:lnRef idx="2">
+              <a:schemeClr val="accent1">
+                <a:shade val="50000"/>
+              </a:schemeClr>
+            </a:lnRef>
+            <a:fillRef idx="1">
+              <a:schemeClr val="accent1"/>
+            </a:fillRef>
+            <a:effectRef idx="0">
+              <a:schemeClr val="accent1"/>
+            </a:effectRef>
+            <a:fontRef idx="minor">
+              <a:schemeClr val="lt1"/>
+            </a:fontRef>
+          </p:style>
+          <p:txBody>
+            <a:bodyPr rtlCol="0" anchor="ctr"/>
+            <a:lstStyle/>
+            <a:p>
+              <a:pPr algn="ctr"/>
+              <a:r>
+                <a:rPr lang="en-US" sz="1400" dirty="0">
+                  <a:solidFill>
+                    <a:sysClr val="windowText" lastClr="000000"/>
+                  </a:solidFill>
+                </a:rPr>
+                <a:t>Bulk Action on selected audios</a:t>
+              </a:r>
+            </a:p>
+          </p:txBody>
+        </p:sp>
+      </p:grpSp>
     </p:spTree>
     <p:extLst>
       <p:ext uri="{BB962C8B-B14F-4D97-AF65-F5344CB8AC3E}">
@@ -11153,6 +11797,301 @@
 </a:theme>
 </file>
 
+<file path=ppt/theme/theme2.xml><?xml version="1.0" encoding="utf-8"?>
+<a:theme xmlns:a="http://schemas.openxmlformats.org/drawingml/2006/main" name="Office Theme">
+  <a:themeElements>
+    <a:clrScheme name="Office">
+      <a:dk1>
+        <a:sysClr val="windowText" lastClr="000000"/>
+      </a:dk1>
+      <a:lt1>
+        <a:sysClr val="window" lastClr="FFFFFF"/>
+      </a:lt1>
+      <a:dk2>
+        <a:srgbClr val="44546A"/>
+      </a:dk2>
+      <a:lt2>
+        <a:srgbClr val="E7E6E6"/>
+      </a:lt2>
+      <a:accent1>
+        <a:srgbClr val="4472C4"/>
+      </a:accent1>
+      <a:accent2>
+        <a:srgbClr val="ED7D31"/>
+      </a:accent2>
+      <a:accent3>
+        <a:srgbClr val="A5A5A5"/>
+      </a:accent3>
+      <a:accent4>
+        <a:srgbClr val="FFC000"/>
+      </a:accent4>
+      <a:accent5>
+        <a:srgbClr val="5B9BD5"/>
+      </a:accent5>
+      <a:accent6>
+        <a:srgbClr val="70AD47"/>
+      </a:accent6>
+      <a:hlink>
+        <a:srgbClr val="0563C1"/>
+      </a:hlink>
+      <a:folHlink>
+        <a:srgbClr val="954F72"/>
+      </a:folHlink>
+    </a:clrScheme>
+    <a:fontScheme name="Office">
+      <a:majorFont>
+        <a:latin typeface="Calibri Light" panose="020F0302020204030204"/>
+        <a:ea typeface=""/>
+        <a:cs typeface=""/>
+        <a:font script="Jpan" typeface="游ゴシック Light"/>
+        <a:font script="Hang" typeface="맑은 고딕"/>
+        <a:font script="Hans" typeface="等线 Light"/>
+        <a:font script="Hant" typeface="新細明體"/>
+        <a:font script="Arab" typeface="Times New Roman"/>
+        <a:font script="Hebr" typeface="Times New Roman"/>
+        <a:font script="Thai" typeface="Angsana New"/>
+        <a:font script="Ethi" typeface="Nyala"/>
+        <a:font script="Beng" typeface="Vrinda"/>
+        <a:font script="Gujr" typeface="Shruti"/>
+        <a:font script="Khmr" typeface="MoolBoran"/>
+        <a:font script="Knda" typeface="Tunga"/>
+        <a:font script="Guru" typeface="Raavi"/>
+        <a:font script="Cans" typeface="Euphemia"/>
+        <a:font script="Cher" typeface="Plantagenet Cherokee"/>
+        <a:font script="Yiii" typeface="Microsoft Yi Baiti"/>
+        <a:font script="Tibt" typeface="Microsoft Himalaya"/>
+        <a:font script="Thaa" typeface="MV Boli"/>
+        <a:font script="Deva" typeface="Mangal"/>
+        <a:font script="Telu" typeface="Gautami"/>
+        <a:font script="Taml" typeface="Latha"/>
+        <a:font script="Syrc" typeface="Estrangelo Edessa"/>
+        <a:font script="Orya" typeface="Kalinga"/>
+        <a:font script="Mlym" typeface="Kartika"/>
+        <a:font script="Laoo" typeface="DokChampa"/>
+        <a:font script="Sinh" typeface="Iskoola Pota"/>
+        <a:font script="Mong" typeface="Mongolian Baiti"/>
+        <a:font script="Viet" typeface="Times New Roman"/>
+        <a:font script="Uigh" typeface="Microsoft Uighur"/>
+        <a:font script="Geor" typeface="Sylfaen"/>
+        <a:font script="Armn" typeface="Arial"/>
+        <a:font script="Bugi" typeface="Leelawadee UI"/>
+        <a:font script="Bopo" typeface="Microsoft JhengHei"/>
+        <a:font script="Java" typeface="Javanese Text"/>
+        <a:font script="Lisu" typeface="Segoe UI"/>
+        <a:font script="Mymr" typeface="Myanmar Text"/>
+        <a:font script="Nkoo" typeface="Ebrima"/>
+        <a:font script="Olck" typeface="Nirmala UI"/>
+        <a:font script="Osma" typeface="Ebrima"/>
+        <a:font script="Phag" typeface="Phagspa"/>
+        <a:font script="Syrn" typeface="Estrangelo Edessa"/>
+        <a:font script="Syrj" typeface="Estrangelo Edessa"/>
+        <a:font script="Syre" typeface="Estrangelo Edessa"/>
+        <a:font script="Sora" typeface="Nirmala UI"/>
+        <a:font script="Tale" typeface="Microsoft Tai Le"/>
+        <a:font script="Talu" typeface="Microsoft New Tai Lue"/>
+        <a:font script="Tfng" typeface="Ebrima"/>
+      </a:majorFont>
+      <a:minorFont>
+        <a:latin typeface="Calibri" panose="020F0502020204030204"/>
+        <a:ea typeface=""/>
+        <a:cs typeface=""/>
+        <a:font script="Jpan" typeface="游ゴシック"/>
+        <a:font script="Hang" typeface="맑은 고딕"/>
+        <a:font script="Hans" typeface="等线"/>
+        <a:font script="Hant" typeface="新細明體"/>
+        <a:font script="Arab" typeface="Arial"/>
+        <a:font script="Hebr" typeface="Arial"/>
+        <a:font script="Thai" typeface="Cordia New"/>
+        <a:font script="Ethi" typeface="Nyala"/>
+        <a:font script="Beng" typeface="Vrinda"/>
+        <a:font script="Gujr" typeface="Shruti"/>
+        <a:font script="Khmr" typeface="DaunPenh"/>
+        <a:font script="Knda" typeface="Tunga"/>
+        <a:font script="Guru" typeface="Raavi"/>
+        <a:font script="Cans" typeface="Euphemia"/>
+        <a:font script="Cher" typeface="Plantagenet Cherokee"/>
+        <a:font script="Yiii" typeface="Microsoft Yi Baiti"/>
+        <a:font script="Tibt" typeface="Microsoft Himalaya"/>
+        <a:font script="Thaa" typeface="MV Boli"/>
+        <a:font script="Deva" typeface="Mangal"/>
+        <a:font script="Telu" typeface="Gautami"/>
+        <a:font script="Taml" typeface="Latha"/>
+        <a:font script="Syrc" typeface="Estrangelo Edessa"/>
+        <a:font script="Orya" typeface="Kalinga"/>
+        <a:font script="Mlym" typeface="Kartika"/>
+        <a:font script="Laoo" typeface="DokChampa"/>
+        <a:font script="Sinh" typeface="Iskoola Pota"/>
+        <a:font script="Mong" typeface="Mongolian Baiti"/>
+        <a:font script="Viet" typeface="Arial"/>
+        <a:font script="Uigh" typeface="Microsoft Uighur"/>
+        <a:font script="Geor" typeface="Sylfaen"/>
+        <a:font script="Armn" typeface="Arial"/>
+        <a:font script="Bugi" typeface="Leelawadee UI"/>
+        <a:font script="Bopo" typeface="Microsoft JhengHei"/>
+        <a:font script="Java" typeface="Javanese Text"/>
+        <a:font script="Lisu" typeface="Segoe UI"/>
+        <a:font script="Mymr" typeface="Myanmar Text"/>
+        <a:font script="Nkoo" typeface="Ebrima"/>
+        <a:font script="Olck" typeface="Nirmala UI"/>
+        <a:font script="Osma" typeface="Ebrima"/>
+        <a:font script="Phag" typeface="Phagspa"/>
+        <a:font script="Syrn" typeface="Estrangelo Edessa"/>
+        <a:font script="Syrj" typeface="Estrangelo Edessa"/>
+        <a:font script="Syre" typeface="Estrangelo Edessa"/>
+        <a:font script="Sora" typeface="Nirmala UI"/>
+        <a:font script="Tale" typeface="Microsoft Tai Le"/>
+        <a:font script="Talu" typeface="Microsoft New Tai Lue"/>
+        <a:font script="Tfng" typeface="Ebrima"/>
+      </a:minorFont>
+    </a:fontScheme>
+    <a:fmtScheme name="Office">
+      <a:fillStyleLst>
+        <a:solidFill>
+          <a:schemeClr val="phClr"/>
+        </a:solidFill>
+        <a:gradFill rotWithShape="1">
+          <a:gsLst>
+            <a:gs pos="0">
+              <a:schemeClr val="phClr">
+                <a:lumMod val="110000"/>
+                <a:satMod val="105000"/>
+                <a:tint val="67000"/>
+              </a:schemeClr>
+            </a:gs>
+            <a:gs pos="50000">
+              <a:schemeClr val="phClr">
+                <a:lumMod val="105000"/>
+                <a:satMod val="103000"/>
+                <a:tint val="73000"/>
+              </a:schemeClr>
+            </a:gs>
+            <a:gs pos="100000">
+              <a:schemeClr val="phClr">
+                <a:lumMod val="105000"/>
+                <a:satMod val="109000"/>
+                <a:tint val="81000"/>
+              </a:schemeClr>
+            </a:gs>
+          </a:gsLst>
+          <a:lin ang="5400000" scaled="0"/>
+        </a:gradFill>
+        <a:gradFill rotWithShape="1">
+          <a:gsLst>
+            <a:gs pos="0">
+              <a:schemeClr val="phClr">
+                <a:satMod val="103000"/>
+                <a:lumMod val="102000"/>
+                <a:tint val="94000"/>
+              </a:schemeClr>
+            </a:gs>
+            <a:gs pos="50000">
+              <a:schemeClr val="phClr">
+                <a:satMod val="110000"/>
+                <a:lumMod val="100000"/>
+                <a:shade val="100000"/>
+              </a:schemeClr>
+            </a:gs>
+            <a:gs pos="100000">
+              <a:schemeClr val="phClr">
+                <a:lumMod val="99000"/>
+                <a:satMod val="120000"/>
+                <a:shade val="78000"/>
+              </a:schemeClr>
+            </a:gs>
+          </a:gsLst>
+          <a:lin ang="5400000" scaled="0"/>
+        </a:gradFill>
+      </a:fillStyleLst>
+      <a:lnStyleLst>
+        <a:ln w="6350" cap="flat" cmpd="sng" algn="ctr">
+          <a:solidFill>
+            <a:schemeClr val="phClr"/>
+          </a:solidFill>
+          <a:prstDash val="solid"/>
+          <a:miter lim="800000"/>
+        </a:ln>
+        <a:ln w="12700" cap="flat" cmpd="sng" algn="ctr">
+          <a:solidFill>
+            <a:schemeClr val="phClr"/>
+          </a:solidFill>
+          <a:prstDash val="solid"/>
+          <a:miter lim="800000"/>
+        </a:ln>
+        <a:ln w="19050" cap="flat" cmpd="sng" algn="ctr">
+          <a:solidFill>
+            <a:schemeClr val="phClr"/>
+          </a:solidFill>
+          <a:prstDash val="solid"/>
+          <a:miter lim="800000"/>
+        </a:ln>
+      </a:lnStyleLst>
+      <a:effectStyleLst>
+        <a:effectStyle>
+          <a:effectLst/>
+        </a:effectStyle>
+        <a:effectStyle>
+          <a:effectLst/>
+        </a:effectStyle>
+        <a:effectStyle>
+          <a:effectLst>
+            <a:outerShdw blurRad="57150" dist="19050" dir="5400000" algn="ctr" rotWithShape="0">
+              <a:srgbClr val="000000">
+                <a:alpha val="63000"/>
+              </a:srgbClr>
+            </a:outerShdw>
+          </a:effectLst>
+        </a:effectStyle>
+      </a:effectStyleLst>
+      <a:bgFillStyleLst>
+        <a:solidFill>
+          <a:schemeClr val="phClr"/>
+        </a:solidFill>
+        <a:solidFill>
+          <a:schemeClr val="phClr">
+            <a:tint val="95000"/>
+            <a:satMod val="170000"/>
+          </a:schemeClr>
+        </a:solidFill>
+        <a:gradFill rotWithShape="1">
+          <a:gsLst>
+            <a:gs pos="0">
+              <a:schemeClr val="phClr">
+                <a:tint val="93000"/>
+                <a:satMod val="150000"/>
+                <a:shade val="98000"/>
+                <a:lumMod val="102000"/>
+              </a:schemeClr>
+            </a:gs>
+            <a:gs pos="50000">
+              <a:schemeClr val="phClr">
+                <a:tint val="98000"/>
+                <a:satMod val="130000"/>
+                <a:shade val="90000"/>
+                <a:lumMod val="103000"/>
+              </a:schemeClr>
+            </a:gs>
+            <a:gs pos="100000">
+              <a:schemeClr val="phClr">
+                <a:shade val="63000"/>
+                <a:satMod val="120000"/>
+              </a:schemeClr>
+            </a:gs>
+          </a:gsLst>
+          <a:lin ang="5400000" scaled="0"/>
+        </a:gradFill>
+      </a:bgFillStyleLst>
+    </a:fmtScheme>
+  </a:themeElements>
+  <a:objectDefaults/>
+  <a:extraClrSchemeLst/>
+  <a:extLst>
+    <a:ext uri="{05A4C25C-085E-4340-85A3-A5531E510DB2}">
+      <thm15:themeFamily xmlns:thm15="http://schemas.microsoft.com/office/thememl/2012/main" name="Office Theme" id="{62F939B6-93AF-4DB8-9C6B-D6C7DFDC589F}" vid="{4A3C46E8-61CC-4603-A589-7422A47A8E4A}"/>
+    </a:ext>
+  </a:extLst>
+</a:theme>
+</file>
+
 <file path=ppt/theme/themeOverride1.xml><?xml version="1.0" encoding="utf-8"?>
 <a:themeOverride xmlns:a="http://schemas.openxmlformats.org/drawingml/2006/main">
   <a:clrScheme name="Office">

</xml_diff>